<commit_message>
Add Module 3, Improve Modules 1,2
</commit_message>
<xml_diff>
--- a/01. Introduction to UWP/1a. XAML Controls.pptx
+++ b/01. Introduction to UWP/1a. XAML Controls.pptx
@@ -8,20 +8,26 @@
     <p:sldMasterId id="2147483744" r:id="rId7"/>
   </p:sldMasterIdLst>
   <p:notesMasterIdLst>
-    <p:notesMasterId r:id="rId16"/>
+    <p:notesMasterId r:id="rId22"/>
   </p:notesMasterIdLst>
   <p:handoutMasterIdLst>
-    <p:handoutMasterId r:id="rId17"/>
+    <p:handoutMasterId r:id="rId23"/>
   </p:handoutMasterIdLst>
   <p:sldIdLst>
     <p:sldId id="272" r:id="rId8"/>
-    <p:sldId id="319" r:id="rId9"/>
-    <p:sldId id="321" r:id="rId10"/>
+    <p:sldId id="324" r:id="rId9"/>
+    <p:sldId id="319" r:id="rId10"/>
     <p:sldId id="322" r:id="rId11"/>
     <p:sldId id="323" r:id="rId12"/>
-    <p:sldId id="315" r:id="rId13"/>
-    <p:sldId id="300" r:id="rId14"/>
-    <p:sldId id="301" r:id="rId15"/>
+    <p:sldId id="325" r:id="rId13"/>
+    <p:sldId id="321" r:id="rId14"/>
+    <p:sldId id="326" r:id="rId15"/>
+    <p:sldId id="327" r:id="rId16"/>
+    <p:sldId id="328" r:id="rId17"/>
+    <p:sldId id="329" r:id="rId18"/>
+    <p:sldId id="315" r:id="rId19"/>
+    <p:sldId id="300" r:id="rId20"/>
+    <p:sldId id="301" r:id="rId21"/>
   </p:sldIdLst>
   <p:sldSz cx="12192000" cy="6858000"/>
   <p:notesSz cx="6858000" cy="9144000"/>
@@ -213,7 +219,7 @@
           <a:p>
             <a:fld id="{94239FBE-FC08-4336-9B53-CDE8BC5ED33D}" type="datetimeFigureOut">
               <a:rPr lang="ru-RU" smtClean="0"/>
-              <a:t>03.12.2015</a:t>
+              <a:t>05.12.2015</a:t>
             </a:fld>
             <a:endParaRPr lang="ru-RU"/>
           </a:p>
@@ -378,7 +384,7 @@
           <a:p>
             <a:fld id="{135EBF37-D0C5-4B7C-9D35-9D2E20CA27EC}" type="datetimeFigureOut">
               <a:rPr lang="ru-RU" smtClean="0"/>
-              <a:t>03.12.2015</a:t>
+              <a:t>05.12.2015</a:t>
             </a:fld>
             <a:endParaRPr lang="ru-RU"/>
           </a:p>
@@ -1067,7 +1073,7 @@
                   <a:spcPct val="0"/>
                 </a:spcAft>
               </a:pPr>
-              <a:t>12/3/2015 4:19 PM</a:t>
+              <a:t>12/5/2015 7:33 PM</a:t>
             </a:fld>
             <a:endParaRPr lang="en-US"/>
           </a:p>
@@ -1237,7 +1243,7 @@
                   <a:spcPct val="0"/>
                 </a:spcAft>
               </a:pPr>
-              <a:t>8</a:t>
+              <a:t>14</a:t>
             </a:fld>
             <a:endParaRPr lang="en-US"/>
           </a:p>
@@ -9934,7 +9940,7 @@
             <a:fld id="{B9E0730F-B7E3-6A47-BE8A-187D77555B7C}" type="datetimeFigureOut">
               <a:rPr lang="en-US" smtClean="0"/>
               <a:pPr/>
-              <a:t>12/3/2015</a:t>
+              <a:t>12/5/2015</a:t>
             </a:fld>
             <a:endParaRPr lang="en-US"/>
           </a:p>
@@ -27291,11 +27297,7 @@
             </a:br>
             <a:r>
               <a:rPr lang="ru-RU" sz="4000" dirty="0" smtClean="0"/>
-              <a:t>Часть </a:t>
-            </a:r>
-            <a:r>
-              <a:rPr lang="ru-RU" sz="4000" dirty="0" smtClean="0"/>
-              <a:t>1</a:t>
+              <a:t>Часть 1</a:t>
             </a:r>
             <a:r>
               <a:rPr lang="en-US" sz="4000" dirty="0" smtClean="0"/>
@@ -27413,7 +27415,2151 @@
 </p:sld>
 </file>
 
+<file path=ppt/slides/slide10.xml><?xml version="1.0" encoding="utf-8"?>
+<p:sld xmlns:a="http://schemas.openxmlformats.org/drawingml/2006/main" xmlns:r="http://schemas.openxmlformats.org/officeDocument/2006/relationships" xmlns:p="http://schemas.openxmlformats.org/presentationml/2006/main">
+  <p:cSld>
+    <p:spTree>
+      <p:nvGrpSpPr>
+        <p:cNvPr id="1" name=""/>
+        <p:cNvGrpSpPr/>
+        <p:nvPr/>
+      </p:nvGrpSpPr>
+      <p:grpSpPr>
+        <a:xfrm>
+          <a:off x="0" y="0"/>
+          <a:ext cx="0" cy="0"/>
+          <a:chOff x="0" y="0"/>
+          <a:chExt cx="0" cy="0"/>
+        </a:xfrm>
+      </p:grpSpPr>
+      <p:sp>
+        <p:nvSpPr>
+          <p:cNvPr id="7" name="Title 6"/>
+          <p:cNvSpPr>
+            <a:spLocks noGrp="1"/>
+          </p:cNvSpPr>
+          <p:nvPr>
+            <p:ph type="title"/>
+          </p:nvPr>
+        </p:nvSpPr>
+        <p:spPr/>
+        <p:txBody>
+          <a:bodyPr/>
+          <a:lstStyle/>
+          <a:p>
+            <a:r>
+              <a:rPr lang="en-US" dirty="0" err="1" smtClean="0"/>
+              <a:t>ContentDialog</a:t>
+            </a:r>
+            <a:endParaRPr lang="en-US" dirty="0"/>
+          </a:p>
+        </p:txBody>
+      </p:sp>
+      <p:pic>
+        <p:nvPicPr>
+          <p:cNvPr id="2" name="Picture 1"/>
+          <p:cNvPicPr>
+            <a:picLocks noChangeAspect="1"/>
+          </p:cNvPicPr>
+          <p:nvPr/>
+        </p:nvPicPr>
+        <p:blipFill>
+          <a:blip r:embed="rId2">
+            <a:extLst>
+              <a:ext uri="{28A0092B-C50C-407E-A947-70E740481C1C}">
+                <a14:useLocalDpi xmlns:a14="http://schemas.microsoft.com/office/drawing/2010/main"/>
+              </a:ext>
+            </a:extLst>
+          </a:blip>
+          <a:stretch>
+            <a:fillRect/>
+          </a:stretch>
+        </p:blipFill>
+        <p:spPr>
+          <a:xfrm>
+            <a:off x="3498720" y="1269000"/>
+            <a:ext cx="3043176" cy="5071960"/>
+          </a:xfrm>
+          <a:prstGeom prst="rect">
+            <a:avLst/>
+          </a:prstGeom>
+        </p:spPr>
+      </p:pic>
+      <p:pic>
+        <p:nvPicPr>
+          <p:cNvPr id="3" name="Picture 2"/>
+          <p:cNvPicPr>
+            <a:picLocks noChangeAspect="1"/>
+          </p:cNvPicPr>
+          <p:nvPr/>
+        </p:nvPicPr>
+        <p:blipFill>
+          <a:blip r:embed="rId3">
+            <a:extLst>
+              <a:ext uri="{28A0092B-C50C-407E-A947-70E740481C1C}">
+                <a14:useLocalDpi xmlns:a14="http://schemas.microsoft.com/office/drawing/2010/main"/>
+              </a:ext>
+            </a:extLst>
+          </a:blip>
+          <a:stretch>
+            <a:fillRect/>
+          </a:stretch>
+        </p:blipFill>
+        <p:spPr>
+          <a:xfrm>
+            <a:off x="265763" y="1259518"/>
+            <a:ext cx="3049575" cy="5082624"/>
+          </a:xfrm>
+          <a:prstGeom prst="rect">
+            <a:avLst/>
+          </a:prstGeom>
+        </p:spPr>
+      </p:pic>
+    </p:spTree>
+    <p:extLst>
+      <p:ext uri="{BB962C8B-B14F-4D97-AF65-F5344CB8AC3E}">
+        <p14:creationId xmlns:p14="http://schemas.microsoft.com/office/powerpoint/2010/main" val="3831718868"/>
+      </p:ext>
+    </p:extLst>
+  </p:cSld>
+  <p:clrMapOvr>
+    <a:masterClrMapping/>
+  </p:clrMapOvr>
+  <p:transition>
+    <p:fade/>
+  </p:transition>
+</p:sld>
+</file>
+
+<file path=ppt/slides/slide11.xml><?xml version="1.0" encoding="utf-8"?>
+<p:sld xmlns:a="http://schemas.openxmlformats.org/drawingml/2006/main" xmlns:r="http://schemas.openxmlformats.org/officeDocument/2006/relationships" xmlns:p="http://schemas.openxmlformats.org/presentationml/2006/main">
+  <p:cSld>
+    <p:spTree>
+      <p:nvGrpSpPr>
+        <p:cNvPr id="1" name=""/>
+        <p:cNvGrpSpPr/>
+        <p:nvPr/>
+      </p:nvGrpSpPr>
+      <p:grpSpPr>
+        <a:xfrm>
+          <a:off x="0" y="0"/>
+          <a:ext cx="0" cy="0"/>
+          <a:chOff x="0" y="0"/>
+          <a:chExt cx="0" cy="0"/>
+        </a:xfrm>
+      </p:grpSpPr>
+      <p:sp>
+        <p:nvSpPr>
+          <p:cNvPr id="7" name="Title 6"/>
+          <p:cNvSpPr>
+            <a:spLocks noGrp="1"/>
+          </p:cNvSpPr>
+          <p:nvPr>
+            <p:ph type="title"/>
+          </p:nvPr>
+        </p:nvSpPr>
+        <p:spPr/>
+        <p:txBody>
+          <a:bodyPr/>
+          <a:lstStyle/>
+          <a:p>
+            <a:r>
+              <a:rPr lang="en-GB" dirty="0" err="1" smtClean="0"/>
+              <a:t>ContentDialog</a:t>
+            </a:r>
+            <a:endParaRPr lang="en-GB" dirty="0"/>
+          </a:p>
+        </p:txBody>
+      </p:sp>
+      <p:sp>
+        <p:nvSpPr>
+          <p:cNvPr id="10" name="Text Placeholder 9"/>
+          <p:cNvSpPr>
+            <a:spLocks noGrp="1"/>
+          </p:cNvSpPr>
+          <p:nvPr>
+            <p:ph type="body" sz="quarter" idx="10"/>
+          </p:nvPr>
+        </p:nvSpPr>
+        <p:spPr>
+          <a:xfrm>
+            <a:off x="269241" y="1189175"/>
+            <a:ext cx="5205127" cy="5187510"/>
+          </a:xfrm>
+        </p:spPr>
+        <p:txBody>
+          <a:bodyPr/>
+          <a:lstStyle/>
+          <a:p>
+            <a:r>
+              <a:rPr lang="en-GB" sz="2353" dirty="0"/>
+              <a:t>Project -&gt; ‘Add New Item’ -&gt; </a:t>
+            </a:r>
+            <a:r>
+              <a:rPr lang="en-GB" sz="2353" b="1" dirty="0" err="1" smtClean="0"/>
+              <a:t>ContentDialog</a:t>
+            </a:r>
+            <a:endParaRPr lang="en-GB" sz="2353" b="1" dirty="0"/>
+          </a:p>
+          <a:p>
+            <a:r>
+              <a:rPr lang="en-GB" sz="2353" dirty="0" err="1" smtClean="0"/>
+              <a:t>ContentDialog</a:t>
+            </a:r>
+            <a:r>
+              <a:rPr lang="en-GB" sz="2353" dirty="0" smtClean="0"/>
+              <a:t> </a:t>
+            </a:r>
+            <a:r>
+              <a:rPr lang="ru-RU" sz="2353" dirty="0" smtClean="0"/>
+              <a:t>разрабатывается на </a:t>
+            </a:r>
+            <a:r>
+              <a:rPr lang="en-US" sz="2353" dirty="0" smtClean="0"/>
+              <a:t>XAML </a:t>
+            </a:r>
+            <a:r>
+              <a:rPr lang="ru-RU" sz="2353" dirty="0" smtClean="0"/>
+              <a:t>как отдельная страничка</a:t>
+            </a:r>
+            <a:endParaRPr lang="en-GB" sz="2353" dirty="0"/>
+          </a:p>
+          <a:p>
+            <a:endParaRPr lang="en-GB" sz="2353" dirty="0" smtClean="0"/>
+          </a:p>
+          <a:p>
+            <a:r>
+              <a:rPr lang="ru-RU" sz="2353" dirty="0" smtClean="0"/>
+              <a:t>В коде для показа используется</a:t>
+            </a:r>
+            <a:r>
+              <a:rPr lang="en-GB" sz="2353" dirty="0" smtClean="0"/>
+              <a:t>:</a:t>
+            </a:r>
+            <a:endParaRPr lang="en-GB" sz="2353" dirty="0"/>
+          </a:p>
+          <a:p>
+            <a:r>
+              <a:rPr lang="en-US" sz="1400" dirty="0" err="1">
+                <a:solidFill>
+                  <a:srgbClr val="2B91AF"/>
+                </a:solidFill>
+                <a:latin typeface="Consolas" panose="020B0609020204030204" pitchFamily="49" charset="0"/>
+                <a:ea typeface="Calibri" panose="020F0502020204030204" pitchFamily="34" charset="0"/>
+                <a:cs typeface="Times New Roman" panose="02020603050405020304" pitchFamily="18" charset="0"/>
+              </a:rPr>
+              <a:t>AboutMessage</a:t>
+            </a:r>
+            <a:r>
+              <a:rPr lang="en-US" sz="1400" dirty="0">
+                <a:solidFill>
+                  <a:srgbClr val="2B91AF"/>
+                </a:solidFill>
+                <a:highlight>
+                  <a:srgbClr val="FFFFFF"/>
+                </a:highlight>
+                <a:latin typeface="Consolas" panose="020B0609020204030204" pitchFamily="49" charset="0"/>
+                <a:ea typeface="Calibri" panose="020F0502020204030204" pitchFamily="34" charset="0"/>
+                <a:cs typeface="Times New Roman" panose="02020603050405020304" pitchFamily="18" charset="0"/>
+              </a:rPr>
+              <a:t> </a:t>
+            </a:r>
+            <a:r>
+              <a:rPr lang="en-US" sz="1400" dirty="0" err="1">
+                <a:solidFill>
+                  <a:srgbClr val="000000"/>
+                </a:solidFill>
+                <a:highlight>
+                  <a:srgbClr val="FFFFFF"/>
+                </a:highlight>
+                <a:latin typeface="Consolas" panose="020B0609020204030204" pitchFamily="49" charset="0"/>
+                <a:ea typeface="Calibri" panose="020F0502020204030204" pitchFamily="34" charset="0"/>
+                <a:cs typeface="Times New Roman" panose="02020603050405020304" pitchFamily="18" charset="0"/>
+              </a:rPr>
+              <a:t>myDialog</a:t>
+            </a:r>
+            <a:r>
+              <a:rPr lang="en-US" sz="1400" dirty="0">
+                <a:solidFill>
+                  <a:srgbClr val="000000"/>
+                </a:solidFill>
+                <a:highlight>
+                  <a:srgbClr val="FFFFFF"/>
+                </a:highlight>
+                <a:latin typeface="Consolas" panose="020B0609020204030204" pitchFamily="49" charset="0"/>
+                <a:ea typeface="Calibri" panose="020F0502020204030204" pitchFamily="34" charset="0"/>
+                <a:cs typeface="Times New Roman" panose="02020603050405020304" pitchFamily="18" charset="0"/>
+              </a:rPr>
+              <a:t> = </a:t>
+            </a:r>
+            <a:br>
+              <a:rPr lang="en-US" sz="1400" dirty="0">
+                <a:solidFill>
+                  <a:srgbClr val="000000"/>
+                </a:solidFill>
+                <a:highlight>
+                  <a:srgbClr val="FFFFFF"/>
+                </a:highlight>
+                <a:latin typeface="Consolas" panose="020B0609020204030204" pitchFamily="49" charset="0"/>
+                <a:ea typeface="Calibri" panose="020F0502020204030204" pitchFamily="34" charset="0"/>
+                <a:cs typeface="Times New Roman" panose="02020603050405020304" pitchFamily="18" charset="0"/>
+              </a:rPr>
+            </a:br>
+            <a:r>
+              <a:rPr lang="en-US" sz="1400" dirty="0">
+                <a:solidFill>
+                  <a:srgbClr val="000000"/>
+                </a:solidFill>
+                <a:highlight>
+                  <a:srgbClr val="FFFFFF"/>
+                </a:highlight>
+                <a:latin typeface="Consolas" panose="020B0609020204030204" pitchFamily="49" charset="0"/>
+                <a:ea typeface="Calibri" panose="020F0502020204030204" pitchFamily="34" charset="0"/>
+                <a:cs typeface="Times New Roman" panose="02020603050405020304" pitchFamily="18" charset="0"/>
+              </a:rPr>
+              <a:t>    </a:t>
+            </a:r>
+            <a:r>
+              <a:rPr lang="en-US" sz="1400" dirty="0">
+                <a:solidFill>
+                  <a:srgbClr val="0000FF"/>
+                </a:solidFill>
+                <a:highlight>
+                  <a:srgbClr val="FFFFFF"/>
+                </a:highlight>
+                <a:latin typeface="Consolas" panose="020B0609020204030204" pitchFamily="49" charset="0"/>
+                <a:ea typeface="Calibri" panose="020F0502020204030204" pitchFamily="34" charset="0"/>
+                <a:cs typeface="Times New Roman" panose="02020603050405020304" pitchFamily="18" charset="0"/>
+              </a:rPr>
+              <a:t>new</a:t>
+            </a:r>
+            <a:r>
+              <a:rPr lang="en-US" sz="1400" dirty="0">
+                <a:solidFill>
+                  <a:srgbClr val="000000"/>
+                </a:solidFill>
+                <a:highlight>
+                  <a:srgbClr val="FFFFFF"/>
+                </a:highlight>
+                <a:latin typeface="Consolas" panose="020B0609020204030204" pitchFamily="49" charset="0"/>
+                <a:ea typeface="Calibri" panose="020F0502020204030204" pitchFamily="34" charset="0"/>
+                <a:cs typeface="Times New Roman" panose="02020603050405020304" pitchFamily="18" charset="0"/>
+              </a:rPr>
+              <a:t> </a:t>
+            </a:r>
+            <a:r>
+              <a:rPr lang="en-US" sz="1400" dirty="0" err="1">
+                <a:solidFill>
+                  <a:srgbClr val="2B91AF"/>
+                </a:solidFill>
+                <a:latin typeface="Consolas" panose="020B0609020204030204" pitchFamily="49" charset="0"/>
+                <a:ea typeface="Calibri" panose="020F0502020204030204" pitchFamily="34" charset="0"/>
+                <a:cs typeface="Times New Roman" panose="02020603050405020304" pitchFamily="18" charset="0"/>
+              </a:rPr>
+              <a:t>AboutMessage</a:t>
+            </a:r>
+            <a:r>
+              <a:rPr lang="en-US" sz="1400" dirty="0">
+                <a:solidFill>
+                  <a:srgbClr val="000000"/>
+                </a:solidFill>
+                <a:highlight>
+                  <a:srgbClr val="FFFFFF"/>
+                </a:highlight>
+                <a:latin typeface="Consolas" panose="020B0609020204030204" pitchFamily="49" charset="0"/>
+                <a:ea typeface="Calibri" panose="020F0502020204030204" pitchFamily="34" charset="0"/>
+                <a:cs typeface="Times New Roman" panose="02020603050405020304" pitchFamily="18" charset="0"/>
+              </a:rPr>
+              <a:t>();</a:t>
+            </a:r>
+            <a:endParaRPr lang="en-GB" sz="1800" dirty="0">
+              <a:latin typeface="Calibri" panose="020F0502020204030204" pitchFamily="34" charset="0"/>
+              <a:ea typeface="Calibri" panose="020F0502020204030204" pitchFamily="34" charset="0"/>
+              <a:cs typeface="Times New Roman" panose="02020603050405020304" pitchFamily="18" charset="0"/>
+            </a:endParaRPr>
+          </a:p>
+          <a:p>
+            <a:r>
+              <a:rPr lang="en-US" sz="1400" dirty="0" err="1">
+                <a:solidFill>
+                  <a:srgbClr val="2B91AF"/>
+                </a:solidFill>
+                <a:highlight>
+                  <a:srgbClr val="FFFFFF"/>
+                </a:highlight>
+                <a:latin typeface="Consolas" panose="020B0609020204030204" pitchFamily="49" charset="0"/>
+                <a:ea typeface="Calibri" panose="020F0502020204030204" pitchFamily="34" charset="0"/>
+                <a:cs typeface="Times New Roman" panose="02020603050405020304" pitchFamily="18" charset="0"/>
+              </a:rPr>
+              <a:t>ContentDialogResult</a:t>
+            </a:r>
+            <a:r>
+              <a:rPr lang="en-US" sz="1400" dirty="0">
+                <a:solidFill>
+                  <a:srgbClr val="000000"/>
+                </a:solidFill>
+                <a:highlight>
+                  <a:srgbClr val="FFFFFF"/>
+                </a:highlight>
+                <a:latin typeface="Consolas" panose="020B0609020204030204" pitchFamily="49" charset="0"/>
+                <a:ea typeface="Calibri" panose="020F0502020204030204" pitchFamily="34" charset="0"/>
+                <a:cs typeface="Times New Roman" panose="02020603050405020304" pitchFamily="18" charset="0"/>
+              </a:rPr>
+              <a:t> result = </a:t>
+            </a:r>
+            <a:br>
+              <a:rPr lang="en-US" sz="1400" dirty="0">
+                <a:solidFill>
+                  <a:srgbClr val="000000"/>
+                </a:solidFill>
+                <a:highlight>
+                  <a:srgbClr val="FFFFFF"/>
+                </a:highlight>
+                <a:latin typeface="Consolas" panose="020B0609020204030204" pitchFamily="49" charset="0"/>
+                <a:ea typeface="Calibri" panose="020F0502020204030204" pitchFamily="34" charset="0"/>
+                <a:cs typeface="Times New Roman" panose="02020603050405020304" pitchFamily="18" charset="0"/>
+              </a:rPr>
+            </a:br>
+            <a:r>
+              <a:rPr lang="en-US" sz="1400" dirty="0">
+                <a:solidFill>
+                  <a:srgbClr val="000000"/>
+                </a:solidFill>
+                <a:highlight>
+                  <a:srgbClr val="FFFFFF"/>
+                </a:highlight>
+                <a:latin typeface="Consolas" panose="020B0609020204030204" pitchFamily="49" charset="0"/>
+                <a:ea typeface="Calibri" panose="020F0502020204030204" pitchFamily="34" charset="0"/>
+                <a:cs typeface="Times New Roman" panose="02020603050405020304" pitchFamily="18" charset="0"/>
+              </a:rPr>
+              <a:t>    </a:t>
+            </a:r>
+            <a:r>
+              <a:rPr lang="en-US" sz="1400" dirty="0">
+                <a:solidFill>
+                  <a:srgbClr val="0000FF"/>
+                </a:solidFill>
+                <a:highlight>
+                  <a:srgbClr val="FFFFFF"/>
+                </a:highlight>
+                <a:latin typeface="Consolas" panose="020B0609020204030204" pitchFamily="49" charset="0"/>
+                <a:ea typeface="Calibri" panose="020F0502020204030204" pitchFamily="34" charset="0"/>
+                <a:cs typeface="Times New Roman" panose="02020603050405020304" pitchFamily="18" charset="0"/>
+              </a:rPr>
+              <a:t>await</a:t>
+            </a:r>
+            <a:r>
+              <a:rPr lang="en-US" sz="1400" dirty="0">
+                <a:solidFill>
+                  <a:srgbClr val="000000"/>
+                </a:solidFill>
+                <a:highlight>
+                  <a:srgbClr val="FFFFFF"/>
+                </a:highlight>
+                <a:latin typeface="Consolas" panose="020B0609020204030204" pitchFamily="49" charset="0"/>
+                <a:ea typeface="Calibri" panose="020F0502020204030204" pitchFamily="34" charset="0"/>
+                <a:cs typeface="Times New Roman" panose="02020603050405020304" pitchFamily="18" charset="0"/>
+              </a:rPr>
+              <a:t> </a:t>
+            </a:r>
+            <a:r>
+              <a:rPr lang="en-US" sz="1400" dirty="0" err="1">
+                <a:solidFill>
+                  <a:srgbClr val="000000"/>
+                </a:solidFill>
+                <a:highlight>
+                  <a:srgbClr val="FFFFFF"/>
+                </a:highlight>
+                <a:latin typeface="Consolas" panose="020B0609020204030204" pitchFamily="49" charset="0"/>
+                <a:ea typeface="Calibri" panose="020F0502020204030204" pitchFamily="34" charset="0"/>
+                <a:cs typeface="Times New Roman" panose="02020603050405020304" pitchFamily="18" charset="0"/>
+              </a:rPr>
+              <a:t>myDialog.ShowAsync</a:t>
+            </a:r>
+            <a:r>
+              <a:rPr lang="en-US" sz="1400" dirty="0" smtClean="0">
+                <a:solidFill>
+                  <a:srgbClr val="000000"/>
+                </a:solidFill>
+                <a:highlight>
+                  <a:srgbClr val="FFFFFF"/>
+                </a:highlight>
+                <a:latin typeface="Consolas" panose="020B0609020204030204" pitchFamily="49" charset="0"/>
+                <a:ea typeface="Calibri" panose="020F0502020204030204" pitchFamily="34" charset="0"/>
+                <a:cs typeface="Times New Roman" panose="02020603050405020304" pitchFamily="18" charset="0"/>
+              </a:rPr>
+              <a:t>();</a:t>
+            </a:r>
+          </a:p>
+          <a:p>
+            <a:pPr lvl="0">
+              <a:lnSpc>
+                <a:spcPct val="110000"/>
+              </a:lnSpc>
+              <a:spcBef>
+                <a:spcPct val="20000"/>
+              </a:spcBef>
+              <a:buClrTx/>
+              <a:defRPr/>
+            </a:pPr>
+            <a:r>
+              <a:rPr lang="en-GB" sz="1400" dirty="0" smtClean="0">
+                <a:solidFill>
+                  <a:srgbClr val="0000FF"/>
+                </a:solidFill>
+                <a:highlight>
+                  <a:srgbClr val="F2F2F2"/>
+                </a:highlight>
+                <a:latin typeface="Consolas" panose="020B0609020204030204" pitchFamily="49" charset="0"/>
+                <a:cs typeface="Consolas" panose="020B0609020204030204" pitchFamily="49" charset="0"/>
+              </a:rPr>
+              <a:t>if</a:t>
+            </a:r>
+            <a:r>
+              <a:rPr lang="en-GB" sz="1400" dirty="0" smtClean="0">
+                <a:solidFill>
+                  <a:srgbClr val="000000"/>
+                </a:solidFill>
+                <a:highlight>
+                  <a:srgbClr val="F2F2F2"/>
+                </a:highlight>
+                <a:latin typeface="Consolas" panose="020B0609020204030204" pitchFamily="49" charset="0"/>
+                <a:cs typeface="Consolas" panose="020B0609020204030204" pitchFamily="49" charset="0"/>
+              </a:rPr>
+              <a:t> </a:t>
+            </a:r>
+            <a:r>
+              <a:rPr lang="en-GB" sz="1400" dirty="0">
+                <a:solidFill>
+                  <a:srgbClr val="000000"/>
+                </a:solidFill>
+                <a:highlight>
+                  <a:srgbClr val="F2F2F2"/>
+                </a:highlight>
+                <a:latin typeface="Consolas" panose="020B0609020204030204" pitchFamily="49" charset="0"/>
+                <a:cs typeface="Consolas" panose="020B0609020204030204" pitchFamily="49" charset="0"/>
+              </a:rPr>
+              <a:t>(result == </a:t>
+            </a:r>
+            <a:r>
+              <a:rPr lang="en-GB" sz="1400" dirty="0" err="1">
+                <a:solidFill>
+                  <a:srgbClr val="2B91AF"/>
+                </a:solidFill>
+                <a:highlight>
+                  <a:srgbClr val="F2F2F2"/>
+                </a:highlight>
+                <a:latin typeface="Consolas" panose="020B0609020204030204" pitchFamily="49" charset="0"/>
+                <a:cs typeface="Consolas" panose="020B0609020204030204" pitchFamily="49" charset="0"/>
+              </a:rPr>
+              <a:t>ContentDialogResult</a:t>
+            </a:r>
+            <a:r>
+              <a:rPr lang="en-GB" sz="1400" dirty="0" err="1">
+                <a:solidFill>
+                  <a:srgbClr val="000000"/>
+                </a:solidFill>
+                <a:highlight>
+                  <a:srgbClr val="F2F2F2"/>
+                </a:highlight>
+                <a:latin typeface="Consolas" panose="020B0609020204030204" pitchFamily="49" charset="0"/>
+                <a:cs typeface="Consolas" panose="020B0609020204030204" pitchFamily="49" charset="0"/>
+              </a:rPr>
+              <a:t>.Primary</a:t>
+            </a:r>
+            <a:r>
+              <a:rPr lang="en-GB" sz="1400" dirty="0">
+                <a:solidFill>
+                  <a:srgbClr val="000000"/>
+                </a:solidFill>
+                <a:highlight>
+                  <a:srgbClr val="F2F2F2"/>
+                </a:highlight>
+                <a:latin typeface="Consolas" panose="020B0609020204030204" pitchFamily="49" charset="0"/>
+                <a:cs typeface="Consolas" panose="020B0609020204030204" pitchFamily="49" charset="0"/>
+              </a:rPr>
+              <a:t>) </a:t>
+            </a:r>
+            <a:r>
+              <a:rPr lang="en-GB" sz="1400" dirty="0" smtClean="0">
+                <a:solidFill>
+                  <a:srgbClr val="000000"/>
+                </a:solidFill>
+                <a:highlight>
+                  <a:srgbClr val="F2F2F2"/>
+                </a:highlight>
+                <a:latin typeface="Consolas" panose="020B0609020204030204" pitchFamily="49" charset="0"/>
+                <a:cs typeface="Consolas" panose="020B0609020204030204" pitchFamily="49" charset="0"/>
+              </a:rPr>
+              <a:t/>
+            </a:r>
+            <a:br>
+              <a:rPr lang="en-GB" sz="1400" dirty="0" smtClean="0">
+                <a:solidFill>
+                  <a:srgbClr val="000000"/>
+                </a:solidFill>
+                <a:highlight>
+                  <a:srgbClr val="F2F2F2"/>
+                </a:highlight>
+                <a:latin typeface="Consolas" panose="020B0609020204030204" pitchFamily="49" charset="0"/>
+                <a:cs typeface="Consolas" panose="020B0609020204030204" pitchFamily="49" charset="0"/>
+              </a:rPr>
+            </a:br>
+            <a:r>
+              <a:rPr lang="en-GB" sz="1400" dirty="0" smtClean="0">
+                <a:solidFill>
+                  <a:srgbClr val="000000"/>
+                </a:solidFill>
+                <a:highlight>
+                  <a:srgbClr val="F2F2F2"/>
+                </a:highlight>
+                <a:latin typeface="Consolas" panose="020B0609020204030204" pitchFamily="49" charset="0"/>
+                <a:cs typeface="Consolas" panose="020B0609020204030204" pitchFamily="49" charset="0"/>
+              </a:rPr>
+              <a:t>{ </a:t>
+            </a:r>
+            <a:r>
+              <a:rPr lang="en-GB" sz="1400" dirty="0">
+                <a:solidFill>
+                  <a:srgbClr val="008000"/>
+                </a:solidFill>
+                <a:highlight>
+                  <a:srgbClr val="F2F2F2"/>
+                </a:highlight>
+                <a:latin typeface="Consolas" panose="020B0609020204030204" pitchFamily="49" charset="0"/>
+                <a:cs typeface="Consolas" panose="020B0609020204030204" pitchFamily="49" charset="0"/>
+              </a:rPr>
+              <a:t>/* do some more Primary logic */</a:t>
+            </a:r>
+            <a:r>
+              <a:rPr lang="en-GB" sz="1400" dirty="0">
+                <a:solidFill>
+                  <a:srgbClr val="000000"/>
+                </a:solidFill>
+                <a:highlight>
+                  <a:srgbClr val="F2F2F2"/>
+                </a:highlight>
+                <a:latin typeface="Consolas" panose="020B0609020204030204" pitchFamily="49" charset="0"/>
+                <a:cs typeface="Consolas" panose="020B0609020204030204" pitchFamily="49" charset="0"/>
+              </a:rPr>
+              <a:t> }</a:t>
+            </a:r>
+          </a:p>
+          <a:p>
+            <a:pPr lvl="0">
+              <a:lnSpc>
+                <a:spcPct val="110000"/>
+              </a:lnSpc>
+              <a:spcBef>
+                <a:spcPct val="20000"/>
+              </a:spcBef>
+              <a:buClrTx/>
+              <a:defRPr/>
+            </a:pPr>
+            <a:r>
+              <a:rPr lang="en-GB" sz="1400" dirty="0" smtClean="0">
+                <a:solidFill>
+                  <a:srgbClr val="0000FF"/>
+                </a:solidFill>
+                <a:highlight>
+                  <a:srgbClr val="F2F2F2"/>
+                </a:highlight>
+                <a:latin typeface="Consolas" panose="020B0609020204030204" pitchFamily="49" charset="0"/>
+                <a:cs typeface="Consolas" panose="020B0609020204030204" pitchFamily="49" charset="0"/>
+              </a:rPr>
+              <a:t>else</a:t>
+            </a:r>
+            <a:r>
+              <a:rPr lang="en-GB" sz="1400" dirty="0" smtClean="0">
+                <a:solidFill>
+                  <a:srgbClr val="000000"/>
+                </a:solidFill>
+                <a:highlight>
+                  <a:srgbClr val="F2F2F2"/>
+                </a:highlight>
+                <a:latin typeface="Consolas" panose="020B0609020204030204" pitchFamily="49" charset="0"/>
+                <a:cs typeface="Consolas" panose="020B0609020204030204" pitchFamily="49" charset="0"/>
+              </a:rPr>
+              <a:t> </a:t>
+            </a:r>
+            <a:r>
+              <a:rPr lang="en-GB" sz="1400" dirty="0">
+                <a:solidFill>
+                  <a:srgbClr val="0000FF"/>
+                </a:solidFill>
+                <a:highlight>
+                  <a:srgbClr val="F2F2F2"/>
+                </a:highlight>
+                <a:latin typeface="Consolas" panose="020B0609020204030204" pitchFamily="49" charset="0"/>
+                <a:cs typeface="Consolas" panose="020B0609020204030204" pitchFamily="49" charset="0"/>
+              </a:rPr>
+              <a:t>if</a:t>
+            </a:r>
+            <a:r>
+              <a:rPr lang="en-GB" sz="1400" dirty="0">
+                <a:solidFill>
+                  <a:srgbClr val="000000"/>
+                </a:solidFill>
+                <a:highlight>
+                  <a:srgbClr val="F2F2F2"/>
+                </a:highlight>
+                <a:latin typeface="Consolas" panose="020B0609020204030204" pitchFamily="49" charset="0"/>
+                <a:cs typeface="Consolas" panose="020B0609020204030204" pitchFamily="49" charset="0"/>
+              </a:rPr>
+              <a:t> (result == </a:t>
+            </a:r>
+            <a:r>
+              <a:rPr lang="en-GB" sz="1400" dirty="0" err="1">
+                <a:solidFill>
+                  <a:srgbClr val="2B91AF"/>
+                </a:solidFill>
+                <a:highlight>
+                  <a:srgbClr val="F2F2F2"/>
+                </a:highlight>
+                <a:latin typeface="Consolas" panose="020B0609020204030204" pitchFamily="49" charset="0"/>
+                <a:cs typeface="Consolas" panose="020B0609020204030204" pitchFamily="49" charset="0"/>
+              </a:rPr>
+              <a:t>ContentDialogResult</a:t>
+            </a:r>
+            <a:r>
+              <a:rPr lang="en-GB" sz="1400" dirty="0" err="1">
+                <a:solidFill>
+                  <a:srgbClr val="000000"/>
+                </a:solidFill>
+                <a:highlight>
+                  <a:srgbClr val="F2F2F2"/>
+                </a:highlight>
+                <a:latin typeface="Consolas" panose="020B0609020204030204" pitchFamily="49" charset="0"/>
+                <a:cs typeface="Consolas" panose="020B0609020204030204" pitchFamily="49" charset="0"/>
+              </a:rPr>
+              <a:t>.Secondary</a:t>
+            </a:r>
+            <a:r>
+              <a:rPr lang="en-GB" sz="1400" dirty="0">
+                <a:solidFill>
+                  <a:srgbClr val="000000"/>
+                </a:solidFill>
+                <a:highlight>
+                  <a:srgbClr val="F2F2F2"/>
+                </a:highlight>
+                <a:latin typeface="Consolas" panose="020B0609020204030204" pitchFamily="49" charset="0"/>
+                <a:cs typeface="Consolas" panose="020B0609020204030204" pitchFamily="49" charset="0"/>
+              </a:rPr>
+              <a:t>) </a:t>
+            </a:r>
+            <a:endParaRPr lang="en-GB" sz="1400" dirty="0" smtClean="0">
+              <a:solidFill>
+                <a:srgbClr val="000000"/>
+              </a:solidFill>
+              <a:highlight>
+                <a:srgbClr val="F2F2F2"/>
+              </a:highlight>
+              <a:latin typeface="Consolas" panose="020B0609020204030204" pitchFamily="49" charset="0"/>
+              <a:cs typeface="Consolas" panose="020B0609020204030204" pitchFamily="49" charset="0"/>
+            </a:endParaRPr>
+          </a:p>
+          <a:p>
+            <a:pPr lvl="0">
+              <a:lnSpc>
+                <a:spcPct val="110000"/>
+              </a:lnSpc>
+              <a:spcBef>
+                <a:spcPct val="20000"/>
+              </a:spcBef>
+              <a:buClrTx/>
+              <a:defRPr/>
+            </a:pPr>
+            <a:r>
+              <a:rPr lang="en-GB" sz="1400" dirty="0" smtClean="0">
+                <a:solidFill>
+                  <a:srgbClr val="000000"/>
+                </a:solidFill>
+                <a:highlight>
+                  <a:srgbClr val="F2F2F2"/>
+                </a:highlight>
+                <a:latin typeface="Consolas" panose="020B0609020204030204" pitchFamily="49" charset="0"/>
+                <a:cs typeface="Consolas" panose="020B0609020204030204" pitchFamily="49" charset="0"/>
+              </a:rPr>
+              <a:t>{ </a:t>
+            </a:r>
+            <a:r>
+              <a:rPr lang="en-GB" sz="1400" dirty="0">
+                <a:solidFill>
+                  <a:srgbClr val="008000"/>
+                </a:solidFill>
+                <a:highlight>
+                  <a:srgbClr val="F2F2F2"/>
+                </a:highlight>
+                <a:latin typeface="Consolas" panose="020B0609020204030204" pitchFamily="49" charset="0"/>
+                <a:cs typeface="Consolas" panose="020B0609020204030204" pitchFamily="49" charset="0"/>
+              </a:rPr>
+              <a:t>/* else do Secondary logic */</a:t>
+            </a:r>
+            <a:r>
+              <a:rPr lang="en-GB" sz="1400" dirty="0">
+                <a:solidFill>
+                  <a:srgbClr val="000000"/>
+                </a:solidFill>
+                <a:highlight>
+                  <a:srgbClr val="F2F2F2"/>
+                </a:highlight>
+                <a:latin typeface="Consolas" panose="020B0609020204030204" pitchFamily="49" charset="0"/>
+                <a:cs typeface="Consolas" panose="020B0609020204030204" pitchFamily="49" charset="0"/>
+              </a:rPr>
+              <a:t> }</a:t>
+            </a:r>
+            <a:endParaRPr lang="en-GB" sz="1400" dirty="0">
+              <a:latin typeface="Consolas" panose="020B0609020204030204" pitchFamily="49" charset="0"/>
+              <a:ea typeface="Calibri" panose="020F0502020204030204" pitchFamily="34" charset="0"/>
+              <a:cs typeface="Consolas" panose="020B0609020204030204" pitchFamily="49" charset="0"/>
+            </a:endParaRPr>
+          </a:p>
+          <a:p>
+            <a:endParaRPr lang="en-GB" sz="1961" dirty="0"/>
+          </a:p>
+        </p:txBody>
+      </p:sp>
+      <p:pic>
+        <p:nvPicPr>
+          <p:cNvPr id="3" name="Picture 2"/>
+          <p:cNvPicPr>
+            <a:picLocks noChangeAspect="1"/>
+          </p:cNvPicPr>
+          <p:nvPr/>
+        </p:nvPicPr>
+        <p:blipFill>
+          <a:blip r:embed="rId2" cstate="screen">
+            <a:extLst>
+              <a:ext uri="{28A0092B-C50C-407E-A947-70E740481C1C}">
+                <a14:useLocalDpi xmlns:a14="http://schemas.microsoft.com/office/drawing/2010/main"/>
+              </a:ext>
+            </a:extLst>
+          </a:blip>
+          <a:stretch>
+            <a:fillRect/>
+          </a:stretch>
+        </p:blipFill>
+        <p:spPr>
+          <a:xfrm>
+            <a:off x="5474368" y="262771"/>
+            <a:ext cx="6246175" cy="3879820"/>
+          </a:xfrm>
+          <a:prstGeom prst="rect">
+            <a:avLst/>
+          </a:prstGeom>
+        </p:spPr>
+      </p:pic>
+    </p:spTree>
+    <p:extLst>
+      <p:ext uri="{BB962C8B-B14F-4D97-AF65-F5344CB8AC3E}">
+        <p14:creationId xmlns:p14="http://schemas.microsoft.com/office/powerpoint/2010/main" val="3754067108"/>
+      </p:ext>
+    </p:extLst>
+  </p:cSld>
+  <p:clrMapOvr>
+    <a:masterClrMapping/>
+  </p:clrMapOvr>
+  <p:transition>
+    <p:fade/>
+  </p:transition>
+</p:sld>
+</file>
+
+<file path=ppt/slides/slide12.xml><?xml version="1.0" encoding="utf-8"?>
+<p:sld xmlns:a="http://schemas.openxmlformats.org/drawingml/2006/main" xmlns:r="http://schemas.openxmlformats.org/officeDocument/2006/relationships" xmlns:p="http://schemas.openxmlformats.org/presentationml/2006/main">
+  <p:cSld>
+    <p:spTree>
+      <p:nvGrpSpPr>
+        <p:cNvPr id="1" name=""/>
+        <p:cNvGrpSpPr/>
+        <p:nvPr/>
+      </p:nvGrpSpPr>
+      <p:grpSpPr>
+        <a:xfrm>
+          <a:off x="0" y="0"/>
+          <a:ext cx="0" cy="0"/>
+          <a:chOff x="0" y="0"/>
+          <a:chExt cx="0" cy="0"/>
+        </a:xfrm>
+      </p:grpSpPr>
+      <p:sp>
+        <p:nvSpPr>
+          <p:cNvPr id="2" name="Заголовок 1"/>
+          <p:cNvSpPr>
+            <a:spLocks noGrp="1"/>
+          </p:cNvSpPr>
+          <p:nvPr>
+            <p:ph type="title"/>
+          </p:nvPr>
+        </p:nvSpPr>
+        <p:spPr/>
+        <p:txBody>
+          <a:bodyPr/>
+          <a:lstStyle/>
+          <a:p>
+            <a:r>
+              <a:rPr lang="ru-RU" dirty="0" smtClean="0"/>
+              <a:t>Мораль</a:t>
+            </a:r>
+            <a:endParaRPr lang="ru-RU" dirty="0"/>
+          </a:p>
+        </p:txBody>
+      </p:sp>
+      <p:sp>
+        <p:nvSpPr>
+          <p:cNvPr id="3" name="Текст 2"/>
+          <p:cNvSpPr>
+            <a:spLocks noGrp="1"/>
+          </p:cNvSpPr>
+          <p:nvPr>
+            <p:ph type="body" sz="quarter" idx="10"/>
+          </p:nvPr>
+        </p:nvSpPr>
+        <p:spPr>
+          <a:xfrm>
+            <a:off x="269239" y="1189177"/>
+            <a:ext cx="7086761" cy="5013680"/>
+          </a:xfrm>
+        </p:spPr>
+        <p:txBody>
+          <a:bodyPr/>
+          <a:lstStyle/>
+          <a:p>
+            <a:r>
+              <a:rPr lang="en-US" sz="2800" dirty="0" smtClean="0"/>
+              <a:t>XAML </a:t>
+            </a:r>
+            <a:r>
+              <a:rPr lang="ru-RU" sz="2800" dirty="0" smtClean="0"/>
+              <a:t>предоставляет богатый выбор элементов управления</a:t>
+            </a:r>
+            <a:endParaRPr lang="ru-RU" sz="2800" dirty="0" smtClean="0"/>
+          </a:p>
+          <a:p>
+            <a:r>
+              <a:rPr lang="ru-RU" sz="2800" dirty="0" smtClean="0"/>
+              <a:t>Контейнеры обеспечивают автоматическое расположение элементов друг относительно друга</a:t>
+            </a:r>
+          </a:p>
+          <a:p>
+            <a:r>
+              <a:rPr lang="ru-RU" sz="2800" dirty="0" smtClean="0"/>
+              <a:t>Мы научились произвольно позиционироват</a:t>
+            </a:r>
+            <a:r>
+              <a:rPr lang="ru-RU" sz="2800" dirty="0" smtClean="0"/>
+              <a:t>ь элементы и перемещать их, а значит можно делать игры!</a:t>
+            </a:r>
+          </a:p>
+          <a:p>
+            <a:r>
+              <a:rPr lang="ru-RU" sz="2400" dirty="0" smtClean="0">
+                <a:solidFill>
+                  <a:schemeClr val="tx1">
+                    <a:lumMod val="75000"/>
+                  </a:schemeClr>
+                </a:solidFill>
+              </a:rPr>
+              <a:t>   В реальной жизни так игры обычно не делают,   </a:t>
+            </a:r>
+            <a:br>
+              <a:rPr lang="ru-RU" sz="2400" dirty="0" smtClean="0">
+                <a:solidFill>
+                  <a:schemeClr val="tx1">
+                    <a:lumMod val="75000"/>
+                  </a:schemeClr>
+                </a:solidFill>
+              </a:rPr>
+            </a:br>
+            <a:r>
+              <a:rPr lang="ru-RU" sz="2400" dirty="0" smtClean="0">
+                <a:solidFill>
+                  <a:schemeClr val="tx1">
+                    <a:lumMod val="75000"/>
+                  </a:schemeClr>
+                </a:solidFill>
+              </a:rPr>
+              <a:t>   поскольку рендеринг </a:t>
+            </a:r>
+            <a:r>
+              <a:rPr lang="en-US" sz="2400" dirty="0" smtClean="0">
+                <a:solidFill>
+                  <a:schemeClr val="tx1">
+                    <a:lumMod val="75000"/>
+                  </a:schemeClr>
+                </a:solidFill>
+              </a:rPr>
+              <a:t>XAML </a:t>
+            </a:r>
+            <a:r>
+              <a:rPr lang="ru-RU" sz="2400" dirty="0" smtClean="0">
+                <a:solidFill>
+                  <a:schemeClr val="tx1">
+                    <a:lumMod val="75000"/>
+                  </a:schemeClr>
+                </a:solidFill>
+              </a:rPr>
+              <a:t>не </a:t>
+            </a:r>
+            <a:br>
+              <a:rPr lang="ru-RU" sz="2400" dirty="0" smtClean="0">
+                <a:solidFill>
+                  <a:schemeClr val="tx1">
+                    <a:lumMod val="75000"/>
+                  </a:schemeClr>
+                </a:solidFill>
+              </a:rPr>
+            </a:br>
+            <a:r>
+              <a:rPr lang="ru-RU" sz="2400" dirty="0" smtClean="0">
+                <a:solidFill>
+                  <a:schemeClr val="tx1">
+                    <a:lumMod val="75000"/>
+                  </a:schemeClr>
+                </a:solidFill>
+              </a:rPr>
+              <a:t>   использует аппаратное ускорение</a:t>
+            </a:r>
+            <a:endParaRPr lang="ru-RU" sz="2800" dirty="0" smtClean="0">
+              <a:solidFill>
+                <a:schemeClr val="tx1">
+                  <a:lumMod val="75000"/>
+                </a:schemeClr>
+              </a:solidFill>
+            </a:endParaRPr>
+          </a:p>
+          <a:p>
+            <a:endParaRPr lang="en-US" sz="1800" dirty="0">
+              <a:solidFill>
+                <a:schemeClr val="tx1"/>
+              </a:solidFill>
+            </a:endParaRPr>
+          </a:p>
+        </p:txBody>
+      </p:sp>
+    </p:spTree>
+    <p:extLst>
+      <p:ext uri="{BB962C8B-B14F-4D97-AF65-F5344CB8AC3E}">
+        <p14:creationId xmlns:p14="http://schemas.microsoft.com/office/powerpoint/2010/main" val="4039233215"/>
+      </p:ext>
+    </p:extLst>
+  </p:cSld>
+  <p:clrMapOvr>
+    <a:masterClrMapping/>
+  </p:clrMapOvr>
+  <p:transition>
+    <p:fade/>
+  </p:transition>
+</p:sld>
+</file>
+
+<file path=ppt/slides/slide13.xml><?xml version="1.0" encoding="utf-8"?>
+<p:sld xmlns:a="http://schemas.openxmlformats.org/drawingml/2006/main" xmlns:r="http://schemas.openxmlformats.org/officeDocument/2006/relationships" xmlns:p="http://schemas.openxmlformats.org/presentationml/2006/main">
+  <p:cSld>
+    <p:spTree>
+      <p:nvGrpSpPr>
+        <p:cNvPr id="1" name=""/>
+        <p:cNvGrpSpPr/>
+        <p:nvPr/>
+      </p:nvGrpSpPr>
+      <p:grpSpPr>
+        <a:xfrm>
+          <a:off x="0" y="0"/>
+          <a:ext cx="0" cy="0"/>
+          <a:chOff x="0" y="0"/>
+          <a:chExt cx="0" cy="0"/>
+        </a:xfrm>
+      </p:grpSpPr>
+      <p:sp>
+        <p:nvSpPr>
+          <p:cNvPr id="4" name="Заголовок 3"/>
+          <p:cNvSpPr>
+            <a:spLocks noGrp="1"/>
+          </p:cNvSpPr>
+          <p:nvPr>
+            <p:ph type="title"/>
+          </p:nvPr>
+        </p:nvSpPr>
+        <p:spPr/>
+        <p:txBody>
+          <a:bodyPr/>
+          <a:lstStyle/>
+          <a:p>
+            <a:r>
+              <a:rPr lang="ru-RU" dirty="0" smtClean="0"/>
+              <a:t>Контакты</a:t>
+            </a:r>
+            <a:endParaRPr lang="ru-RU" dirty="0"/>
+          </a:p>
+        </p:txBody>
+      </p:sp>
+      <p:sp>
+        <p:nvSpPr>
+          <p:cNvPr id="5" name="Объект 4"/>
+          <p:cNvSpPr>
+            <a:spLocks noGrp="1"/>
+          </p:cNvSpPr>
+          <p:nvPr>
+            <p:ph idx="1"/>
+          </p:nvPr>
+        </p:nvSpPr>
+        <p:spPr/>
+        <p:txBody>
+          <a:bodyPr/>
+          <a:lstStyle/>
+          <a:p>
+            <a:r>
+              <a:rPr lang="ru-RU" dirty="0" smtClean="0"/>
+              <a:t>Дмитрий Сошников</a:t>
+            </a:r>
+          </a:p>
+          <a:p>
+            <a:pPr lvl="1"/>
+            <a:r>
+              <a:rPr lang="en-US" dirty="0" smtClean="0"/>
+              <a:t>Microsoft</a:t>
+            </a:r>
+          </a:p>
+          <a:p>
+            <a:pPr lvl="1"/>
+            <a:r>
+              <a:rPr lang="en-US" dirty="0" smtClean="0"/>
+              <a:t>dmitryso@microsoft.com &amp; @</a:t>
+            </a:r>
+            <a:r>
+              <a:rPr lang="en-US" dirty="0" err="1" smtClean="0"/>
+              <a:t>shwars</a:t>
+            </a:r>
+            <a:r>
+              <a:rPr lang="en-US" dirty="0" smtClean="0"/>
+              <a:t> </a:t>
+            </a:r>
+          </a:p>
+          <a:p>
+            <a:pPr lvl="1"/>
+            <a:r>
+              <a:rPr lang="en-US" dirty="0" smtClean="0"/>
+              <a:t>blogs.msdn.com/</a:t>
+            </a:r>
+            <a:r>
+              <a:rPr lang="en-US" dirty="0" err="1" smtClean="0"/>
+              <a:t>sos</a:t>
+            </a:r>
+            <a:r>
+              <a:rPr lang="en-US" dirty="0" smtClean="0"/>
+              <a:t> &amp; blog.soshnikov.com</a:t>
+            </a:r>
+            <a:endParaRPr lang="ru-RU" dirty="0"/>
+          </a:p>
+        </p:txBody>
+      </p:sp>
+      <p:pic>
+        <p:nvPicPr>
+          <p:cNvPr id="3" name="Рисунок 2"/>
+          <p:cNvPicPr>
+            <a:picLocks noGrp="1" noChangeAspect="1"/>
+          </p:cNvPicPr>
+          <p:nvPr>
+            <p:ph type="pic" sz="quarter" idx="10"/>
+          </p:nvPr>
+        </p:nvPicPr>
+        <p:blipFill>
+          <a:blip r:embed="rId2" cstate="print">
+            <a:extLst>
+              <a:ext uri="{28A0092B-C50C-407E-A947-70E740481C1C}">
+                <a14:useLocalDpi xmlns:a14="http://schemas.microsoft.com/office/drawing/2010/main" val="0"/>
+              </a:ext>
+            </a:extLst>
+          </a:blip>
+          <a:stretch>
+            <a:fillRect/>
+          </a:stretch>
+        </p:blipFill>
+        <p:spPr>
+          <a:xfrm>
+            <a:off x="1229143" y="1747619"/>
+            <a:ext cx="1873714" cy="1922900"/>
+          </a:xfrm>
+        </p:spPr>
+      </p:pic>
+    </p:spTree>
+    <p:extLst>
+      <p:ext uri="{BB962C8B-B14F-4D97-AF65-F5344CB8AC3E}">
+        <p14:creationId xmlns:p14="http://schemas.microsoft.com/office/powerpoint/2010/main" val="422195394"/>
+      </p:ext>
+    </p:extLst>
+  </p:cSld>
+  <p:clrMapOvr>
+    <a:masterClrMapping/>
+  </p:clrMapOvr>
+</p:sld>
+</file>
+
+<file path=ppt/slides/slide14.xml><?xml version="1.0" encoding="utf-8"?>
+<p:sld xmlns:a="http://schemas.openxmlformats.org/drawingml/2006/main" xmlns:r="http://schemas.openxmlformats.org/officeDocument/2006/relationships" xmlns:p="http://schemas.openxmlformats.org/presentationml/2006/main">
+  <p:cSld>
+    <p:spTree>
+      <p:nvGrpSpPr>
+        <p:cNvPr id="1" name=""/>
+        <p:cNvGrpSpPr/>
+        <p:nvPr/>
+      </p:nvGrpSpPr>
+      <p:grpSpPr>
+        <a:xfrm>
+          <a:off x="0" y="0"/>
+          <a:ext cx="0" cy="0"/>
+          <a:chOff x="0" y="0"/>
+          <a:chExt cx="0" cy="0"/>
+        </a:xfrm>
+      </p:grpSpPr>
+    </p:spTree>
+    <p:extLst>
+      <p:ext uri="{BB962C8B-B14F-4D97-AF65-F5344CB8AC3E}">
+        <p14:creationId xmlns:p14="http://schemas.microsoft.com/office/powerpoint/2010/main" val="2717568389"/>
+      </p:ext>
+    </p:extLst>
+  </p:cSld>
+  <p:clrMapOvr>
+    <a:masterClrMapping/>
+  </p:clrMapOvr>
+  <mc:AlternateContent xmlns:mc="http://schemas.openxmlformats.org/markup-compatibility/2006" xmlns:p14="http://schemas.microsoft.com/office/powerpoint/2010/main">
+    <mc:Choice Requires="p14">
+      <p:transition p14:dur="0"/>
+    </mc:Choice>
+    <mc:Fallback xmlns="">
+      <p:transition/>
+    </mc:Fallback>
+  </mc:AlternateContent>
+</p:sld>
+</file>
+
 <file path=ppt/slides/slide2.xml><?xml version="1.0" encoding="utf-8"?>
+<p:sld xmlns:a="http://schemas.openxmlformats.org/drawingml/2006/main" xmlns:r="http://schemas.openxmlformats.org/officeDocument/2006/relationships" xmlns:p="http://schemas.openxmlformats.org/presentationml/2006/main">
+  <p:cSld>
+    <p:spTree>
+      <p:nvGrpSpPr>
+        <p:cNvPr id="1" name=""/>
+        <p:cNvGrpSpPr/>
+        <p:nvPr/>
+      </p:nvGrpSpPr>
+      <p:grpSpPr>
+        <a:xfrm>
+          <a:off x="0" y="0"/>
+          <a:ext cx="0" cy="0"/>
+          <a:chOff x="0" y="0"/>
+          <a:chExt cx="0" cy="0"/>
+        </a:xfrm>
+      </p:grpSpPr>
+      <p:sp>
+        <p:nvSpPr>
+          <p:cNvPr id="4" name="Заголовок 3"/>
+          <p:cNvSpPr>
+            <a:spLocks noGrp="1"/>
+          </p:cNvSpPr>
+          <p:nvPr>
+            <p:ph type="title"/>
+          </p:nvPr>
+        </p:nvSpPr>
+        <p:spPr>
+          <a:xfrm>
+            <a:off x="516000" y="369000"/>
+            <a:ext cx="10837800" cy="720000"/>
+          </a:xfrm>
+        </p:spPr>
+        <p:txBody>
+          <a:bodyPr/>
+          <a:lstStyle/>
+          <a:p>
+            <a:r>
+              <a:rPr lang="ru-RU" dirty="0" smtClean="0"/>
+              <a:t>Синтаксис </a:t>
+            </a:r>
+            <a:r>
+              <a:rPr lang="en-US" dirty="0" smtClean="0"/>
+              <a:t>XAML</a:t>
+            </a:r>
+            <a:endParaRPr lang="ru-RU" dirty="0"/>
+          </a:p>
+        </p:txBody>
+      </p:sp>
+      <p:sp>
+        <p:nvSpPr>
+          <p:cNvPr id="5" name="Объект 4"/>
+          <p:cNvSpPr>
+            <a:spLocks noGrp="1"/>
+          </p:cNvSpPr>
+          <p:nvPr>
+            <p:ph idx="1"/>
+          </p:nvPr>
+        </p:nvSpPr>
+        <p:spPr>
+          <a:xfrm>
+            <a:off x="527682" y="1895043"/>
+            <a:ext cx="7020000" cy="540000"/>
+          </a:xfrm>
+        </p:spPr>
+        <p:txBody>
+          <a:bodyPr>
+            <a:normAutofit/>
+          </a:bodyPr>
+          <a:lstStyle/>
+          <a:p>
+            <a:r>
+              <a:rPr lang="en-US" sz="2400" dirty="0" smtClean="0"/>
+              <a:t>&lt;</a:t>
+            </a:r>
+            <a:r>
+              <a:rPr lang="en-US" sz="2400" dirty="0" err="1" smtClean="0"/>
+              <a:t>TextBlock</a:t>
+            </a:r>
+            <a:r>
+              <a:rPr lang="en-US" sz="2400" dirty="0"/>
+              <a:t> </a:t>
+            </a:r>
+            <a:r>
+              <a:rPr lang="en-US" sz="2400" dirty="0" smtClean="0"/>
+              <a:t>Text=“Hello, World!”/&gt;</a:t>
+            </a:r>
+            <a:endParaRPr lang="ru-RU" sz="2400" dirty="0"/>
+          </a:p>
+        </p:txBody>
+      </p:sp>
+      <p:sp>
+        <p:nvSpPr>
+          <p:cNvPr id="6" name="Объект 4"/>
+          <p:cNvSpPr txBox="1">
+            <a:spLocks/>
+          </p:cNvSpPr>
+          <p:nvPr/>
+        </p:nvSpPr>
+        <p:spPr>
+          <a:xfrm>
+            <a:off x="514554" y="3270075"/>
+            <a:ext cx="7020000" cy="540000"/>
+          </a:xfrm>
+          <a:prstGeom prst="rect">
+            <a:avLst/>
+          </a:prstGeom>
+          <a:gradFill flip="none" rotWithShape="1">
+            <a:gsLst>
+              <a:gs pos="1000">
+                <a:schemeClr val="accent4"/>
+              </a:gs>
+              <a:gs pos="1000">
+                <a:schemeClr val="bg1">
+                  <a:alpha val="99000"/>
+                </a:schemeClr>
+              </a:gs>
+            </a:gsLst>
+            <a:lin ang="0" scaled="1"/>
+            <a:tileRect/>
+          </a:gradFill>
+          <a:ln>
+            <a:noFill/>
+          </a:ln>
+        </p:spPr>
+        <p:txBody>
+          <a:bodyPr vert="horz" lIns="180000" tIns="45720" rIns="36000" bIns="45720" rtlCol="0">
+            <a:normAutofit/>
+          </a:bodyPr>
+          <a:lstStyle>
+            <a:lvl1pPr marL="0" indent="0" algn="l" defTabSz="914400" rtl="0" eaLnBrk="1" latinLnBrk="0" hangingPunct="1">
+              <a:lnSpc>
+                <a:spcPct val="90000"/>
+              </a:lnSpc>
+              <a:spcBef>
+                <a:spcPts val="600"/>
+              </a:spcBef>
+              <a:buFont typeface="Arial" panose="020B0604020202020204" pitchFamily="34" charset="0"/>
+              <a:buNone/>
+              <a:defRPr sz="1800" kern="1200" baseline="0">
+                <a:solidFill>
+                  <a:schemeClr val="tx2"/>
+                </a:solidFill>
+                <a:latin typeface="Consolas" panose="020B0609020204030204" pitchFamily="49" charset="0"/>
+                <a:ea typeface="+mn-ea"/>
+                <a:cs typeface="Consolas" panose="020B0609020204030204" pitchFamily="49" charset="0"/>
+              </a:defRPr>
+            </a:lvl1pPr>
+            <a:lvl2pPr marL="360363" indent="0" algn="l" defTabSz="914400" rtl="0" eaLnBrk="1" latinLnBrk="0" hangingPunct="1">
+              <a:lnSpc>
+                <a:spcPct val="90000"/>
+              </a:lnSpc>
+              <a:spcBef>
+                <a:spcPts val="600"/>
+              </a:spcBef>
+              <a:buFont typeface="Arial" panose="020B0604020202020204" pitchFamily="34" charset="0"/>
+              <a:buNone/>
+              <a:defRPr sz="1800" kern="1200">
+                <a:solidFill>
+                  <a:schemeClr val="tx2"/>
+                </a:solidFill>
+                <a:latin typeface="Consolas" panose="020B0609020204030204" pitchFamily="49" charset="0"/>
+                <a:ea typeface="+mn-ea"/>
+                <a:cs typeface="Consolas" panose="020B0609020204030204" pitchFamily="49" charset="0"/>
+              </a:defRPr>
+            </a:lvl2pPr>
+            <a:lvl3pPr marL="719138" indent="0" algn="l" defTabSz="914400" rtl="0" eaLnBrk="1" latinLnBrk="0" hangingPunct="1">
+              <a:lnSpc>
+                <a:spcPct val="90000"/>
+              </a:lnSpc>
+              <a:spcBef>
+                <a:spcPts val="600"/>
+              </a:spcBef>
+              <a:buFont typeface="Wingdings" panose="05000000000000000000" pitchFamily="2" charset="2"/>
+              <a:buNone/>
+              <a:defRPr sz="1800" kern="1200">
+                <a:solidFill>
+                  <a:schemeClr val="tx2"/>
+                </a:solidFill>
+                <a:latin typeface="Consolas" panose="020B0609020204030204" pitchFamily="49" charset="0"/>
+                <a:ea typeface="+mn-ea"/>
+                <a:cs typeface="Consolas" panose="020B0609020204030204" pitchFamily="49" charset="0"/>
+              </a:defRPr>
+            </a:lvl3pPr>
+            <a:lvl4pPr marL="1079500" indent="0" algn="l" defTabSz="914400" rtl="0" eaLnBrk="1" latinLnBrk="0" hangingPunct="1">
+              <a:lnSpc>
+                <a:spcPct val="90000"/>
+              </a:lnSpc>
+              <a:spcBef>
+                <a:spcPts val="600"/>
+              </a:spcBef>
+              <a:buFont typeface="Wingdings" panose="05000000000000000000" pitchFamily="2" charset="2"/>
+              <a:buNone/>
+              <a:defRPr sz="1800" kern="1200">
+                <a:solidFill>
+                  <a:schemeClr val="tx1"/>
+                </a:solidFill>
+                <a:latin typeface="Consolas" panose="020B0609020204030204" pitchFamily="49" charset="0"/>
+                <a:ea typeface="+mn-ea"/>
+                <a:cs typeface="Consolas" panose="020B0609020204030204" pitchFamily="49" charset="0"/>
+              </a:defRPr>
+            </a:lvl4pPr>
+            <a:lvl5pPr marL="1439863" indent="0" algn="l" defTabSz="914400" rtl="0" eaLnBrk="1" latinLnBrk="0" hangingPunct="1">
+              <a:lnSpc>
+                <a:spcPct val="90000"/>
+              </a:lnSpc>
+              <a:spcBef>
+                <a:spcPts val="600"/>
+              </a:spcBef>
+              <a:buFont typeface="Wingdings" panose="05000000000000000000" pitchFamily="2" charset="2"/>
+              <a:buNone/>
+              <a:defRPr sz="1800" kern="1200">
+                <a:solidFill>
+                  <a:schemeClr val="tx1"/>
+                </a:solidFill>
+                <a:latin typeface="Consolas" panose="020B0609020204030204" pitchFamily="49" charset="0"/>
+                <a:ea typeface="+mn-ea"/>
+                <a:cs typeface="Consolas" panose="020B0609020204030204" pitchFamily="49" charset="0"/>
+              </a:defRPr>
+            </a:lvl5pPr>
+            <a:lvl6pPr marL="2514600" indent="-228600" algn="l" defTabSz="914400" rtl="0" eaLnBrk="1" latinLnBrk="0" hangingPunct="1">
+              <a:lnSpc>
+                <a:spcPct val="90000"/>
+              </a:lnSpc>
+              <a:spcBef>
+                <a:spcPts val="500"/>
+              </a:spcBef>
+              <a:buFont typeface="Arial" panose="020B0604020202020204" pitchFamily="34" charset="0"/>
+              <a:buChar char="•"/>
+              <a:defRPr sz="1800" kern="1200">
+                <a:solidFill>
+                  <a:schemeClr val="tx1"/>
+                </a:solidFill>
+                <a:latin typeface="+mn-lt"/>
+                <a:ea typeface="+mn-ea"/>
+                <a:cs typeface="+mn-cs"/>
+              </a:defRPr>
+            </a:lvl6pPr>
+            <a:lvl7pPr marL="2971800" indent="-228600" algn="l" defTabSz="914400" rtl="0" eaLnBrk="1" latinLnBrk="0" hangingPunct="1">
+              <a:lnSpc>
+                <a:spcPct val="90000"/>
+              </a:lnSpc>
+              <a:spcBef>
+                <a:spcPts val="500"/>
+              </a:spcBef>
+              <a:buFont typeface="Arial" panose="020B0604020202020204" pitchFamily="34" charset="0"/>
+              <a:buChar char="•"/>
+              <a:defRPr sz="1800" kern="1200">
+                <a:solidFill>
+                  <a:schemeClr val="tx1"/>
+                </a:solidFill>
+                <a:latin typeface="+mn-lt"/>
+                <a:ea typeface="+mn-ea"/>
+                <a:cs typeface="+mn-cs"/>
+              </a:defRPr>
+            </a:lvl7pPr>
+            <a:lvl8pPr marL="3429000" indent="-228600" algn="l" defTabSz="914400" rtl="0" eaLnBrk="1" latinLnBrk="0" hangingPunct="1">
+              <a:lnSpc>
+                <a:spcPct val="90000"/>
+              </a:lnSpc>
+              <a:spcBef>
+                <a:spcPts val="500"/>
+              </a:spcBef>
+              <a:buFont typeface="Arial" panose="020B0604020202020204" pitchFamily="34" charset="0"/>
+              <a:buChar char="•"/>
+              <a:defRPr sz="1800" kern="1200">
+                <a:solidFill>
+                  <a:schemeClr val="tx1"/>
+                </a:solidFill>
+                <a:latin typeface="+mn-lt"/>
+                <a:ea typeface="+mn-ea"/>
+                <a:cs typeface="+mn-cs"/>
+              </a:defRPr>
+            </a:lvl8pPr>
+            <a:lvl9pPr marL="3886200" indent="-228600" algn="l" defTabSz="914400" rtl="0" eaLnBrk="1" latinLnBrk="0" hangingPunct="1">
+              <a:lnSpc>
+                <a:spcPct val="90000"/>
+              </a:lnSpc>
+              <a:spcBef>
+                <a:spcPts val="500"/>
+              </a:spcBef>
+              <a:buFont typeface="Arial" panose="020B0604020202020204" pitchFamily="34" charset="0"/>
+              <a:buChar char="•"/>
+              <a:defRPr sz="1800" kern="1200">
+                <a:solidFill>
+                  <a:schemeClr val="tx1"/>
+                </a:solidFill>
+                <a:latin typeface="+mn-lt"/>
+                <a:ea typeface="+mn-ea"/>
+                <a:cs typeface="+mn-cs"/>
+              </a:defRPr>
+            </a:lvl9pPr>
+          </a:lstStyle>
+          <a:p>
+            <a:r>
+              <a:rPr lang="en-US" sz="2400" dirty="0" smtClean="0"/>
+              <a:t>&lt;</a:t>
+            </a:r>
+            <a:r>
+              <a:rPr lang="en-US" sz="2400" dirty="0" err="1" smtClean="0"/>
+              <a:t>TextBlock</a:t>
+            </a:r>
+            <a:r>
+              <a:rPr lang="en-US" sz="2400" dirty="0"/>
+              <a:t>&gt;</a:t>
+            </a:r>
+            <a:r>
+              <a:rPr lang="en-US" sz="2400" dirty="0" smtClean="0"/>
+              <a:t>Hello, World!&lt;/</a:t>
+            </a:r>
+            <a:r>
+              <a:rPr lang="en-US" sz="2400" dirty="0" err="1" smtClean="0"/>
+              <a:t>TextBlock</a:t>
+            </a:r>
+            <a:r>
+              <a:rPr lang="en-US" sz="2400" dirty="0" smtClean="0"/>
+              <a:t>&gt;</a:t>
+            </a:r>
+            <a:endParaRPr lang="ru-RU" sz="2400" dirty="0"/>
+          </a:p>
+        </p:txBody>
+      </p:sp>
+      <p:sp>
+        <p:nvSpPr>
+          <p:cNvPr id="7" name="Объект 4"/>
+          <p:cNvSpPr txBox="1">
+            <a:spLocks/>
+          </p:cNvSpPr>
+          <p:nvPr/>
+        </p:nvSpPr>
+        <p:spPr>
+          <a:xfrm>
+            <a:off x="516000" y="4689000"/>
+            <a:ext cx="7020000" cy="1980000"/>
+          </a:xfrm>
+          <a:prstGeom prst="rect">
+            <a:avLst/>
+          </a:prstGeom>
+          <a:gradFill flip="none" rotWithShape="1">
+            <a:gsLst>
+              <a:gs pos="1000">
+                <a:schemeClr val="accent4"/>
+              </a:gs>
+              <a:gs pos="1000">
+                <a:schemeClr val="bg1">
+                  <a:alpha val="99000"/>
+                </a:schemeClr>
+              </a:gs>
+            </a:gsLst>
+            <a:lin ang="0" scaled="1"/>
+            <a:tileRect/>
+          </a:gradFill>
+          <a:ln>
+            <a:noFill/>
+          </a:ln>
+        </p:spPr>
+        <p:txBody>
+          <a:bodyPr vert="horz" lIns="180000" tIns="45720" rIns="36000" bIns="45720" rtlCol="0">
+            <a:normAutofit lnSpcReduction="10000"/>
+          </a:bodyPr>
+          <a:lstStyle>
+            <a:lvl1pPr marL="0" indent="0" algn="l" defTabSz="914400" rtl="0" eaLnBrk="1" latinLnBrk="0" hangingPunct="1">
+              <a:lnSpc>
+                <a:spcPct val="90000"/>
+              </a:lnSpc>
+              <a:spcBef>
+                <a:spcPts val="600"/>
+              </a:spcBef>
+              <a:buFont typeface="Arial" panose="020B0604020202020204" pitchFamily="34" charset="0"/>
+              <a:buNone/>
+              <a:defRPr sz="1800" kern="1200" baseline="0">
+                <a:solidFill>
+                  <a:schemeClr val="tx2"/>
+                </a:solidFill>
+                <a:latin typeface="Consolas" panose="020B0609020204030204" pitchFamily="49" charset="0"/>
+                <a:ea typeface="+mn-ea"/>
+                <a:cs typeface="Consolas" panose="020B0609020204030204" pitchFamily="49" charset="0"/>
+              </a:defRPr>
+            </a:lvl1pPr>
+            <a:lvl2pPr marL="360363" indent="0" algn="l" defTabSz="914400" rtl="0" eaLnBrk="1" latinLnBrk="0" hangingPunct="1">
+              <a:lnSpc>
+                <a:spcPct val="90000"/>
+              </a:lnSpc>
+              <a:spcBef>
+                <a:spcPts val="600"/>
+              </a:spcBef>
+              <a:buFont typeface="Arial" panose="020B0604020202020204" pitchFamily="34" charset="0"/>
+              <a:buNone/>
+              <a:defRPr sz="1800" kern="1200">
+                <a:solidFill>
+                  <a:schemeClr val="tx2"/>
+                </a:solidFill>
+                <a:latin typeface="Consolas" panose="020B0609020204030204" pitchFamily="49" charset="0"/>
+                <a:ea typeface="+mn-ea"/>
+                <a:cs typeface="Consolas" panose="020B0609020204030204" pitchFamily="49" charset="0"/>
+              </a:defRPr>
+            </a:lvl2pPr>
+            <a:lvl3pPr marL="719138" indent="0" algn="l" defTabSz="914400" rtl="0" eaLnBrk="1" latinLnBrk="0" hangingPunct="1">
+              <a:lnSpc>
+                <a:spcPct val="90000"/>
+              </a:lnSpc>
+              <a:spcBef>
+                <a:spcPts val="600"/>
+              </a:spcBef>
+              <a:buFont typeface="Wingdings" panose="05000000000000000000" pitchFamily="2" charset="2"/>
+              <a:buNone/>
+              <a:defRPr sz="1800" kern="1200">
+                <a:solidFill>
+                  <a:schemeClr val="tx2"/>
+                </a:solidFill>
+                <a:latin typeface="Consolas" panose="020B0609020204030204" pitchFamily="49" charset="0"/>
+                <a:ea typeface="+mn-ea"/>
+                <a:cs typeface="Consolas" panose="020B0609020204030204" pitchFamily="49" charset="0"/>
+              </a:defRPr>
+            </a:lvl3pPr>
+            <a:lvl4pPr marL="1079500" indent="0" algn="l" defTabSz="914400" rtl="0" eaLnBrk="1" latinLnBrk="0" hangingPunct="1">
+              <a:lnSpc>
+                <a:spcPct val="90000"/>
+              </a:lnSpc>
+              <a:spcBef>
+                <a:spcPts val="600"/>
+              </a:spcBef>
+              <a:buFont typeface="Wingdings" panose="05000000000000000000" pitchFamily="2" charset="2"/>
+              <a:buNone/>
+              <a:defRPr sz="1800" kern="1200">
+                <a:solidFill>
+                  <a:schemeClr val="tx1"/>
+                </a:solidFill>
+                <a:latin typeface="Consolas" panose="020B0609020204030204" pitchFamily="49" charset="0"/>
+                <a:ea typeface="+mn-ea"/>
+                <a:cs typeface="Consolas" panose="020B0609020204030204" pitchFamily="49" charset="0"/>
+              </a:defRPr>
+            </a:lvl4pPr>
+            <a:lvl5pPr marL="1439863" indent="0" algn="l" defTabSz="914400" rtl="0" eaLnBrk="1" latinLnBrk="0" hangingPunct="1">
+              <a:lnSpc>
+                <a:spcPct val="90000"/>
+              </a:lnSpc>
+              <a:spcBef>
+                <a:spcPts val="600"/>
+              </a:spcBef>
+              <a:buFont typeface="Wingdings" panose="05000000000000000000" pitchFamily="2" charset="2"/>
+              <a:buNone/>
+              <a:defRPr sz="1800" kern="1200">
+                <a:solidFill>
+                  <a:schemeClr val="tx1"/>
+                </a:solidFill>
+                <a:latin typeface="Consolas" panose="020B0609020204030204" pitchFamily="49" charset="0"/>
+                <a:ea typeface="+mn-ea"/>
+                <a:cs typeface="Consolas" panose="020B0609020204030204" pitchFamily="49" charset="0"/>
+              </a:defRPr>
+            </a:lvl5pPr>
+            <a:lvl6pPr marL="2514600" indent="-228600" algn="l" defTabSz="914400" rtl="0" eaLnBrk="1" latinLnBrk="0" hangingPunct="1">
+              <a:lnSpc>
+                <a:spcPct val="90000"/>
+              </a:lnSpc>
+              <a:spcBef>
+                <a:spcPts val="500"/>
+              </a:spcBef>
+              <a:buFont typeface="Arial" panose="020B0604020202020204" pitchFamily="34" charset="0"/>
+              <a:buChar char="•"/>
+              <a:defRPr sz="1800" kern="1200">
+                <a:solidFill>
+                  <a:schemeClr val="tx1"/>
+                </a:solidFill>
+                <a:latin typeface="+mn-lt"/>
+                <a:ea typeface="+mn-ea"/>
+                <a:cs typeface="+mn-cs"/>
+              </a:defRPr>
+            </a:lvl6pPr>
+            <a:lvl7pPr marL="2971800" indent="-228600" algn="l" defTabSz="914400" rtl="0" eaLnBrk="1" latinLnBrk="0" hangingPunct="1">
+              <a:lnSpc>
+                <a:spcPct val="90000"/>
+              </a:lnSpc>
+              <a:spcBef>
+                <a:spcPts val="500"/>
+              </a:spcBef>
+              <a:buFont typeface="Arial" panose="020B0604020202020204" pitchFamily="34" charset="0"/>
+              <a:buChar char="•"/>
+              <a:defRPr sz="1800" kern="1200">
+                <a:solidFill>
+                  <a:schemeClr val="tx1"/>
+                </a:solidFill>
+                <a:latin typeface="+mn-lt"/>
+                <a:ea typeface="+mn-ea"/>
+                <a:cs typeface="+mn-cs"/>
+              </a:defRPr>
+            </a:lvl7pPr>
+            <a:lvl8pPr marL="3429000" indent="-228600" algn="l" defTabSz="914400" rtl="0" eaLnBrk="1" latinLnBrk="0" hangingPunct="1">
+              <a:lnSpc>
+                <a:spcPct val="90000"/>
+              </a:lnSpc>
+              <a:spcBef>
+                <a:spcPts val="500"/>
+              </a:spcBef>
+              <a:buFont typeface="Arial" panose="020B0604020202020204" pitchFamily="34" charset="0"/>
+              <a:buChar char="•"/>
+              <a:defRPr sz="1800" kern="1200">
+                <a:solidFill>
+                  <a:schemeClr val="tx1"/>
+                </a:solidFill>
+                <a:latin typeface="+mn-lt"/>
+                <a:ea typeface="+mn-ea"/>
+                <a:cs typeface="+mn-cs"/>
+              </a:defRPr>
+            </a:lvl8pPr>
+            <a:lvl9pPr marL="3886200" indent="-228600" algn="l" defTabSz="914400" rtl="0" eaLnBrk="1" latinLnBrk="0" hangingPunct="1">
+              <a:lnSpc>
+                <a:spcPct val="90000"/>
+              </a:lnSpc>
+              <a:spcBef>
+                <a:spcPts val="500"/>
+              </a:spcBef>
+              <a:buFont typeface="Arial" panose="020B0604020202020204" pitchFamily="34" charset="0"/>
+              <a:buChar char="•"/>
+              <a:defRPr sz="1800" kern="1200">
+                <a:solidFill>
+                  <a:schemeClr val="tx1"/>
+                </a:solidFill>
+                <a:latin typeface="+mn-lt"/>
+                <a:ea typeface="+mn-ea"/>
+                <a:cs typeface="+mn-cs"/>
+              </a:defRPr>
+            </a:lvl9pPr>
+          </a:lstStyle>
+          <a:p>
+            <a:r>
+              <a:rPr lang="en-US" sz="2400" dirty="0" smtClean="0"/>
+              <a:t>&lt;</a:t>
+            </a:r>
+            <a:r>
+              <a:rPr lang="en-US" sz="2400" dirty="0" err="1" smtClean="0"/>
+              <a:t>TextBlock</a:t>
+            </a:r>
+            <a:r>
+              <a:rPr lang="en-US" sz="2400" dirty="0" smtClean="0"/>
+              <a:t>&gt;</a:t>
+            </a:r>
+            <a:endParaRPr lang="ru-RU" sz="2400" dirty="0" smtClean="0"/>
+          </a:p>
+          <a:p>
+            <a:r>
+              <a:rPr lang="ru-RU" sz="2400" dirty="0"/>
+              <a:t>	</a:t>
+            </a:r>
+            <a:r>
+              <a:rPr lang="en-US" sz="2400" dirty="0" smtClean="0"/>
+              <a:t>&lt;</a:t>
+            </a:r>
+            <a:r>
+              <a:rPr lang="en-US" sz="2400" dirty="0" err="1" smtClean="0"/>
+              <a:t>TextBlock.Text</a:t>
+            </a:r>
+            <a:r>
+              <a:rPr lang="en-US" sz="2400" dirty="0" smtClean="0"/>
+              <a:t>&gt;</a:t>
+            </a:r>
+          </a:p>
+          <a:p>
+            <a:r>
+              <a:rPr lang="en-US" sz="2400" dirty="0" smtClean="0"/>
+              <a:t>		Hello</a:t>
+            </a:r>
+            <a:r>
+              <a:rPr lang="en-US" sz="2400" dirty="0"/>
+              <a:t>, World</a:t>
+            </a:r>
+            <a:r>
+              <a:rPr lang="en-US" sz="2400" dirty="0" smtClean="0"/>
+              <a:t>!</a:t>
+            </a:r>
+          </a:p>
+          <a:p>
+            <a:r>
+              <a:rPr lang="en-US" sz="2400" dirty="0"/>
+              <a:t>	</a:t>
+            </a:r>
+            <a:r>
+              <a:rPr lang="en-US" sz="2400" dirty="0" smtClean="0"/>
+              <a:t>&lt;/</a:t>
+            </a:r>
+            <a:r>
+              <a:rPr lang="en-US" sz="2400" dirty="0" err="1" smtClean="0"/>
+              <a:t>TextBlock.Text</a:t>
+            </a:r>
+            <a:r>
+              <a:rPr lang="en-US" sz="2400" dirty="0"/>
+              <a:t>&gt;</a:t>
+            </a:r>
+            <a:endParaRPr lang="ru-RU" sz="2400" dirty="0" smtClean="0"/>
+          </a:p>
+          <a:p>
+            <a:r>
+              <a:rPr lang="en-US" sz="2400" dirty="0" smtClean="0"/>
+              <a:t>&lt;/</a:t>
+            </a:r>
+            <a:r>
+              <a:rPr lang="en-US" sz="2400" dirty="0" err="1" smtClean="0"/>
+              <a:t>TextBlock</a:t>
+            </a:r>
+            <a:r>
+              <a:rPr lang="en-US" sz="2400" dirty="0" smtClean="0"/>
+              <a:t>&gt;</a:t>
+            </a:r>
+            <a:endParaRPr lang="ru-RU" sz="2400" dirty="0"/>
+          </a:p>
+        </p:txBody>
+      </p:sp>
+      <p:sp>
+        <p:nvSpPr>
+          <p:cNvPr id="8" name="TextBox 7"/>
+          <p:cNvSpPr txBox="1"/>
+          <p:nvPr/>
+        </p:nvSpPr>
+        <p:spPr>
+          <a:xfrm>
+            <a:off x="347682" y="1427414"/>
+            <a:ext cx="2742867" cy="461665"/>
+          </a:xfrm>
+          <a:prstGeom prst="rect">
+            <a:avLst/>
+          </a:prstGeom>
+          <a:noFill/>
+        </p:spPr>
+        <p:txBody>
+          <a:bodyPr wrap="none" rtlCol="0">
+            <a:spAutoFit/>
+          </a:bodyPr>
+          <a:lstStyle/>
+          <a:p>
+            <a:r>
+              <a:rPr lang="ru-RU" sz="2400" dirty="0" smtClean="0"/>
+              <a:t>Теги с атрибутами</a:t>
+            </a:r>
+            <a:endParaRPr lang="ru-RU" sz="2400" dirty="0"/>
+          </a:p>
+        </p:txBody>
+      </p:sp>
+      <p:sp>
+        <p:nvSpPr>
+          <p:cNvPr id="9" name="TextBox 8"/>
+          <p:cNvSpPr txBox="1"/>
+          <p:nvPr/>
+        </p:nvSpPr>
+        <p:spPr>
+          <a:xfrm>
+            <a:off x="347681" y="2743267"/>
+            <a:ext cx="3505832" cy="461665"/>
+          </a:xfrm>
+          <a:prstGeom prst="rect">
+            <a:avLst/>
+          </a:prstGeom>
+          <a:noFill/>
+        </p:spPr>
+        <p:txBody>
+          <a:bodyPr wrap="none" rtlCol="0">
+            <a:spAutoFit/>
+          </a:bodyPr>
+          <a:lstStyle/>
+          <a:p>
+            <a:r>
+              <a:rPr lang="ru-RU" sz="2400" dirty="0" smtClean="0"/>
+              <a:t>Атрибут по умолчанию</a:t>
+            </a:r>
+            <a:endParaRPr lang="ru-RU" sz="2400" dirty="0"/>
+          </a:p>
+        </p:txBody>
+      </p:sp>
+      <p:sp>
+        <p:nvSpPr>
+          <p:cNvPr id="10" name="TextBox 9"/>
+          <p:cNvSpPr txBox="1"/>
+          <p:nvPr/>
+        </p:nvSpPr>
+        <p:spPr>
+          <a:xfrm>
+            <a:off x="347681" y="4087952"/>
+            <a:ext cx="7208384" cy="461665"/>
+          </a:xfrm>
+          <a:prstGeom prst="rect">
+            <a:avLst/>
+          </a:prstGeom>
+          <a:noFill/>
+        </p:spPr>
+        <p:txBody>
+          <a:bodyPr wrap="none" rtlCol="0">
+            <a:spAutoFit/>
+          </a:bodyPr>
+          <a:lstStyle/>
+          <a:p>
+            <a:r>
+              <a:rPr lang="ru-RU" sz="2400" dirty="0" smtClean="0"/>
+              <a:t>Подробное задание атрибута </a:t>
+            </a:r>
+            <a:r>
+              <a:rPr lang="ru-RU" sz="1600" dirty="0" smtClean="0"/>
+              <a:t>(могут быть вложенные теги)</a:t>
+            </a:r>
+            <a:endParaRPr lang="ru-RU" sz="2400" dirty="0"/>
+          </a:p>
+        </p:txBody>
+      </p:sp>
+    </p:spTree>
+    <p:extLst>
+      <p:ext uri="{BB962C8B-B14F-4D97-AF65-F5344CB8AC3E}">
+        <p14:creationId xmlns:p14="http://schemas.microsoft.com/office/powerpoint/2010/main" val="650931155"/>
+      </p:ext>
+    </p:extLst>
+  </p:cSld>
+  <p:clrMapOvr>
+    <a:masterClrMapping/>
+  </p:clrMapOvr>
+  <p:timing>
+    <p:tnLst>
+      <p:par>
+        <p:cTn id="1" dur="indefinite" restart="never" nodeType="tmRoot">
+          <p:childTnLst>
+            <p:seq concurrent="1" nextAc="seek">
+              <p:cTn id="2" dur="indefinite" nodeType="mainSeq">
+                <p:childTnLst>
+                  <p:par>
+                    <p:cTn id="3" fill="hold">
+                      <p:stCondLst>
+                        <p:cond delay="indefinite"/>
+                      </p:stCondLst>
+                      <p:childTnLst>
+                        <p:par>
+                          <p:cTn id="4" fill="hold">
+                            <p:stCondLst>
+                              <p:cond delay="0"/>
+                            </p:stCondLst>
+                            <p:childTnLst>
+                              <p:par>
+                                <p:cTn id="5" presetID="10" presetClass="entr" presetSubtype="0" fill="hold" grpId="0" nodeType="clickEffect">
+                                  <p:stCondLst>
+                                    <p:cond delay="0"/>
+                                  </p:stCondLst>
+                                  <p:childTnLst>
+                                    <p:set>
+                                      <p:cBhvr>
+                                        <p:cTn id="6" dur="1" fill="hold">
+                                          <p:stCondLst>
+                                            <p:cond delay="0"/>
+                                          </p:stCondLst>
+                                        </p:cTn>
+                                        <p:tgtEl>
+                                          <p:spTgt spid="6"/>
+                                        </p:tgtEl>
+                                        <p:attrNameLst>
+                                          <p:attrName>style.visibility</p:attrName>
+                                        </p:attrNameLst>
+                                      </p:cBhvr>
+                                      <p:to>
+                                        <p:strVal val="visible"/>
+                                      </p:to>
+                                    </p:set>
+                                    <p:animEffect transition="in" filter="fade">
+                                      <p:cBhvr>
+                                        <p:cTn id="7" dur="500"/>
+                                        <p:tgtEl>
+                                          <p:spTgt spid="6"/>
+                                        </p:tgtEl>
+                                      </p:cBhvr>
+                                    </p:animEffect>
+                                  </p:childTnLst>
+                                </p:cTn>
+                              </p:par>
+                              <p:par>
+                                <p:cTn id="8" presetID="10" presetClass="entr" presetSubtype="0" fill="hold" grpId="0" nodeType="withEffect">
+                                  <p:stCondLst>
+                                    <p:cond delay="0"/>
+                                  </p:stCondLst>
+                                  <p:childTnLst>
+                                    <p:set>
+                                      <p:cBhvr>
+                                        <p:cTn id="9" dur="1" fill="hold">
+                                          <p:stCondLst>
+                                            <p:cond delay="0"/>
+                                          </p:stCondLst>
+                                        </p:cTn>
+                                        <p:tgtEl>
+                                          <p:spTgt spid="9"/>
+                                        </p:tgtEl>
+                                        <p:attrNameLst>
+                                          <p:attrName>style.visibility</p:attrName>
+                                        </p:attrNameLst>
+                                      </p:cBhvr>
+                                      <p:to>
+                                        <p:strVal val="visible"/>
+                                      </p:to>
+                                    </p:set>
+                                    <p:animEffect transition="in" filter="fade">
+                                      <p:cBhvr>
+                                        <p:cTn id="10" dur="500"/>
+                                        <p:tgtEl>
+                                          <p:spTgt spid="9"/>
+                                        </p:tgtEl>
+                                      </p:cBhvr>
+                                    </p:animEffect>
+                                  </p:childTnLst>
+                                </p:cTn>
+                              </p:par>
+                            </p:childTnLst>
+                          </p:cTn>
+                        </p:par>
+                      </p:childTnLst>
+                    </p:cTn>
+                  </p:par>
+                  <p:par>
+                    <p:cTn id="11" fill="hold">
+                      <p:stCondLst>
+                        <p:cond delay="indefinite"/>
+                      </p:stCondLst>
+                      <p:childTnLst>
+                        <p:par>
+                          <p:cTn id="12" fill="hold">
+                            <p:stCondLst>
+                              <p:cond delay="0"/>
+                            </p:stCondLst>
+                            <p:childTnLst>
+                              <p:par>
+                                <p:cTn id="13" presetID="10" presetClass="entr" presetSubtype="0" fill="hold" grpId="0" nodeType="clickEffect">
+                                  <p:stCondLst>
+                                    <p:cond delay="0"/>
+                                  </p:stCondLst>
+                                  <p:childTnLst>
+                                    <p:set>
+                                      <p:cBhvr>
+                                        <p:cTn id="14" dur="1" fill="hold">
+                                          <p:stCondLst>
+                                            <p:cond delay="0"/>
+                                          </p:stCondLst>
+                                        </p:cTn>
+                                        <p:tgtEl>
+                                          <p:spTgt spid="7"/>
+                                        </p:tgtEl>
+                                        <p:attrNameLst>
+                                          <p:attrName>style.visibility</p:attrName>
+                                        </p:attrNameLst>
+                                      </p:cBhvr>
+                                      <p:to>
+                                        <p:strVal val="visible"/>
+                                      </p:to>
+                                    </p:set>
+                                    <p:animEffect transition="in" filter="fade">
+                                      <p:cBhvr>
+                                        <p:cTn id="15" dur="500"/>
+                                        <p:tgtEl>
+                                          <p:spTgt spid="7"/>
+                                        </p:tgtEl>
+                                      </p:cBhvr>
+                                    </p:animEffect>
+                                  </p:childTnLst>
+                                </p:cTn>
+                              </p:par>
+                              <p:par>
+                                <p:cTn id="16" presetID="10" presetClass="entr" presetSubtype="0" fill="hold" grpId="0" nodeType="withEffect">
+                                  <p:stCondLst>
+                                    <p:cond delay="0"/>
+                                  </p:stCondLst>
+                                  <p:childTnLst>
+                                    <p:set>
+                                      <p:cBhvr>
+                                        <p:cTn id="17" dur="1" fill="hold">
+                                          <p:stCondLst>
+                                            <p:cond delay="0"/>
+                                          </p:stCondLst>
+                                        </p:cTn>
+                                        <p:tgtEl>
+                                          <p:spTgt spid="10"/>
+                                        </p:tgtEl>
+                                        <p:attrNameLst>
+                                          <p:attrName>style.visibility</p:attrName>
+                                        </p:attrNameLst>
+                                      </p:cBhvr>
+                                      <p:to>
+                                        <p:strVal val="visible"/>
+                                      </p:to>
+                                    </p:set>
+                                    <p:animEffect transition="in" filter="fade">
+                                      <p:cBhvr>
+                                        <p:cTn id="18" dur="500"/>
+                                        <p:tgtEl>
+                                          <p:spTgt spid="10"/>
+                                        </p:tgtEl>
+                                      </p:cBhvr>
+                                    </p:animEffect>
+                                  </p:childTnLst>
+                                </p:cTn>
+                              </p:par>
+                            </p:childTnLst>
+                          </p:cTn>
+                        </p:par>
+                      </p:childTnLst>
+                    </p:cTn>
+                  </p:par>
+                </p:childTnLst>
+              </p:cTn>
+              <p:prevCondLst>
+                <p:cond evt="onPrev" delay="0">
+                  <p:tgtEl>
+                    <p:sldTgt/>
+                  </p:tgtEl>
+                </p:cond>
+              </p:prevCondLst>
+              <p:nextCondLst>
+                <p:cond evt="onNext" delay="0">
+                  <p:tgtEl>
+                    <p:sldTgt/>
+                  </p:tgtEl>
+                </p:cond>
+              </p:nextCondLst>
+            </p:seq>
+          </p:childTnLst>
+        </p:cTn>
+      </p:par>
+    </p:tnLst>
+    <p:bldLst>
+      <p:bldP spid="6" grpId="0" animBg="1"/>
+      <p:bldP spid="7" grpId="0" animBg="1"/>
+      <p:bldP spid="9" grpId="0"/>
+      <p:bldP spid="10" grpId="0"/>
+    </p:bldLst>
+  </p:timing>
+</p:sld>
+</file>
+
+<file path=ppt/slides/slide3.xml><?xml version="1.0" encoding="utf-8"?>
 <p:sld xmlns:a="http://schemas.openxmlformats.org/drawingml/2006/main" xmlns:r="http://schemas.openxmlformats.org/officeDocument/2006/relationships" xmlns:p="http://schemas.openxmlformats.org/presentationml/2006/main">
   <p:cSld>
     <p:spTree>
@@ -29190,7 +31336,658 @@
 </p:sld>
 </file>
 
-<file path=ppt/slides/slide3.xml><?xml version="1.0" encoding="utf-8"?>
+<file path=ppt/slides/slide4.xml><?xml version="1.0" encoding="utf-8"?>
+<p:sld xmlns:a="http://schemas.openxmlformats.org/drawingml/2006/main" xmlns:r="http://schemas.openxmlformats.org/officeDocument/2006/relationships" xmlns:p="http://schemas.openxmlformats.org/presentationml/2006/main">
+  <p:cSld>
+    <p:spTree>
+      <p:nvGrpSpPr>
+        <p:cNvPr id="1" name=""/>
+        <p:cNvGrpSpPr/>
+        <p:nvPr/>
+      </p:nvGrpSpPr>
+      <p:grpSpPr>
+        <a:xfrm>
+          <a:off x="0" y="0"/>
+          <a:ext cx="0" cy="0"/>
+          <a:chOff x="0" y="0"/>
+          <a:chExt cx="0" cy="0"/>
+        </a:xfrm>
+      </p:grpSpPr>
+      <p:sp>
+        <p:nvSpPr>
+          <p:cNvPr id="3" name="Title 2"/>
+          <p:cNvSpPr>
+            <a:spLocks noGrp="1"/>
+          </p:cNvSpPr>
+          <p:nvPr>
+            <p:ph type="title"/>
+          </p:nvPr>
+        </p:nvSpPr>
+        <p:spPr/>
+        <p:txBody>
+          <a:bodyPr/>
+          <a:lstStyle/>
+          <a:p>
+            <a:r>
+              <a:rPr lang="en-US" dirty="0" err="1" smtClean="0"/>
+              <a:t>StackPanel</a:t>
+            </a:r>
+            <a:endParaRPr lang="en-US" dirty="0"/>
+          </a:p>
+        </p:txBody>
+      </p:sp>
+      <p:pic>
+        <p:nvPicPr>
+          <p:cNvPr id="2" name="Picture 1"/>
+          <p:cNvPicPr>
+            <a:picLocks noChangeAspect="1"/>
+          </p:cNvPicPr>
+          <p:nvPr/>
+        </p:nvPicPr>
+        <p:blipFill>
+          <a:blip r:embed="rId2"/>
+          <a:stretch>
+            <a:fillRect/>
+          </a:stretch>
+        </p:blipFill>
+        <p:spPr>
+          <a:xfrm>
+            <a:off x="3396000" y="1236686"/>
+            <a:ext cx="4491800" cy="3374550"/>
+          </a:xfrm>
+          <a:prstGeom prst="rect">
+            <a:avLst/>
+          </a:prstGeom>
+        </p:spPr>
+      </p:pic>
+      <p:pic>
+        <p:nvPicPr>
+          <p:cNvPr id="5" name="Picture 4"/>
+          <p:cNvPicPr>
+            <a:picLocks noChangeAspect="1"/>
+          </p:cNvPicPr>
+          <p:nvPr/>
+        </p:nvPicPr>
+        <p:blipFill>
+          <a:blip r:embed="rId3"/>
+          <a:stretch>
+            <a:fillRect/>
+          </a:stretch>
+        </p:blipFill>
+        <p:spPr>
+          <a:xfrm>
+            <a:off x="506270" y="1314450"/>
+            <a:ext cx="2587385" cy="5282925"/>
+          </a:xfrm>
+          <a:prstGeom prst="rect">
+            <a:avLst/>
+          </a:prstGeom>
+        </p:spPr>
+      </p:pic>
+      <p:sp>
+        <p:nvSpPr>
+          <p:cNvPr id="6" name="TextBox 5"/>
+          <p:cNvSpPr txBox="1"/>
+          <p:nvPr/>
+        </p:nvSpPr>
+        <p:spPr>
+          <a:xfrm>
+            <a:off x="3216000" y="4706088"/>
+            <a:ext cx="4860000" cy="1680460"/>
+          </a:xfrm>
+          <a:prstGeom prst="rect">
+            <a:avLst/>
+          </a:prstGeom>
+          <a:noFill/>
+        </p:spPr>
+        <p:txBody>
+          <a:bodyPr wrap="square" lIns="182880" tIns="146304" rIns="182880" bIns="146304" rtlCol="0">
+            <a:spAutoFit/>
+          </a:bodyPr>
+          <a:lstStyle/>
+          <a:p>
+            <a:pPr>
+              <a:lnSpc>
+                <a:spcPct val="90000"/>
+              </a:lnSpc>
+              <a:spcAft>
+                <a:spcPts val="600"/>
+              </a:spcAft>
+            </a:pPr>
+            <a:r>
+              <a:rPr lang="en-US" sz="2000" dirty="0" err="1" smtClean="0">
+                <a:gradFill>
+                  <a:gsLst>
+                    <a:gs pos="2917">
+                      <a:schemeClr val="tx1"/>
+                    </a:gs>
+                    <a:gs pos="30000">
+                      <a:schemeClr val="tx1"/>
+                    </a:gs>
+                  </a:gsLst>
+                  <a:lin ang="5400000" scaled="0"/>
+                </a:gradFill>
+                <a:latin typeface="+mj-lt"/>
+              </a:rPr>
+              <a:t>StackPanel</a:t>
+            </a:r>
+            <a:r>
+              <a:rPr lang="en-US" sz="2000" dirty="0" smtClean="0">
+                <a:gradFill>
+                  <a:gsLst>
+                    <a:gs pos="2917">
+                      <a:schemeClr val="tx1"/>
+                    </a:gs>
+                    <a:gs pos="30000">
+                      <a:schemeClr val="tx1"/>
+                    </a:gs>
+                  </a:gsLst>
+                  <a:lin ang="5400000" scaled="0"/>
+                </a:gradFill>
+                <a:latin typeface="+mj-lt"/>
+              </a:rPr>
+              <a:t> </a:t>
+            </a:r>
+            <a:r>
+              <a:rPr lang="ru-RU" sz="2000" dirty="0" smtClean="0">
+                <a:gradFill>
+                  <a:gsLst>
+                    <a:gs pos="2917">
+                      <a:schemeClr val="tx1"/>
+                    </a:gs>
+                    <a:gs pos="30000">
+                      <a:schemeClr val="tx1"/>
+                    </a:gs>
+                  </a:gsLst>
+                  <a:lin ang="5400000" scaled="0"/>
+                </a:gradFill>
+                <a:latin typeface="+mj-lt"/>
+              </a:rPr>
+              <a:t>может использоваться как для вертикального, так и для горизонтального (</a:t>
+            </a:r>
+            <a:r>
+              <a:rPr lang="en-US" sz="2000" dirty="0" smtClean="0">
+                <a:gradFill>
+                  <a:gsLst>
+                    <a:gs pos="2917">
+                      <a:schemeClr val="tx1"/>
+                    </a:gs>
+                    <a:gs pos="30000">
+                      <a:schemeClr val="tx1"/>
+                    </a:gs>
+                  </a:gsLst>
+                  <a:lin ang="5400000" scaled="0"/>
+                </a:gradFill>
+                <a:latin typeface="+mj-lt"/>
+              </a:rPr>
+              <a:t>Orientation=“Horizontal”) </a:t>
+            </a:r>
+            <a:r>
+              <a:rPr lang="ru-RU" sz="2000" dirty="0" smtClean="0">
+                <a:gradFill>
+                  <a:gsLst>
+                    <a:gs pos="2917">
+                      <a:schemeClr val="tx1"/>
+                    </a:gs>
+                    <a:gs pos="30000">
+                      <a:schemeClr val="tx1"/>
+                    </a:gs>
+                  </a:gsLst>
+                  <a:lin ang="5400000" scaled="0"/>
+                </a:gradFill>
+                <a:latin typeface="+mj-lt"/>
+              </a:rPr>
+              <a:t>размещения элементов.</a:t>
+            </a:r>
+          </a:p>
+        </p:txBody>
+      </p:sp>
+    </p:spTree>
+    <p:extLst>
+      <p:ext uri="{BB962C8B-B14F-4D97-AF65-F5344CB8AC3E}">
+        <p14:creationId xmlns:p14="http://schemas.microsoft.com/office/powerpoint/2010/main" val="3603696143"/>
+      </p:ext>
+    </p:extLst>
+  </p:cSld>
+  <p:clrMapOvr>
+    <a:masterClrMapping/>
+  </p:clrMapOvr>
+  <p:transition>
+    <p:fade/>
+  </p:transition>
+</p:sld>
+</file>
+
+<file path=ppt/slides/slide5.xml><?xml version="1.0" encoding="utf-8"?>
+<p:sld xmlns:a="http://schemas.openxmlformats.org/drawingml/2006/main" xmlns:r="http://schemas.openxmlformats.org/officeDocument/2006/relationships" xmlns:p="http://schemas.openxmlformats.org/presentationml/2006/main">
+  <p:cSld>
+    <p:spTree>
+      <p:nvGrpSpPr>
+        <p:cNvPr id="1" name=""/>
+        <p:cNvGrpSpPr/>
+        <p:nvPr/>
+      </p:nvGrpSpPr>
+      <p:grpSpPr>
+        <a:xfrm>
+          <a:off x="0" y="0"/>
+          <a:ext cx="0" cy="0"/>
+          <a:chOff x="0" y="0"/>
+          <a:chExt cx="0" cy="0"/>
+        </a:xfrm>
+      </p:grpSpPr>
+      <p:sp>
+        <p:nvSpPr>
+          <p:cNvPr id="3" name="Title 2"/>
+          <p:cNvSpPr>
+            <a:spLocks noGrp="1"/>
+          </p:cNvSpPr>
+          <p:nvPr>
+            <p:ph type="title"/>
+          </p:nvPr>
+        </p:nvSpPr>
+        <p:spPr/>
+        <p:txBody>
+          <a:bodyPr/>
+          <a:lstStyle/>
+          <a:p>
+            <a:r>
+              <a:rPr lang="en-US" dirty="0" smtClean="0"/>
+              <a:t>Grid</a:t>
+            </a:r>
+            <a:endParaRPr lang="en-US" dirty="0"/>
+          </a:p>
+        </p:txBody>
+      </p:sp>
+      <p:pic>
+        <p:nvPicPr>
+          <p:cNvPr id="4" name="Picture 3"/>
+          <p:cNvPicPr>
+            <a:picLocks noChangeAspect="1"/>
+          </p:cNvPicPr>
+          <p:nvPr/>
+        </p:nvPicPr>
+        <p:blipFill>
+          <a:blip r:embed="rId2"/>
+          <a:stretch>
+            <a:fillRect/>
+          </a:stretch>
+        </p:blipFill>
+        <p:spPr>
+          <a:xfrm>
+            <a:off x="379514" y="1432583"/>
+            <a:ext cx="6280833" cy="3976417"/>
+          </a:xfrm>
+          <a:prstGeom prst="rect">
+            <a:avLst/>
+          </a:prstGeom>
+        </p:spPr>
+      </p:pic>
+      <p:pic>
+        <p:nvPicPr>
+          <p:cNvPr id="6" name="Picture 5"/>
+          <p:cNvPicPr>
+            <a:picLocks noChangeAspect="1"/>
+          </p:cNvPicPr>
+          <p:nvPr/>
+        </p:nvPicPr>
+        <p:blipFill>
+          <a:blip r:embed="rId3" cstate="screen">
+            <a:extLst>
+              <a:ext uri="{28A0092B-C50C-407E-A947-70E740481C1C}">
+                <a14:useLocalDpi xmlns:a14="http://schemas.microsoft.com/office/drawing/2010/main"/>
+              </a:ext>
+            </a:extLst>
+          </a:blip>
+          <a:stretch>
+            <a:fillRect/>
+          </a:stretch>
+        </p:blipFill>
+        <p:spPr>
+          <a:xfrm>
+            <a:off x="4476000" y="206499"/>
+            <a:ext cx="5962533" cy="3271957"/>
+          </a:xfrm>
+          <a:prstGeom prst="rect">
+            <a:avLst/>
+          </a:prstGeom>
+        </p:spPr>
+      </p:pic>
+      <p:sp>
+        <p:nvSpPr>
+          <p:cNvPr id="5" name="TextBox 4"/>
+          <p:cNvSpPr txBox="1"/>
+          <p:nvPr/>
+        </p:nvSpPr>
+        <p:spPr>
+          <a:xfrm>
+            <a:off x="246281" y="5412275"/>
+            <a:ext cx="6391107" cy="1403461"/>
+          </a:xfrm>
+          <a:prstGeom prst="rect">
+            <a:avLst/>
+          </a:prstGeom>
+          <a:noFill/>
+        </p:spPr>
+        <p:txBody>
+          <a:bodyPr wrap="square" lIns="182880" tIns="146304" rIns="182880" bIns="146304" rtlCol="0">
+            <a:spAutoFit/>
+          </a:bodyPr>
+          <a:lstStyle/>
+          <a:p>
+            <a:pPr>
+              <a:lnSpc>
+                <a:spcPct val="90000"/>
+              </a:lnSpc>
+              <a:spcAft>
+                <a:spcPts val="600"/>
+              </a:spcAft>
+            </a:pPr>
+            <a:r>
+              <a:rPr lang="ru-RU" sz="2000" dirty="0" smtClean="0">
+                <a:gradFill>
+                  <a:gsLst>
+                    <a:gs pos="2917">
+                      <a:schemeClr val="tx1"/>
+                    </a:gs>
+                    <a:gs pos="30000">
+                      <a:schemeClr val="tx1"/>
+                    </a:gs>
+                  </a:gsLst>
+                  <a:lin ang="5400000" scaled="0"/>
+                </a:gradFill>
+                <a:latin typeface="+mj-lt"/>
+              </a:rPr>
+              <a:t>В </a:t>
+            </a:r>
+            <a:r>
+              <a:rPr lang="en-US" sz="2000" dirty="0" smtClean="0">
+                <a:gradFill>
+                  <a:gsLst>
+                    <a:gs pos="2917">
+                      <a:schemeClr val="tx1"/>
+                    </a:gs>
+                    <a:gs pos="30000">
+                      <a:schemeClr val="tx1"/>
+                    </a:gs>
+                  </a:gsLst>
+                  <a:lin ang="5400000" scaled="0"/>
+                </a:gradFill>
+                <a:latin typeface="+mj-lt"/>
+              </a:rPr>
+              <a:t>Grid </a:t>
+            </a:r>
+            <a:r>
+              <a:rPr lang="ru-RU" sz="2000" dirty="0" smtClean="0">
+                <a:gradFill>
+                  <a:gsLst>
+                    <a:gs pos="2917">
+                      <a:schemeClr val="tx1"/>
+                    </a:gs>
+                    <a:gs pos="30000">
+                      <a:schemeClr val="tx1"/>
+                    </a:gs>
+                  </a:gsLst>
+                  <a:lin ang="5400000" scaled="0"/>
+                </a:gradFill>
+                <a:latin typeface="+mj-lt"/>
+              </a:rPr>
+              <a:t>можно задавать авто-размер (</a:t>
+            </a:r>
+            <a:r>
+              <a:rPr lang="en-US" sz="2000" dirty="0" smtClean="0">
+                <a:gradFill>
+                  <a:gsLst>
+                    <a:gs pos="2917">
+                      <a:schemeClr val="tx1"/>
+                    </a:gs>
+                    <a:gs pos="30000">
+                      <a:schemeClr val="tx1"/>
+                    </a:gs>
+                  </a:gsLst>
+                  <a:lin ang="5400000" scaled="0"/>
+                </a:gradFill>
+                <a:latin typeface="+mj-lt"/>
+              </a:rPr>
+              <a:t>Auto), </a:t>
+            </a:r>
+            <a:r>
+              <a:rPr lang="ru-RU" sz="2000" dirty="0" smtClean="0">
+                <a:gradFill>
+                  <a:gsLst>
+                    <a:gs pos="2917">
+                      <a:schemeClr val="tx1"/>
+                    </a:gs>
+                    <a:gs pos="30000">
+                      <a:schemeClr val="tx1"/>
+                    </a:gs>
+                  </a:gsLst>
+                  <a:lin ang="5400000" scaled="0"/>
+                </a:gradFill>
+                <a:latin typeface="+mj-lt"/>
+              </a:rPr>
+              <a:t>растягиваемый размер (*)</a:t>
+            </a:r>
+            <a:r>
+              <a:rPr lang="en-US" sz="2000" dirty="0" smtClean="0">
+                <a:gradFill>
+                  <a:gsLst>
+                    <a:gs pos="2917">
+                      <a:schemeClr val="tx1"/>
+                    </a:gs>
+                    <a:gs pos="30000">
+                      <a:schemeClr val="tx1"/>
+                    </a:gs>
+                  </a:gsLst>
+                  <a:lin ang="5400000" scaled="0"/>
+                </a:gradFill>
+                <a:latin typeface="+mj-lt"/>
+              </a:rPr>
+              <a:t>, </a:t>
+            </a:r>
+            <a:r>
+              <a:rPr lang="ru-RU" sz="2000" dirty="0" smtClean="0">
+                <a:gradFill>
+                  <a:gsLst>
+                    <a:gs pos="2917">
+                      <a:schemeClr val="tx1"/>
+                    </a:gs>
+                    <a:gs pos="30000">
+                      <a:schemeClr val="tx1"/>
+                    </a:gs>
+                  </a:gsLst>
+                  <a:lin ang="5400000" scaled="0"/>
+                </a:gradFill>
+                <a:latin typeface="+mj-lt"/>
+              </a:rPr>
+              <a:t>или абсолютный размер в </a:t>
+            </a:r>
+            <a:r>
+              <a:rPr lang="ru-RU" sz="2000" dirty="0" err="1" smtClean="0">
+                <a:gradFill>
+                  <a:gsLst>
+                    <a:gs pos="2917">
+                      <a:schemeClr val="tx1"/>
+                    </a:gs>
+                    <a:gs pos="30000">
+                      <a:schemeClr val="tx1"/>
+                    </a:gs>
+                  </a:gsLst>
+                  <a:lin ang="5400000" scaled="0"/>
+                </a:gradFill>
+                <a:latin typeface="+mj-lt"/>
+              </a:rPr>
+              <a:t>пикелях</a:t>
+            </a:r>
+            <a:r>
+              <a:rPr lang="ru-RU" sz="2000" dirty="0" smtClean="0">
+                <a:gradFill>
+                  <a:gsLst>
+                    <a:gs pos="2917">
+                      <a:schemeClr val="tx1"/>
+                    </a:gs>
+                    <a:gs pos="30000">
+                      <a:schemeClr val="tx1"/>
+                    </a:gs>
+                  </a:gsLst>
+                  <a:lin ang="5400000" scaled="0"/>
+                </a:gradFill>
+                <a:latin typeface="+mj-lt"/>
+              </a:rPr>
+              <a:t>. Положение элемента в таблице определяется его атрибутами </a:t>
+            </a:r>
+            <a:r>
+              <a:rPr lang="en-US" sz="2000" dirty="0" err="1" smtClean="0">
+                <a:gradFill>
+                  <a:gsLst>
+                    <a:gs pos="2917">
+                      <a:schemeClr val="tx1"/>
+                    </a:gs>
+                    <a:gs pos="30000">
+                      <a:schemeClr val="tx1"/>
+                    </a:gs>
+                  </a:gsLst>
+                  <a:lin ang="5400000" scaled="0"/>
+                </a:gradFill>
+                <a:latin typeface="+mj-lt"/>
+              </a:rPr>
+              <a:t>Grid.Row</a:t>
+            </a:r>
+            <a:r>
+              <a:rPr lang="en-US" sz="2000" dirty="0" smtClean="0">
+                <a:gradFill>
+                  <a:gsLst>
+                    <a:gs pos="2917">
+                      <a:schemeClr val="tx1"/>
+                    </a:gs>
+                    <a:gs pos="30000">
+                      <a:schemeClr val="tx1"/>
+                    </a:gs>
+                  </a:gsLst>
+                  <a:lin ang="5400000" scaled="0"/>
+                </a:gradFill>
+                <a:latin typeface="+mj-lt"/>
+              </a:rPr>
+              <a:t>/Column</a:t>
+            </a:r>
+            <a:endParaRPr lang="ru-RU" sz="2000" dirty="0" smtClean="0">
+              <a:gradFill>
+                <a:gsLst>
+                  <a:gs pos="2917">
+                    <a:schemeClr val="tx1"/>
+                  </a:gs>
+                  <a:gs pos="30000">
+                    <a:schemeClr val="tx1"/>
+                  </a:gs>
+                </a:gsLst>
+                <a:lin ang="5400000" scaled="0"/>
+              </a:gradFill>
+              <a:latin typeface="+mj-lt"/>
+            </a:endParaRPr>
+          </a:p>
+        </p:txBody>
+      </p:sp>
+    </p:spTree>
+    <p:extLst>
+      <p:ext uri="{BB962C8B-B14F-4D97-AF65-F5344CB8AC3E}">
+        <p14:creationId xmlns:p14="http://schemas.microsoft.com/office/powerpoint/2010/main" val="1311168390"/>
+      </p:ext>
+    </p:extLst>
+  </p:cSld>
+  <p:clrMapOvr>
+    <a:masterClrMapping/>
+  </p:clrMapOvr>
+  <p:transition>
+    <p:fade/>
+  </p:transition>
+</p:sld>
+</file>
+
+<file path=ppt/slides/slide6.xml><?xml version="1.0" encoding="utf-8"?>
+<p:sld xmlns:a="http://schemas.openxmlformats.org/drawingml/2006/main" xmlns:r="http://schemas.openxmlformats.org/officeDocument/2006/relationships" xmlns:p="http://schemas.openxmlformats.org/presentationml/2006/main">
+  <p:cSld>
+    <p:spTree>
+      <p:nvGrpSpPr>
+        <p:cNvPr id="1" name=""/>
+        <p:cNvGrpSpPr/>
+        <p:nvPr/>
+      </p:nvGrpSpPr>
+      <p:grpSpPr>
+        <a:xfrm>
+          <a:off x="0" y="0"/>
+          <a:ext cx="0" cy="0"/>
+          <a:chOff x="0" y="0"/>
+          <a:chExt cx="0" cy="0"/>
+        </a:xfrm>
+      </p:grpSpPr>
+      <p:sp>
+        <p:nvSpPr>
+          <p:cNvPr id="3" name="Заголовок 2"/>
+          <p:cNvSpPr>
+            <a:spLocks noGrp="1"/>
+          </p:cNvSpPr>
+          <p:nvPr>
+            <p:ph type="title"/>
+          </p:nvPr>
+        </p:nvSpPr>
+        <p:spPr>
+          <a:xfrm>
+            <a:off x="816076" y="1422242"/>
+            <a:ext cx="9859116" cy="1813958"/>
+          </a:xfrm>
+        </p:spPr>
+        <p:txBody>
+          <a:bodyPr/>
+          <a:lstStyle/>
+          <a:p>
+            <a:r>
+              <a:rPr lang="en-US" dirty="0" smtClean="0"/>
+              <a:t>DEMO </a:t>
+            </a:r>
+            <a:r>
+              <a:rPr lang="en-US" dirty="0" smtClean="0"/>
+              <a:t>03:</a:t>
+            </a:r>
+            <a:r>
+              <a:rPr lang="en-US" dirty="0" smtClean="0"/>
+              <a:t/>
+            </a:r>
+            <a:br>
+              <a:rPr lang="en-US" dirty="0" smtClean="0"/>
+            </a:br>
+            <a:r>
+              <a:rPr lang="ru-RU" dirty="0" smtClean="0"/>
+              <a:t>Форма ввода данных</a:t>
+            </a:r>
+            <a:endParaRPr lang="ru-RU" dirty="0"/>
+          </a:p>
+        </p:txBody>
+      </p:sp>
+    </p:spTree>
+    <p:extLst>
+      <p:ext uri="{BB962C8B-B14F-4D97-AF65-F5344CB8AC3E}">
+        <p14:creationId xmlns:p14="http://schemas.microsoft.com/office/powerpoint/2010/main" val="4233968349"/>
+      </p:ext>
+    </p:extLst>
+  </p:cSld>
+  <p:clrMapOvr>
+    <a:masterClrMapping/>
+  </p:clrMapOvr>
+  <mc:AlternateContent xmlns:mc="http://schemas.openxmlformats.org/markup-compatibility/2006" xmlns:p14="http://schemas.microsoft.com/office/powerpoint/2010/main">
+    <mc:Choice Requires="p14">
+      <p:transition spd="slow" p14:dur="3400">
+        <p14:reveal/>
+      </p:transition>
+    </mc:Choice>
+    <mc:Fallback xmlns="">
+      <p:transition spd="slow">
+        <p:fade/>
+      </p:transition>
+    </mc:Fallback>
+  </mc:AlternateContent>
+</p:sld>
+</file>
+
+<file path=ppt/slides/slide7.xml><?xml version="1.0" encoding="utf-8"?>
 <p:sld xmlns:a="http://schemas.openxmlformats.org/drawingml/2006/main" xmlns:r="http://schemas.openxmlformats.org/officeDocument/2006/relationships" xmlns:p="http://schemas.openxmlformats.org/presentationml/2006/main">
   <p:cSld>
     <p:spTree>
@@ -29562,7 +32359,7 @@
 </p:sld>
 </file>
 
-<file path=ppt/slides/slide4.xml><?xml version="1.0" encoding="utf-8"?>
+<file path=ppt/slides/slide8.xml><?xml version="1.0" encoding="utf-8"?>
 <p:sld xmlns:a="http://schemas.openxmlformats.org/drawingml/2006/main" xmlns:r="http://schemas.openxmlformats.org/officeDocument/2006/relationships" xmlns:p="http://schemas.openxmlformats.org/presentationml/2006/main">
   <p:cSld>
     <p:spTree>
@@ -29581,7 +32378,7 @@
       </p:grpSpPr>
       <p:sp>
         <p:nvSpPr>
-          <p:cNvPr id="3" name="Title 2"/>
+          <p:cNvPr id="3" name="Заголовок 2"/>
           <p:cNvSpPr>
             <a:spLocks noGrp="1"/>
           </p:cNvSpPr>
@@ -29589,216 +32386,65 @@
             <p:ph type="title"/>
           </p:nvPr>
         </p:nvSpPr>
-        <p:spPr/>
+        <p:spPr>
+          <a:xfrm>
+            <a:off x="816076" y="1422242"/>
+            <a:ext cx="9859116" cy="1813958"/>
+          </a:xfrm>
+        </p:spPr>
         <p:txBody>
           <a:bodyPr/>
           <a:lstStyle/>
           <a:p>
             <a:r>
-              <a:rPr lang="en-US" dirty="0" err="1" smtClean="0"/>
-              <a:t>StackPanel</a:t>
-            </a:r>
-            <a:endParaRPr lang="en-US" dirty="0"/>
-          </a:p>
-        </p:txBody>
-      </p:sp>
-      <p:pic>
-        <p:nvPicPr>
-          <p:cNvPr id="2" name="Picture 1"/>
-          <p:cNvPicPr>
-            <a:picLocks noChangeAspect="1"/>
-          </p:cNvPicPr>
-          <p:nvPr/>
-        </p:nvPicPr>
-        <p:blipFill>
-          <a:blip r:embed="rId2"/>
-          <a:stretch>
-            <a:fillRect/>
-          </a:stretch>
-        </p:blipFill>
-        <p:spPr>
-          <a:xfrm>
-            <a:off x="3396000" y="1236686"/>
-            <a:ext cx="4491800" cy="3374550"/>
-          </a:xfrm>
-          <a:prstGeom prst="rect">
-            <a:avLst/>
-          </a:prstGeom>
-        </p:spPr>
-      </p:pic>
-      <p:pic>
-        <p:nvPicPr>
-          <p:cNvPr id="5" name="Picture 4"/>
-          <p:cNvPicPr>
-            <a:picLocks noChangeAspect="1"/>
-          </p:cNvPicPr>
-          <p:nvPr/>
-        </p:nvPicPr>
-        <p:blipFill>
-          <a:blip r:embed="rId3"/>
-          <a:stretch>
-            <a:fillRect/>
-          </a:stretch>
-        </p:blipFill>
-        <p:spPr>
-          <a:xfrm>
-            <a:off x="506270" y="1314450"/>
-            <a:ext cx="2587385" cy="5282925"/>
-          </a:xfrm>
-          <a:prstGeom prst="rect">
-            <a:avLst/>
-          </a:prstGeom>
-        </p:spPr>
-      </p:pic>
-      <p:sp>
-        <p:nvSpPr>
-          <p:cNvPr id="6" name="TextBox 5"/>
-          <p:cNvSpPr txBox="1"/>
-          <p:nvPr/>
-        </p:nvSpPr>
-        <p:spPr>
-          <a:xfrm>
-            <a:off x="3216000" y="4706088"/>
-            <a:ext cx="4860000" cy="1680460"/>
-          </a:xfrm>
-          <a:prstGeom prst="rect">
-            <a:avLst/>
-          </a:prstGeom>
-          <a:noFill/>
-        </p:spPr>
-        <p:txBody>
-          <a:bodyPr wrap="square" lIns="182880" tIns="146304" rIns="182880" bIns="146304" rtlCol="0">
-            <a:spAutoFit/>
-          </a:bodyPr>
-          <a:lstStyle/>
-          <a:p>
-            <a:pPr>
-              <a:lnSpc>
-                <a:spcPct val="90000"/>
-              </a:lnSpc>
-              <a:spcAft>
-                <a:spcPts val="600"/>
-              </a:spcAft>
-            </a:pPr>
-            <a:r>
-              <a:rPr lang="en-US" sz="2000" dirty="0" err="1" smtClean="0">
-                <a:gradFill>
-                  <a:gsLst>
-                    <a:gs pos="2917">
-                      <a:schemeClr val="tx1"/>
-                    </a:gs>
-                    <a:gs pos="30000">
-                      <a:schemeClr val="tx1"/>
-                    </a:gs>
-                  </a:gsLst>
-                  <a:lin ang="5400000" scaled="0"/>
-                </a:gradFill>
-                <a:latin typeface="+mj-lt"/>
-              </a:rPr>
-              <a:t>StackPanel</a:t>
-            </a:r>
-            <a:r>
-              <a:rPr lang="en-US" sz="2000" dirty="0" smtClean="0">
-                <a:gradFill>
-                  <a:gsLst>
-                    <a:gs pos="2917">
-                      <a:schemeClr val="tx1"/>
-                    </a:gs>
-                    <a:gs pos="30000">
-                      <a:schemeClr val="tx1"/>
-                    </a:gs>
-                  </a:gsLst>
-                  <a:lin ang="5400000" scaled="0"/>
-                </a:gradFill>
-                <a:latin typeface="+mj-lt"/>
-              </a:rPr>
-              <a:t> </a:t>
-            </a:r>
-            <a:r>
-              <a:rPr lang="ru-RU" sz="2000" dirty="0" smtClean="0">
-                <a:gradFill>
-                  <a:gsLst>
-                    <a:gs pos="2917">
-                      <a:schemeClr val="tx1"/>
-                    </a:gs>
-                    <a:gs pos="30000">
-                      <a:schemeClr val="tx1"/>
-                    </a:gs>
-                  </a:gsLst>
-                  <a:lin ang="5400000" scaled="0"/>
-                </a:gradFill>
-                <a:latin typeface="+mj-lt"/>
-              </a:rPr>
-              <a:t>может использоваться как для вертикального, так и для горизонтального (</a:t>
-            </a:r>
-            <a:r>
-              <a:rPr lang="en-US" sz="2000" dirty="0" smtClean="0">
-                <a:gradFill>
-                  <a:gsLst>
-                    <a:gs pos="2917">
-                      <a:schemeClr val="tx1"/>
-                    </a:gs>
-                    <a:gs pos="30000">
-                      <a:schemeClr val="tx1"/>
-                    </a:gs>
-                  </a:gsLst>
-                  <a:lin ang="5400000" scaled="0"/>
-                </a:gradFill>
-                <a:latin typeface="+mj-lt"/>
-              </a:rPr>
-              <a:t>Orientation=“Horizontal”) </a:t>
-            </a:r>
-            <a:r>
-              <a:rPr lang="ru-RU" sz="2000" dirty="0" smtClean="0">
-                <a:gradFill>
-                  <a:gsLst>
-                    <a:gs pos="2917">
-                      <a:schemeClr val="tx1"/>
-                    </a:gs>
-                    <a:gs pos="30000">
-                      <a:schemeClr val="tx1"/>
-                    </a:gs>
-                  </a:gsLst>
-                  <a:lin ang="5400000" scaled="0"/>
-                </a:gradFill>
-                <a:latin typeface="+mj-lt"/>
-              </a:rPr>
-              <a:t>размещения элементов.</a:t>
-            </a:r>
-            <a:endParaRPr lang="ru-RU" sz="2000" dirty="0" smtClean="0">
-              <a:gradFill>
-                <a:gsLst>
-                  <a:gs pos="2917">
-                    <a:schemeClr val="tx1"/>
-                  </a:gs>
-                  <a:gs pos="30000">
-                    <a:schemeClr val="tx1"/>
-                  </a:gs>
-                </a:gsLst>
-                <a:lin ang="5400000" scaled="0"/>
-              </a:gradFill>
-              <a:latin typeface="+mj-lt"/>
-            </a:endParaRPr>
+              <a:rPr lang="en-US" dirty="0" smtClean="0"/>
+              <a:t>DEMO </a:t>
+            </a:r>
+            <a:r>
+              <a:rPr lang="en-US" dirty="0" smtClean="0"/>
+              <a:t>04:</a:t>
+            </a:r>
+            <a:r>
+              <a:rPr lang="en-US" dirty="0" smtClean="0"/>
+              <a:t/>
+            </a:r>
+            <a:br>
+              <a:rPr lang="en-US" dirty="0" smtClean="0"/>
+            </a:br>
+            <a:r>
+              <a:rPr lang="ru-RU" dirty="0" smtClean="0"/>
+              <a:t>Подвижный круг</a:t>
+            </a:r>
+            <a:endParaRPr lang="ru-RU" dirty="0"/>
           </a:p>
         </p:txBody>
       </p:sp>
     </p:spTree>
     <p:extLst>
       <p:ext uri="{BB962C8B-B14F-4D97-AF65-F5344CB8AC3E}">
-        <p14:creationId xmlns:p14="http://schemas.microsoft.com/office/powerpoint/2010/main" val="3603696143"/>
+        <p14:creationId xmlns:p14="http://schemas.microsoft.com/office/powerpoint/2010/main" val="1728274549"/>
       </p:ext>
     </p:extLst>
   </p:cSld>
   <p:clrMapOvr>
     <a:masterClrMapping/>
   </p:clrMapOvr>
-  <p:transition>
-    <p:fade/>
-  </p:transition>
+  <mc:AlternateContent xmlns:mc="http://schemas.openxmlformats.org/markup-compatibility/2006" xmlns:p14="http://schemas.microsoft.com/office/powerpoint/2010/main">
+    <mc:Choice Requires="p14">
+      <p:transition spd="slow" p14:dur="3400">
+        <p14:reveal/>
+      </p:transition>
+    </mc:Choice>
+    <mc:Fallback xmlns="">
+      <p:transition spd="slow">
+        <p:fade/>
+      </p:transition>
+    </mc:Fallback>
+  </mc:AlternateContent>
 </p:sld>
 </file>
 
-<file path=ppt/slides/slide5.xml><?xml version="1.0" encoding="utf-8"?>
+<file path=ppt/slides/slide9.xml><?xml version="1.0" encoding="utf-8"?>
 <p:sld xmlns:a="http://schemas.openxmlformats.org/drawingml/2006/main" xmlns:r="http://schemas.openxmlformats.org/officeDocument/2006/relationships" xmlns:p="http://schemas.openxmlformats.org/presentationml/2006/main">
   <p:cSld>
     <p:spTree>
@@ -29817,7 +32463,7 @@
       </p:grpSpPr>
       <p:sp>
         <p:nvSpPr>
-          <p:cNvPr id="3" name="Title 2"/>
+          <p:cNvPr id="2" name="Title 1"/>
           <p:cNvSpPr>
             <a:spLocks noGrp="1"/>
           </p:cNvSpPr>
@@ -29831,297 +32477,200 @@
           <a:lstStyle/>
           <a:p>
             <a:r>
-              <a:rPr lang="en-US" dirty="0" smtClean="0"/>
-              <a:t>Grid</a:t>
+              <a:rPr lang="ru-RU" dirty="0" smtClean="0"/>
+              <a:t>Вылетающие элементы</a:t>
             </a:r>
             <a:endParaRPr lang="en-US" dirty="0"/>
           </a:p>
         </p:txBody>
       </p:sp>
-      <p:pic>
-        <p:nvPicPr>
-          <p:cNvPr id="4" name="Picture 3"/>
-          <p:cNvPicPr>
-            <a:picLocks noChangeAspect="1"/>
-          </p:cNvPicPr>
-          <p:nvPr/>
-        </p:nvPicPr>
-        <p:blipFill>
-          <a:blip r:embed="rId2"/>
-          <a:stretch>
-            <a:fillRect/>
-          </a:stretch>
-        </p:blipFill>
-        <p:spPr>
-          <a:xfrm>
-            <a:off x="379514" y="1432583"/>
-            <a:ext cx="6280833" cy="3976417"/>
-          </a:xfrm>
-          <a:prstGeom prst="rect">
-            <a:avLst/>
-          </a:prstGeom>
-        </p:spPr>
-      </p:pic>
-      <p:pic>
-        <p:nvPicPr>
-          <p:cNvPr id="6" name="Picture 5"/>
-          <p:cNvPicPr>
-            <a:picLocks noChangeAspect="1"/>
-          </p:cNvPicPr>
-          <p:nvPr/>
-        </p:nvPicPr>
-        <p:blipFill>
-          <a:blip r:embed="rId3" cstate="screen">
-            <a:extLst>
-              <a:ext uri="{28A0092B-C50C-407E-A947-70E740481C1C}">
-                <a14:useLocalDpi xmlns:a14="http://schemas.microsoft.com/office/drawing/2010/main"/>
-              </a:ext>
-            </a:extLst>
-          </a:blip>
-          <a:stretch>
-            <a:fillRect/>
-          </a:stretch>
-        </p:blipFill>
-        <p:spPr>
-          <a:xfrm>
-            <a:off x="5962547" y="148834"/>
-            <a:ext cx="5962533" cy="3271957"/>
-          </a:xfrm>
-          <a:prstGeom prst="rect">
-            <a:avLst/>
-          </a:prstGeom>
-        </p:spPr>
-      </p:pic>
       <p:sp>
         <p:nvSpPr>
-          <p:cNvPr id="5" name="TextBox 4"/>
-          <p:cNvSpPr txBox="1"/>
-          <p:nvPr/>
+          <p:cNvPr id="4" name="Content Placeholder 3"/>
+          <p:cNvSpPr>
+            <a:spLocks noGrp="1"/>
+          </p:cNvSpPr>
+          <p:nvPr>
+            <p:ph type="body" sz="quarter" idx="10"/>
+          </p:nvPr>
         </p:nvSpPr>
-        <p:spPr>
-          <a:xfrm>
-            <a:off x="246281" y="5412275"/>
-            <a:ext cx="6391107" cy="1403461"/>
-          </a:xfrm>
-          <a:prstGeom prst="rect">
-            <a:avLst/>
-          </a:prstGeom>
-          <a:noFill/>
-        </p:spPr>
+        <p:spPr/>
         <p:txBody>
-          <a:bodyPr wrap="square" lIns="182880" tIns="146304" rIns="182880" bIns="146304" rtlCol="0">
-            <a:spAutoFit/>
+          <a:bodyPr vert="horz" lIns="137160" tIns="109728" rIns="137160" bIns="109728" rtlCol="0">
+            <a:noAutofit/>
           </a:bodyPr>
           <a:lstStyle/>
           <a:p>
             <a:pPr>
               <a:lnSpc>
-                <a:spcPct val="90000"/>
+                <a:spcPct val="100000"/>
               </a:lnSpc>
-              <a:spcAft>
-                <a:spcPts val="600"/>
-              </a:spcAft>
             </a:pPr>
             <a:r>
-              <a:rPr lang="ru-RU" sz="2000" dirty="0" smtClean="0">
-                <a:gradFill>
-                  <a:gsLst>
-                    <a:gs pos="2917">
-                      <a:schemeClr val="tx1"/>
-                    </a:gs>
-                    <a:gs pos="30000">
-                      <a:schemeClr val="tx1"/>
-                    </a:gs>
-                  </a:gsLst>
-                  <a:lin ang="5400000" scaled="0"/>
-                </a:gradFill>
-                <a:latin typeface="+mj-lt"/>
+              <a:rPr lang="en-US" sz="2400" b="0" dirty="0" smtClean="0">
+                <a:latin typeface="Consolas" panose="020B0609020204030204" pitchFamily="49" charset="0"/>
+                <a:cs typeface="Consolas" panose="020B0609020204030204" pitchFamily="49" charset="0"/>
               </a:rPr>
-              <a:t>В </a:t>
-            </a:r>
-            <a:r>
-              <a:rPr lang="en-US" sz="2000" dirty="0" smtClean="0">
-                <a:gradFill>
-                  <a:gsLst>
-                    <a:gs pos="2917">
-                      <a:schemeClr val="tx1"/>
-                    </a:gs>
-                    <a:gs pos="30000">
-                      <a:schemeClr val="tx1"/>
-                    </a:gs>
-                  </a:gsLst>
-                  <a:lin ang="5400000" scaled="0"/>
-                </a:gradFill>
-                <a:latin typeface="+mj-lt"/>
+              <a:t>&lt;</a:t>
+            </a:r>
+            <a:r>
+              <a:rPr lang="en-US" sz="2400" b="0" dirty="0" smtClean="0">
+                <a:solidFill>
+                  <a:schemeClr val="accent1"/>
+                </a:solidFill>
+                <a:latin typeface="Consolas" panose="020B0609020204030204" pitchFamily="49" charset="0"/>
+                <a:cs typeface="Consolas" panose="020B0609020204030204" pitchFamily="49" charset="0"/>
               </a:rPr>
-              <a:t>Grid </a:t>
-            </a:r>
-            <a:r>
-              <a:rPr lang="ru-RU" sz="2000" dirty="0" smtClean="0">
-                <a:gradFill>
-                  <a:gsLst>
-                    <a:gs pos="2917">
-                      <a:schemeClr val="tx1"/>
-                    </a:gs>
-                    <a:gs pos="30000">
-                      <a:schemeClr val="tx1"/>
-                    </a:gs>
-                  </a:gsLst>
-                  <a:lin ang="5400000" scaled="0"/>
-                </a:gradFill>
-                <a:latin typeface="+mj-lt"/>
+              <a:t>Popup</a:t>
+            </a:r>
+            <a:r>
+              <a:rPr lang="en-US" sz="2400" b="0" dirty="0" smtClean="0">
+                <a:latin typeface="Consolas" panose="020B0609020204030204" pitchFamily="49" charset="0"/>
+                <a:cs typeface="Consolas" panose="020B0609020204030204" pitchFamily="49" charset="0"/>
               </a:rPr>
-              <a:t>можно задавать авто-размер (</a:t>
-            </a:r>
-            <a:r>
-              <a:rPr lang="en-US" sz="2000" dirty="0" smtClean="0">
-                <a:gradFill>
-                  <a:gsLst>
-                    <a:gs pos="2917">
-                      <a:schemeClr val="tx1"/>
-                    </a:gs>
-                    <a:gs pos="30000">
-                      <a:schemeClr val="tx1"/>
-                    </a:gs>
-                  </a:gsLst>
-                  <a:lin ang="5400000" scaled="0"/>
-                </a:gradFill>
-                <a:latin typeface="+mj-lt"/>
+              <a:t> </a:t>
+            </a:r>
+            <a:r>
+              <a:rPr lang="en-US" sz="2400" b="0" dirty="0" err="1" smtClean="0">
+                <a:latin typeface="Consolas" panose="020B0609020204030204" pitchFamily="49" charset="0"/>
+                <a:cs typeface="Consolas" panose="020B0609020204030204" pitchFamily="49" charset="0"/>
               </a:rPr>
-              <a:t>Auto), </a:t>
-            </a:r>
-            <a:r>
-              <a:rPr lang="ru-RU" sz="2000" dirty="0" smtClean="0">
-                <a:gradFill>
-                  <a:gsLst>
-                    <a:gs pos="2917">
-                      <a:schemeClr val="tx1"/>
-                    </a:gs>
-                    <a:gs pos="30000">
-                      <a:schemeClr val="tx1"/>
-                    </a:gs>
-                  </a:gsLst>
-                  <a:lin ang="5400000" scaled="0"/>
-                </a:gradFill>
-                <a:latin typeface="+mj-lt"/>
+              <a:t>IsOpen</a:t>
+            </a:r>
+            <a:r>
+              <a:rPr lang="en-US" sz="2400" b="0" dirty="0" smtClean="0">
+                <a:latin typeface="Consolas" panose="020B0609020204030204" pitchFamily="49" charset="0"/>
+                <a:cs typeface="Consolas" panose="020B0609020204030204" pitchFamily="49" charset="0"/>
               </a:rPr>
-              <a:t>растягиваемый размер (*)</a:t>
-            </a:r>
-            <a:r>
-              <a:rPr lang="en-US" sz="2000" dirty="0" smtClean="0">
-                <a:gradFill>
-                  <a:gsLst>
-                    <a:gs pos="2917">
-                      <a:schemeClr val="tx1"/>
-                    </a:gs>
-                    <a:gs pos="30000">
-                      <a:schemeClr val="tx1"/>
-                    </a:gs>
-                  </a:gsLst>
-                  <a:lin ang="5400000" scaled="0"/>
-                </a:gradFill>
-                <a:latin typeface="+mj-lt"/>
+              <a:t>="" /&gt;</a:t>
+            </a:r>
+          </a:p>
+          <a:p>
+            <a:pPr>
+              <a:lnSpc>
+                <a:spcPct val="100000"/>
+              </a:lnSpc>
+            </a:pPr>
+            <a:r>
+              <a:rPr lang="en-US" sz="2400" b="0" dirty="0" smtClean="0">
+                <a:latin typeface="Consolas" panose="020B0609020204030204" pitchFamily="49" charset="0"/>
+                <a:cs typeface="Consolas" panose="020B0609020204030204" pitchFamily="49" charset="0"/>
               </a:rPr>
-              <a:t>, </a:t>
-            </a:r>
-            <a:r>
-              <a:rPr lang="ru-RU" sz="2000" dirty="0" smtClean="0">
-                <a:gradFill>
-                  <a:gsLst>
-                    <a:gs pos="2917">
-                      <a:schemeClr val="tx1"/>
-                    </a:gs>
-                    <a:gs pos="30000">
-                      <a:schemeClr val="tx1"/>
-                    </a:gs>
-                  </a:gsLst>
-                  <a:lin ang="5400000" scaled="0"/>
-                </a:gradFill>
-                <a:latin typeface="+mj-lt"/>
+              <a:t>&lt;</a:t>
+            </a:r>
+            <a:r>
+              <a:rPr lang="en-US" sz="2400" b="0" dirty="0" err="1" smtClean="0">
+                <a:solidFill>
+                  <a:schemeClr val="accent1"/>
+                </a:solidFill>
+                <a:latin typeface="Consolas" panose="020B0609020204030204" pitchFamily="49" charset="0"/>
+                <a:cs typeface="Consolas" panose="020B0609020204030204" pitchFamily="49" charset="0"/>
               </a:rPr>
-              <a:t>или абсолютный размер в </a:t>
-            </a:r>
-            <a:r>
-              <a:rPr lang="ru-RU" sz="2000" dirty="0" err="1" smtClean="0">
-                <a:gradFill>
-                  <a:gsLst>
-                    <a:gs pos="2917">
-                      <a:schemeClr val="tx1"/>
-                    </a:gs>
-                    <a:gs pos="30000">
-                      <a:schemeClr val="tx1"/>
-                    </a:gs>
-                  </a:gsLst>
-                  <a:lin ang="5400000" scaled="0"/>
-                </a:gradFill>
-                <a:latin typeface="+mj-lt"/>
+              <a:t>ContentDialog</a:t>
+            </a:r>
+            <a:r>
+              <a:rPr lang="en-US" sz="2400" b="0" dirty="0" smtClean="0">
+                <a:latin typeface="Consolas" panose="020B0609020204030204" pitchFamily="49" charset="0"/>
+                <a:cs typeface="Consolas" panose="020B0609020204030204" pitchFamily="49" charset="0"/>
               </a:rPr>
-              <a:t>пикелях</a:t>
-            </a:r>
-            <a:r>
-              <a:rPr lang="ru-RU" sz="2000" dirty="0" smtClean="0">
-                <a:gradFill>
-                  <a:gsLst>
-                    <a:gs pos="2917">
-                      <a:schemeClr val="tx1"/>
-                    </a:gs>
-                    <a:gs pos="30000">
-                      <a:schemeClr val="tx1"/>
-                    </a:gs>
-                  </a:gsLst>
-                  <a:lin ang="5400000" scaled="0"/>
-                </a:gradFill>
-                <a:latin typeface="+mj-lt"/>
+              <a:t> Title="" Content="" /&gt;</a:t>
+            </a:r>
+          </a:p>
+          <a:p>
+            <a:pPr>
+              <a:lnSpc>
+                <a:spcPct val="100000"/>
+              </a:lnSpc>
+            </a:pPr>
+            <a:r>
+              <a:rPr lang="en-US" sz="2400" b="0" dirty="0" smtClean="0">
+                <a:latin typeface="Consolas" panose="020B0609020204030204" pitchFamily="49" charset="0"/>
+                <a:cs typeface="Consolas" panose="020B0609020204030204" pitchFamily="49" charset="0"/>
               </a:rPr>
-              <a:t>. Положение элемента в таблице определяется его атрибутами </a:t>
-            </a:r>
-            <a:r>
-              <a:rPr lang="en-US" sz="2000" dirty="0" err="1" smtClean="0">
-                <a:gradFill>
-                  <a:gsLst>
-                    <a:gs pos="2917">
-                      <a:schemeClr val="tx1"/>
-                    </a:gs>
-                    <a:gs pos="30000">
-                      <a:schemeClr val="tx1"/>
-                    </a:gs>
-                  </a:gsLst>
-                  <a:lin ang="5400000" scaled="0"/>
-                </a:gradFill>
-                <a:latin typeface="+mj-lt"/>
+              <a:t>&lt;</a:t>
+            </a:r>
+            <a:r>
+              <a:rPr lang="en-US" sz="2400" b="0" dirty="0" err="1" smtClean="0">
+                <a:solidFill>
+                  <a:schemeClr val="accent1"/>
+                </a:solidFill>
+                <a:latin typeface="Consolas" panose="020B0609020204030204" pitchFamily="49" charset="0"/>
+                <a:cs typeface="Consolas" panose="020B0609020204030204" pitchFamily="49" charset="0"/>
               </a:rPr>
-              <a:t>Grid.Row</a:t>
-            </a:r>
-            <a:r>
-              <a:rPr lang="en-US" sz="2000" dirty="0" smtClean="0">
-                <a:gradFill>
-                  <a:gsLst>
-                    <a:gs pos="2917">
-                      <a:schemeClr val="tx1"/>
-                    </a:gs>
-                    <a:gs pos="30000">
-                      <a:schemeClr val="tx1"/>
-                    </a:gs>
-                  </a:gsLst>
-                  <a:lin ang="5400000" scaled="0"/>
-                </a:gradFill>
-                <a:latin typeface="+mj-lt"/>
+              <a:t>Flyout</a:t>
+            </a:r>
+            <a:r>
+              <a:rPr lang="en-US" sz="2400" b="0" dirty="0" smtClean="0">
+                <a:latin typeface="Consolas" panose="020B0609020204030204" pitchFamily="49" charset="0"/>
+                <a:cs typeface="Consolas" panose="020B0609020204030204" pitchFamily="49" charset="0"/>
               </a:rPr>
-              <a:t>/Column</a:t>
-            </a:r>
-            <a:endParaRPr lang="ru-RU" sz="2000" dirty="0" smtClean="0">
-              <a:gradFill>
-                <a:gsLst>
-                  <a:gs pos="2917">
-                    <a:schemeClr val="tx1"/>
-                  </a:gs>
-                  <a:gs pos="30000">
-                    <a:schemeClr val="tx1"/>
-                  </a:gs>
-                </a:gsLst>
-                <a:lin ang="5400000" scaled="0"/>
-              </a:gradFill>
-              <a:latin typeface="+mj-lt"/>
+              <a:t> Placement="" /&gt;</a:t>
+            </a:r>
+          </a:p>
+          <a:p>
+            <a:pPr>
+              <a:lnSpc>
+                <a:spcPct val="100000"/>
+              </a:lnSpc>
+            </a:pPr>
+            <a:r>
+              <a:rPr lang="en-US" sz="2400" b="0" dirty="0" smtClean="0">
+                <a:latin typeface="Consolas" panose="020B0609020204030204" pitchFamily="49" charset="0"/>
+                <a:cs typeface="Consolas" panose="020B0609020204030204" pitchFamily="49" charset="0"/>
+              </a:rPr>
+              <a:t>&lt;</a:t>
+            </a:r>
+            <a:r>
+              <a:rPr lang="en-US" sz="2400" b="0" dirty="0" err="1" smtClean="0">
+                <a:solidFill>
+                  <a:schemeClr val="accent1"/>
+                </a:solidFill>
+                <a:latin typeface="Consolas" panose="020B0609020204030204" pitchFamily="49" charset="0"/>
+                <a:cs typeface="Consolas" panose="020B0609020204030204" pitchFamily="49" charset="0"/>
+              </a:rPr>
+              <a:t>MenuFlyout</a:t>
+            </a:r>
+            <a:r>
+              <a:rPr lang="en-US" sz="2400" b="0" dirty="0" smtClean="0">
+                <a:latin typeface="Consolas" panose="020B0609020204030204" pitchFamily="49" charset="0"/>
+                <a:cs typeface="Consolas" panose="020B0609020204030204" pitchFamily="49" charset="0"/>
+              </a:rPr>
+              <a:t> /&gt;</a:t>
+            </a:r>
+          </a:p>
+          <a:p>
+            <a:pPr>
+              <a:lnSpc>
+                <a:spcPct val="100000"/>
+              </a:lnSpc>
+            </a:pPr>
+            <a:r>
+              <a:rPr lang="en-US" sz="2400" b="0" dirty="0" smtClean="0">
+                <a:latin typeface="Consolas" panose="020B0609020204030204" pitchFamily="49" charset="0"/>
+                <a:cs typeface="Consolas" panose="020B0609020204030204" pitchFamily="49" charset="0"/>
+              </a:rPr>
+              <a:t>&lt;</a:t>
+            </a:r>
+            <a:r>
+              <a:rPr lang="en-US" sz="2400" b="0" dirty="0" smtClean="0">
+                <a:solidFill>
+                  <a:schemeClr val="accent1"/>
+                </a:solidFill>
+                <a:latin typeface="Consolas" panose="020B0609020204030204" pitchFamily="49" charset="0"/>
+                <a:cs typeface="Consolas" panose="020B0609020204030204" pitchFamily="49" charset="0"/>
+              </a:rPr>
+              <a:t>ToolTip</a:t>
+            </a:r>
+            <a:r>
+              <a:rPr lang="en-US" sz="2400" b="0" dirty="0" smtClean="0">
+                <a:latin typeface="Consolas" panose="020B0609020204030204" pitchFamily="49" charset="0"/>
+                <a:cs typeface="Consolas" panose="020B0609020204030204" pitchFamily="49" charset="0"/>
+              </a:rPr>
+              <a:t> /&gt;</a:t>
+            </a:r>
+            <a:endParaRPr lang="en-US" sz="2400" b="0" dirty="0">
+              <a:latin typeface="Consolas" panose="020B0609020204030204" pitchFamily="49" charset="0"/>
+              <a:cs typeface="Consolas" panose="020B0609020204030204" pitchFamily="49" charset="0"/>
             </a:endParaRPr>
           </a:p>
         </p:txBody>
@@ -30129,7 +32678,7 @@
     </p:spTree>
     <p:extLst>
       <p:ext uri="{BB962C8B-B14F-4D97-AF65-F5344CB8AC3E}">
-        <p14:creationId xmlns:p14="http://schemas.microsoft.com/office/powerpoint/2010/main" val="1311168390"/>
+        <p14:creationId xmlns:p14="http://schemas.microsoft.com/office/powerpoint/2010/main" val="943531900"/>
       </p:ext>
     </p:extLst>
   </p:cSld>
@@ -30139,466 +32688,6 @@
   <p:transition>
     <p:fade/>
   </p:transition>
-</p:sld>
-</file>
-
-<file path=ppt/slides/slide6.xml><?xml version="1.0" encoding="utf-8"?>
-<p:sld xmlns:a="http://schemas.openxmlformats.org/drawingml/2006/main" xmlns:r="http://schemas.openxmlformats.org/officeDocument/2006/relationships" xmlns:p="http://schemas.openxmlformats.org/presentationml/2006/main">
-  <p:cSld>
-    <p:spTree>
-      <p:nvGrpSpPr>
-        <p:cNvPr id="1" name=""/>
-        <p:cNvGrpSpPr/>
-        <p:nvPr/>
-      </p:nvGrpSpPr>
-      <p:grpSpPr>
-        <a:xfrm>
-          <a:off x="0" y="0"/>
-          <a:ext cx="0" cy="0"/>
-          <a:chOff x="0" y="0"/>
-          <a:chExt cx="0" cy="0"/>
-        </a:xfrm>
-      </p:grpSpPr>
-      <p:sp>
-        <p:nvSpPr>
-          <p:cNvPr id="2" name="Заголовок 1"/>
-          <p:cNvSpPr>
-            <a:spLocks noGrp="1"/>
-          </p:cNvSpPr>
-          <p:nvPr>
-            <p:ph type="title"/>
-          </p:nvPr>
-        </p:nvSpPr>
-        <p:spPr/>
-        <p:txBody>
-          <a:bodyPr/>
-          <a:lstStyle/>
-          <a:p>
-            <a:r>
-              <a:rPr lang="ru-RU" dirty="0" smtClean="0"/>
-              <a:t>Мораль</a:t>
-            </a:r>
-            <a:endParaRPr lang="ru-RU" dirty="0"/>
-          </a:p>
-        </p:txBody>
-      </p:sp>
-      <p:sp>
-        <p:nvSpPr>
-          <p:cNvPr id="3" name="Текст 2"/>
-          <p:cNvSpPr>
-            <a:spLocks noGrp="1"/>
-          </p:cNvSpPr>
-          <p:nvPr>
-            <p:ph type="body" sz="quarter" idx="10"/>
-          </p:nvPr>
-        </p:nvSpPr>
-        <p:spPr>
-          <a:xfrm>
-            <a:off x="269239" y="1189177"/>
-            <a:ext cx="7086761" cy="5312223"/>
-          </a:xfrm>
-        </p:spPr>
-        <p:txBody>
-          <a:bodyPr/>
-          <a:lstStyle/>
-          <a:p>
-            <a:r>
-              <a:rPr lang="ru-RU" sz="2800" dirty="0" smtClean="0"/>
-              <a:t>Разрабатывать универсальные приложения </a:t>
-            </a:r>
-            <a:r>
-              <a:rPr lang="en-US" sz="2800" dirty="0" smtClean="0"/>
-              <a:t>Windows </a:t>
-            </a:r>
-            <a:r>
-              <a:rPr lang="ru-RU" sz="2800" dirty="0" smtClean="0"/>
-              <a:t>очень просто</a:t>
-            </a:r>
-          </a:p>
-          <a:p>
-            <a:r>
-              <a:rPr lang="ru-RU" sz="2800" dirty="0" smtClean="0"/>
-              <a:t>Основа приложения – это дизайн </a:t>
-            </a:r>
-            <a:r>
-              <a:rPr lang="en-US" sz="2800" dirty="0" smtClean="0"/>
-              <a:t>(XAML) </a:t>
-            </a:r>
-            <a:r>
-              <a:rPr lang="ru-RU" sz="2800" dirty="0" smtClean="0"/>
-              <a:t>и логика (</a:t>
-            </a:r>
-            <a:r>
-              <a:rPr lang="en-US" sz="2800" dirty="0" smtClean="0"/>
-              <a:t>C#/VB/…)</a:t>
-            </a:r>
-          </a:p>
-          <a:p>
-            <a:r>
-              <a:rPr lang="ru-RU" sz="2800" dirty="0" smtClean="0"/>
-              <a:t>Есть ещё и другие подходы к созданию приложений</a:t>
-            </a:r>
-          </a:p>
-          <a:p>
-            <a:r>
-              <a:rPr lang="en-US" sz="2800" dirty="0" smtClean="0">
-                <a:solidFill>
-                  <a:schemeClr val="tx1"/>
-                </a:solidFill>
-              </a:rPr>
-              <a:t>	</a:t>
-            </a:r>
-            <a:r>
-              <a:rPr lang="en-US" sz="2000" dirty="0" smtClean="0">
-                <a:solidFill>
-                  <a:schemeClr val="tx1"/>
-                </a:solidFill>
-              </a:rPr>
-              <a:t>HTML+JS (</a:t>
-            </a:r>
-            <a:r>
-              <a:rPr lang="ru-RU" sz="2000" dirty="0" smtClean="0">
-                <a:solidFill>
-                  <a:schemeClr val="tx1"/>
-                </a:solidFill>
-              </a:rPr>
-              <a:t>стек для тех, кто привык к вебу)</a:t>
-            </a:r>
-            <a:endParaRPr lang="en-US" sz="2000" dirty="0" smtClean="0">
-              <a:solidFill>
-                <a:schemeClr val="tx1"/>
-              </a:solidFill>
-            </a:endParaRPr>
-          </a:p>
-          <a:p>
-            <a:r>
-              <a:rPr lang="en-US" sz="2000" dirty="0">
-                <a:solidFill>
-                  <a:schemeClr val="tx1"/>
-                </a:solidFill>
-              </a:rPr>
-              <a:t>	</a:t>
-            </a:r>
-            <a:r>
-              <a:rPr lang="en-US" sz="2000" dirty="0" smtClean="0">
-                <a:solidFill>
-                  <a:schemeClr val="tx1"/>
-                </a:solidFill>
-              </a:rPr>
-              <a:t>DirectX + C++</a:t>
-            </a:r>
-            <a:r>
-              <a:rPr lang="ru-RU" sz="2000" dirty="0" smtClean="0">
-                <a:solidFill>
-                  <a:schemeClr val="tx1"/>
-                </a:solidFill>
-              </a:rPr>
-              <a:t> (игры</a:t>
-            </a:r>
-            <a:r>
-              <a:rPr lang="en-US" sz="2000" dirty="0" smtClean="0">
-                <a:solidFill>
-                  <a:schemeClr val="tx1"/>
-                </a:solidFill>
-              </a:rPr>
-              <a:t>/</a:t>
-            </a:r>
-            <a:r>
-              <a:rPr lang="ru-RU" sz="2000" dirty="0" smtClean="0">
-                <a:solidFill>
-                  <a:schemeClr val="tx1"/>
-                </a:solidFill>
-              </a:rPr>
-              <a:t>графика на </a:t>
-            </a:r>
-            <a:r>
-              <a:rPr lang="en-US" sz="2000" dirty="0" smtClean="0">
-                <a:solidFill>
-                  <a:schemeClr val="tx1"/>
-                </a:solidFill>
-              </a:rPr>
-              <a:t>Windows)</a:t>
-            </a:r>
-          </a:p>
-          <a:p>
-            <a:r>
-              <a:rPr lang="en-US" sz="2000" dirty="0">
-                <a:solidFill>
-                  <a:schemeClr val="tx1"/>
-                </a:solidFill>
-              </a:rPr>
-              <a:t>	</a:t>
-            </a:r>
-            <a:r>
-              <a:rPr lang="en-US" sz="2000" dirty="0" smtClean="0">
-                <a:solidFill>
-                  <a:schemeClr val="tx1"/>
-                </a:solidFill>
-              </a:rPr>
-              <a:t>Unity (</a:t>
-            </a:r>
-            <a:r>
-              <a:rPr lang="ru-RU" sz="2000" dirty="0" smtClean="0">
-                <a:solidFill>
-                  <a:schemeClr val="tx1"/>
-                </a:solidFill>
-              </a:rPr>
-              <a:t>кросс-платформенная разработка игр)</a:t>
-            </a:r>
-            <a:endParaRPr lang="ru-RU" sz="2800" dirty="0" smtClean="0"/>
-          </a:p>
-          <a:p>
-            <a:r>
-              <a:rPr lang="ru-RU" sz="2800" dirty="0" smtClean="0">
-                <a:gradFill>
-                  <a:gsLst>
-                    <a:gs pos="1250">
-                      <a:srgbClr val="0078D7"/>
-                    </a:gs>
-                    <a:gs pos="99000">
-                      <a:srgbClr val="0078D7"/>
-                    </a:gs>
-                  </a:gsLst>
-                  <a:lin ang="5400000" scaled="0"/>
-                </a:gradFill>
-              </a:rPr>
-              <a:t>Приложения могут эффективно брать данные из интернет</a:t>
-            </a:r>
-          </a:p>
-          <a:p>
-            <a:r>
-              <a:rPr lang="ru-RU" sz="1800" dirty="0" smtClean="0">
-                <a:solidFill>
-                  <a:schemeClr val="tx1"/>
-                </a:solidFill>
-              </a:rPr>
-              <a:t>	</a:t>
-            </a:r>
-            <a:r>
-              <a:rPr lang="ru-RU" sz="2000" dirty="0" smtClean="0">
-                <a:solidFill>
-                  <a:schemeClr val="tx1"/>
-                </a:solidFill>
-              </a:rPr>
-              <a:t>Асинхронные </a:t>
-            </a:r>
-            <a:r>
-              <a:rPr lang="en-US" sz="2000" dirty="0" smtClean="0">
-                <a:solidFill>
-                  <a:schemeClr val="tx1"/>
-                </a:solidFill>
-              </a:rPr>
-              <a:t>API </a:t>
-            </a:r>
-            <a:r>
-              <a:rPr lang="ru-RU" sz="2000" dirty="0" smtClean="0">
-                <a:solidFill>
-                  <a:schemeClr val="tx1"/>
-                </a:solidFill>
-              </a:rPr>
-              <a:t>позволяют приложениям быть 	отзывчивыми</a:t>
-            </a:r>
-            <a:endParaRPr lang="en-US" sz="1800" dirty="0">
-              <a:solidFill>
-                <a:schemeClr val="tx1"/>
-              </a:solidFill>
-            </a:endParaRPr>
-          </a:p>
-        </p:txBody>
-      </p:sp>
-    </p:spTree>
-    <p:extLst>
-      <p:ext uri="{BB962C8B-B14F-4D97-AF65-F5344CB8AC3E}">
-        <p14:creationId xmlns:p14="http://schemas.microsoft.com/office/powerpoint/2010/main" val="4039233215"/>
-      </p:ext>
-    </p:extLst>
-  </p:cSld>
-  <p:clrMapOvr>
-    <a:masterClrMapping/>
-  </p:clrMapOvr>
-  <p:transition>
-    <p:fade/>
-  </p:transition>
-</p:sld>
-</file>
-
-<file path=ppt/slides/slide7.xml><?xml version="1.0" encoding="utf-8"?>
-<p:sld xmlns:a="http://schemas.openxmlformats.org/drawingml/2006/main" xmlns:r="http://schemas.openxmlformats.org/officeDocument/2006/relationships" xmlns:p="http://schemas.openxmlformats.org/presentationml/2006/main">
-  <p:cSld>
-    <p:spTree>
-      <p:nvGrpSpPr>
-        <p:cNvPr id="1" name=""/>
-        <p:cNvGrpSpPr/>
-        <p:nvPr/>
-      </p:nvGrpSpPr>
-      <p:grpSpPr>
-        <a:xfrm>
-          <a:off x="0" y="0"/>
-          <a:ext cx="0" cy="0"/>
-          <a:chOff x="0" y="0"/>
-          <a:chExt cx="0" cy="0"/>
-        </a:xfrm>
-      </p:grpSpPr>
-      <p:sp>
-        <p:nvSpPr>
-          <p:cNvPr id="4" name="Заголовок 3"/>
-          <p:cNvSpPr>
-            <a:spLocks noGrp="1"/>
-          </p:cNvSpPr>
-          <p:nvPr>
-            <p:ph type="title"/>
-          </p:nvPr>
-        </p:nvSpPr>
-        <p:spPr/>
-        <p:txBody>
-          <a:bodyPr/>
-          <a:lstStyle/>
-          <a:p>
-            <a:r>
-              <a:rPr lang="ru-RU" dirty="0" smtClean="0"/>
-              <a:t>Контакты</a:t>
-            </a:r>
-            <a:endParaRPr lang="ru-RU" dirty="0"/>
-          </a:p>
-        </p:txBody>
-      </p:sp>
-      <p:sp>
-        <p:nvSpPr>
-          <p:cNvPr id="5" name="Объект 4"/>
-          <p:cNvSpPr>
-            <a:spLocks noGrp="1"/>
-          </p:cNvSpPr>
-          <p:nvPr>
-            <p:ph idx="1"/>
-          </p:nvPr>
-        </p:nvSpPr>
-        <p:spPr/>
-        <p:txBody>
-          <a:bodyPr/>
-          <a:lstStyle/>
-          <a:p>
-            <a:r>
-              <a:rPr lang="ru-RU" dirty="0" smtClean="0"/>
-              <a:t>Дмитрий Сошников</a:t>
-            </a:r>
-          </a:p>
-          <a:p>
-            <a:pPr lvl="1"/>
-            <a:r>
-              <a:rPr lang="en-US" dirty="0" smtClean="0"/>
-              <a:t>Microsoft</a:t>
-            </a:r>
-          </a:p>
-          <a:p>
-            <a:pPr lvl="1"/>
-            <a:r>
-              <a:rPr lang="en-US" dirty="0" smtClean="0"/>
-              <a:t>dmitryso@microsoft.com &amp; @</a:t>
-            </a:r>
-            <a:r>
-              <a:rPr lang="en-US" dirty="0" err="1" smtClean="0"/>
-              <a:t>shwars</a:t>
-            </a:r>
-            <a:r>
-              <a:rPr lang="en-US" dirty="0" smtClean="0"/>
-              <a:t> </a:t>
-            </a:r>
-          </a:p>
-          <a:p>
-            <a:pPr lvl="1"/>
-            <a:r>
-              <a:rPr lang="en-US" dirty="0" smtClean="0"/>
-              <a:t>blogs.msdn.com/</a:t>
-            </a:r>
-            <a:r>
-              <a:rPr lang="en-US" dirty="0" err="1" smtClean="0"/>
-              <a:t>sos</a:t>
-            </a:r>
-            <a:r>
-              <a:rPr lang="en-US" dirty="0" smtClean="0"/>
-              <a:t> &amp; blog.soshnikov.com</a:t>
-            </a:r>
-            <a:endParaRPr lang="ru-RU" dirty="0"/>
-          </a:p>
-        </p:txBody>
-      </p:sp>
-      <p:pic>
-        <p:nvPicPr>
-          <p:cNvPr id="3" name="Рисунок 2"/>
-          <p:cNvPicPr>
-            <a:picLocks noGrp="1" noChangeAspect="1"/>
-          </p:cNvPicPr>
-          <p:nvPr>
-            <p:ph type="pic" sz="quarter" idx="10"/>
-          </p:nvPr>
-        </p:nvPicPr>
-        <p:blipFill>
-          <a:blip r:embed="rId2" cstate="print">
-            <a:extLst>
-              <a:ext uri="{28A0092B-C50C-407E-A947-70E740481C1C}">
-                <a14:useLocalDpi xmlns:a14="http://schemas.microsoft.com/office/drawing/2010/main" val="0"/>
-              </a:ext>
-            </a:extLst>
-          </a:blip>
-          <a:stretch>
-            <a:fillRect/>
-          </a:stretch>
-        </p:blipFill>
-        <p:spPr>
-          <a:xfrm>
-            <a:off x="1229143" y="1747619"/>
-            <a:ext cx="1873714" cy="1922900"/>
-          </a:xfrm>
-        </p:spPr>
-      </p:pic>
-    </p:spTree>
-    <p:extLst>
-      <p:ext uri="{BB962C8B-B14F-4D97-AF65-F5344CB8AC3E}">
-        <p14:creationId xmlns:p14="http://schemas.microsoft.com/office/powerpoint/2010/main" val="422195394"/>
-      </p:ext>
-    </p:extLst>
-  </p:cSld>
-  <p:clrMapOvr>
-    <a:masterClrMapping/>
-  </p:clrMapOvr>
-</p:sld>
-</file>
-
-<file path=ppt/slides/slide8.xml><?xml version="1.0" encoding="utf-8"?>
-<p:sld xmlns:a="http://schemas.openxmlformats.org/drawingml/2006/main" xmlns:r="http://schemas.openxmlformats.org/officeDocument/2006/relationships" xmlns:p="http://schemas.openxmlformats.org/presentationml/2006/main">
-  <p:cSld>
-    <p:spTree>
-      <p:nvGrpSpPr>
-        <p:cNvPr id="1" name=""/>
-        <p:cNvGrpSpPr/>
-        <p:nvPr/>
-      </p:nvGrpSpPr>
-      <p:grpSpPr>
-        <a:xfrm>
-          <a:off x="0" y="0"/>
-          <a:ext cx="0" cy="0"/>
-          <a:chOff x="0" y="0"/>
-          <a:chExt cx="0" cy="0"/>
-        </a:xfrm>
-      </p:grpSpPr>
-    </p:spTree>
-    <p:extLst>
-      <p:ext uri="{BB962C8B-B14F-4D97-AF65-F5344CB8AC3E}">
-        <p14:creationId xmlns:p14="http://schemas.microsoft.com/office/powerpoint/2010/main" val="2717568389"/>
-      </p:ext>
-    </p:extLst>
-  </p:cSld>
-  <p:clrMapOvr>
-    <a:masterClrMapping/>
-  </p:clrMapOvr>
-  <mc:AlternateContent xmlns:mc="http://schemas.openxmlformats.org/markup-compatibility/2006" xmlns:p14="http://schemas.microsoft.com/office/powerpoint/2010/main">
-    <mc:Choice Requires="p14">
-      <p:transition p14:dur="0"/>
-    </mc:Choice>
-    <mc:Fallback xmlns="">
-      <p:transition/>
-    </mc:Fallback>
-  </mc:AlternateContent>
 </p:sld>
 </file>
 
@@ -32232,21 +34321,6 @@
 </file>
 
 <file path=customXml/item1.xml><?xml version="1.0" encoding="utf-8"?>
-<?mso-contentType ?>
-<FormTemplates xmlns="http://schemas.microsoft.com/sharepoint/v3/contenttype/forms">
-  <Display>DocumentLibraryForm</Display>
-  <Edit>DocumentLibraryForm</Edit>
-  <New>DocumentLibraryForm</New>
-</FormTemplates>
-</file>
-
-<file path=customXml/item2.xml><?xml version="1.0" encoding="utf-8"?>
-<p:properties xmlns:p="http://schemas.microsoft.com/office/2006/metadata/properties" xmlns:xsi="http://www.w3.org/2001/XMLSchema-instance" xmlns:pc="http://schemas.microsoft.com/office/infopath/2007/PartnerControls">
-  <documentManagement/>
-</p:properties>
-</file>
-
-<file path=customXml/item3.xml><?xml version="1.0" encoding="utf-8"?>
 <ct:contentTypeSchema xmlns:ct="http://schemas.microsoft.com/office/2006/metadata/contentType" xmlns:ma="http://schemas.microsoft.com/office/2006/metadata/properties/metaAttributes" ct:_="" ma:_="" ma:contentTypeName="Document" ma:contentTypeID="0x01010076BDC9AB8D85574E92B3FF85DD8EEE9A" ma:contentTypeVersion="0" ma:contentTypeDescription="Create a new document." ma:contentTypeScope="" ma:versionID="ddc91d68531740eb4ffac8dfd0ac3039">
   <xsd:schema xmlns:xsd="http://www.w3.org/2001/XMLSchema" xmlns:xs="http://www.w3.org/2001/XMLSchema" xmlns:p="http://schemas.microsoft.com/office/2006/metadata/properties" targetNamespace="http://schemas.microsoft.com/office/2006/metadata/properties" ma:root="true" ma:fieldsID="595fb8ec1e0e1cfd5b45b077016c9ed3">
     <xsd:element name="properties">
@@ -32360,30 +34434,22 @@
 </ct:contentTypeSchema>
 </file>
 
-<file path=customXml/itemProps1.xml><?xml version="1.0" encoding="utf-8"?>
-<ds:datastoreItem xmlns:ds="http://schemas.openxmlformats.org/officeDocument/2006/customXml" ds:itemID="{1C1284F2-D5A2-482D-9283-38905BD416F7}">
-  <ds:schemaRefs>
-    <ds:schemaRef ds:uri="http://schemas.microsoft.com/sharepoint/v3/contenttype/forms"/>
-  </ds:schemaRefs>
-</ds:datastoreItem>
+<file path=customXml/item2.xml><?xml version="1.0" encoding="utf-8"?>
+<?mso-contentType ?>
+<FormTemplates xmlns="http://schemas.microsoft.com/sharepoint/v3/contenttype/forms">
+  <Display>DocumentLibraryForm</Display>
+  <Edit>DocumentLibraryForm</Edit>
+  <New>DocumentLibraryForm</New>
+</FormTemplates>
 </file>
 
-<file path=customXml/itemProps2.xml><?xml version="1.0" encoding="utf-8"?>
-<ds:datastoreItem xmlns:ds="http://schemas.openxmlformats.org/officeDocument/2006/customXml" ds:itemID="{136497CF-FFDF-4FDB-8278-A4E189869E9B}">
-  <ds:schemaRefs>
-    <ds:schemaRef ds:uri="http://schemas.microsoft.com/office/2006/metadata/properties"/>
-    <ds:schemaRef ds:uri="http://purl.org/dc/terms/"/>
-    <ds:schemaRef ds:uri="http://schemas.openxmlformats.org/package/2006/metadata/core-properties"/>
-    <ds:schemaRef ds:uri="http://schemas.microsoft.com/office/2006/documentManagement/types"/>
-    <ds:schemaRef ds:uri="http://purl.org/dc/dcmitype/"/>
-    <ds:schemaRef ds:uri="http://schemas.microsoft.com/office/infopath/2007/PartnerControls"/>
-    <ds:schemaRef ds:uri="http://purl.org/dc/elements/1.1/"/>
-    <ds:schemaRef ds:uri="http://www.w3.org/XML/1998/namespace"/>
-  </ds:schemaRefs>
-</ds:datastoreItem>
+<file path=customXml/item3.xml><?xml version="1.0" encoding="utf-8"?>
+<p:properties xmlns:p="http://schemas.microsoft.com/office/2006/metadata/properties" xmlns:xsi="http://www.w3.org/2001/XMLSchema-instance" xmlns:pc="http://schemas.microsoft.com/office/infopath/2007/PartnerControls">
+  <documentManagement/>
+</p:properties>
 </file>
 
-<file path=customXml/itemProps3.xml><?xml version="1.0" encoding="utf-8"?>
+<file path=customXml/itemProps1.xml><?xml version="1.0" encoding="utf-8"?>
 <ds:datastoreItem xmlns:ds="http://schemas.openxmlformats.org/officeDocument/2006/customXml" ds:itemID="{53B502EA-CC61-4C3A-9239-E889C59E2245}">
   <ds:schemaRefs>
     <ds:schemaRef ds:uri="http://schemas.microsoft.com/office/2006/metadata/contentType"/>
@@ -32397,4 +34463,27 @@
     <ds:schemaRef ds:uri="http://schemas.microsoft.com/office/infopath/2007/PartnerControls"/>
   </ds:schemaRefs>
 </ds:datastoreItem>
+</file>
+
+<file path=customXml/itemProps2.xml><?xml version="1.0" encoding="utf-8"?>
+<ds:datastoreItem xmlns:ds="http://schemas.openxmlformats.org/officeDocument/2006/customXml" ds:itemID="{1C1284F2-D5A2-482D-9283-38905BD416F7}">
+  <ds:schemaRefs>
+    <ds:schemaRef ds:uri="http://schemas.microsoft.com/sharepoint/v3/contenttype/forms"/>
+  </ds:schemaRefs>
+</ds:datastoreItem>
+</file>
+
+<file path=customXml/itemProps3.xml><?xml version="1.0" encoding="utf-8"?>
+<ds:datastoreItem xmlns:ds="http://schemas.openxmlformats.org/officeDocument/2006/customXml" ds:itemID="{136497CF-FFDF-4FDB-8278-A4E189869E9B}">
+  <ds:schemaRefs>
+    <ds:schemaRef ds:uri="http://schemas.microsoft.com/office/2006/metadata/properties"/>
+    <ds:schemaRef ds:uri="http://purl.org/dc/terms/"/>
+    <ds:schemaRef ds:uri="http://schemas.openxmlformats.org/package/2006/metadata/core-properties"/>
+    <ds:schemaRef ds:uri="http://schemas.microsoft.com/office/2006/documentManagement/types"/>
+    <ds:schemaRef ds:uri="http://purl.org/dc/dcmitype/"/>
+    <ds:schemaRef ds:uri="http://schemas.microsoft.com/office/infopath/2007/PartnerControls"/>
+    <ds:schemaRef ds:uri="http://purl.org/dc/elements/1.1/"/>
+    <ds:schemaRef ds:uri="http://www.w3.org/XML/1998/namespace"/>
+  </ds:schemaRefs>
+</ds:datastoreItem>
 </file>
</xml_diff>

<commit_message>
Add Module 4+Lab 4
</commit_message>
<xml_diff>
--- a/01. Introduction to UWP/1a. XAML Controls.pptx
+++ b/01. Introduction to UWP/1a. XAML Controls.pptx
@@ -219,7 +219,7 @@
           <a:p>
             <a:fld id="{94239FBE-FC08-4336-9B53-CDE8BC5ED33D}" type="datetimeFigureOut">
               <a:rPr lang="ru-RU" smtClean="0"/>
-              <a:t>05.12.2015</a:t>
+              <a:t>06.12.2015</a:t>
             </a:fld>
             <a:endParaRPr lang="ru-RU"/>
           </a:p>
@@ -384,7 +384,7 @@
           <a:p>
             <a:fld id="{135EBF37-D0C5-4B7C-9D35-9D2E20CA27EC}" type="datetimeFigureOut">
               <a:rPr lang="ru-RU" smtClean="0"/>
-              <a:t>05.12.2015</a:t>
+              <a:t>06.12.2015</a:t>
             </a:fld>
             <a:endParaRPr lang="ru-RU"/>
           </a:p>
@@ -1073,7 +1073,7 @@
                   <a:spcPct val="0"/>
                 </a:spcAft>
               </a:pPr>
-              <a:t>12/5/2015 7:33 PM</a:t>
+              <a:t>12/6/2015 11:57 AM</a:t>
             </a:fld>
             <a:endParaRPr lang="en-US"/>
           </a:p>
@@ -9940,7 +9940,7 @@
             <a:fld id="{B9E0730F-B7E3-6A47-BE8A-187D77555B7C}" type="datetimeFigureOut">
               <a:rPr lang="en-US" smtClean="0"/>
               <a:pPr/>
-              <a:t>12/5/2015</a:t>
+              <a:t>12/6/2015</a:t>
             </a:fld>
             <a:endParaRPr lang="en-US"/>
           </a:p>
@@ -27296,16 +27296,20 @@
               <a:rPr lang="ru-RU" sz="4000" dirty="0" smtClean="0"/>
             </a:br>
             <a:r>
+              <a:rPr lang="ru-RU" sz="4000" smtClean="0"/>
+              <a:t>Модуль 1</a:t>
+            </a:r>
+            <a:r>
+              <a:rPr lang="ru-RU" sz="4000" smtClean="0"/>
+              <a:t>.2:</a:t>
+            </a:r>
+            <a:r>
+              <a:rPr lang="ru-RU" sz="4000" smtClean="0"/>
+              <a:t> </a:t>
+            </a:r>
+            <a:r>
               <a:rPr lang="ru-RU" sz="4000" dirty="0" smtClean="0"/>
-              <a:t>Часть 1</a:t>
-            </a:r>
-            <a:r>
-              <a:rPr lang="en-US" sz="4000" dirty="0" smtClean="0"/>
-              <a:t>a</a:t>
-            </a:r>
-            <a:r>
-              <a:rPr lang="ru-RU" sz="4000" dirty="0" smtClean="0"/>
-              <a:t>: Элементы управления </a:t>
+              <a:t>Элементы управления </a:t>
             </a:r>
             <a:r>
               <a:rPr lang="en-US" sz="4000" dirty="0" smtClean="0"/>
@@ -28333,7 +28337,6 @@
               <a:rPr lang="ru-RU" sz="2800" dirty="0" smtClean="0"/>
               <a:t>предоставляет богатый выбор элементов управления</a:t>
             </a:r>
-            <a:endParaRPr lang="ru-RU" sz="2800" dirty="0" smtClean="0"/>
           </a:p>
           <a:p>
             <a:r>
@@ -28344,11 +28347,7 @@
           <a:p>
             <a:r>
               <a:rPr lang="ru-RU" sz="2800" dirty="0" smtClean="0"/>
-              <a:t>Мы научились произвольно позиционироват</a:t>
-            </a:r>
-            <a:r>
-              <a:rPr lang="ru-RU" sz="2800" dirty="0" smtClean="0"/>
-              <a:t>ь элементы и перемещать их, а значит можно делать игры!</a:t>
+              <a:t>Мы научились произвольно позиционировать элементы и перемещать их, а значит можно делать игры!</a:t>
             </a:r>
           </a:p>
           <a:p>
@@ -31941,15 +31940,7 @@
           <a:p>
             <a:r>
               <a:rPr lang="en-US" dirty="0" smtClean="0"/>
-              <a:t>DEMO </a:t>
-            </a:r>
-            <a:r>
-              <a:rPr lang="en-US" dirty="0" smtClean="0"/>
-              <a:t>03:</a:t>
-            </a:r>
-            <a:r>
-              <a:rPr lang="en-US" dirty="0" smtClean="0"/>
-              <a:t/>
+              <a:t>DEMO 03:</a:t>
             </a:r>
             <a:br>
               <a:rPr lang="en-US" dirty="0" smtClean="0"/>
@@ -32398,15 +32389,7 @@
           <a:p>
             <a:r>
               <a:rPr lang="en-US" dirty="0" smtClean="0"/>
-              <a:t>DEMO </a:t>
-            </a:r>
-            <a:r>
-              <a:rPr lang="en-US" dirty="0" smtClean="0"/>
-              <a:t>04:</a:t>
-            </a:r>
-            <a:r>
-              <a:rPr lang="en-US" dirty="0" smtClean="0"/>
-              <a:t/>
+              <a:t>DEMO 04:</a:t>
             </a:r>
             <a:br>
               <a:rPr lang="en-US" dirty="0" smtClean="0"/>
@@ -34321,6 +34304,15 @@
 </file>
 
 <file path=customXml/item1.xml><?xml version="1.0" encoding="utf-8"?>
+<?mso-contentType ?>
+<FormTemplates xmlns="http://schemas.microsoft.com/sharepoint/v3/contenttype/forms">
+  <Display>DocumentLibraryForm</Display>
+  <Edit>DocumentLibraryForm</Edit>
+  <New>DocumentLibraryForm</New>
+</FormTemplates>
+</file>
+
+<file path=customXml/item2.xml><?xml version="1.0" encoding="utf-8"?>
 <ct:contentTypeSchema xmlns:ct="http://schemas.microsoft.com/office/2006/metadata/contentType" xmlns:ma="http://schemas.microsoft.com/office/2006/metadata/properties/metaAttributes" ct:_="" ma:_="" ma:contentTypeName="Document" ma:contentTypeID="0x01010076BDC9AB8D85574E92B3FF85DD8EEE9A" ma:contentTypeVersion="0" ma:contentTypeDescription="Create a new document." ma:contentTypeScope="" ma:versionID="ddc91d68531740eb4ffac8dfd0ac3039">
   <xsd:schema xmlns:xsd="http://www.w3.org/2001/XMLSchema" xmlns:xs="http://www.w3.org/2001/XMLSchema" xmlns:p="http://schemas.microsoft.com/office/2006/metadata/properties" targetNamespace="http://schemas.microsoft.com/office/2006/metadata/properties" ma:root="true" ma:fieldsID="595fb8ec1e0e1cfd5b45b077016c9ed3">
     <xsd:element name="properties">
@@ -34434,15 +34426,6 @@
 </ct:contentTypeSchema>
 </file>
 
-<file path=customXml/item2.xml><?xml version="1.0" encoding="utf-8"?>
-<?mso-contentType ?>
-<FormTemplates xmlns="http://schemas.microsoft.com/sharepoint/v3/contenttype/forms">
-  <Display>DocumentLibraryForm</Display>
-  <Edit>DocumentLibraryForm</Edit>
-  <New>DocumentLibraryForm</New>
-</FormTemplates>
-</file>
-
 <file path=customXml/item3.xml><?xml version="1.0" encoding="utf-8"?>
 <p:properties xmlns:p="http://schemas.microsoft.com/office/2006/metadata/properties" xmlns:xsi="http://www.w3.org/2001/XMLSchema-instance" xmlns:pc="http://schemas.microsoft.com/office/infopath/2007/PartnerControls">
   <documentManagement/>
@@ -34450,6 +34433,14 @@
 </file>
 
 <file path=customXml/itemProps1.xml><?xml version="1.0" encoding="utf-8"?>
+<ds:datastoreItem xmlns:ds="http://schemas.openxmlformats.org/officeDocument/2006/customXml" ds:itemID="{1C1284F2-D5A2-482D-9283-38905BD416F7}">
+  <ds:schemaRefs>
+    <ds:schemaRef ds:uri="http://schemas.microsoft.com/sharepoint/v3/contenttype/forms"/>
+  </ds:schemaRefs>
+</ds:datastoreItem>
+</file>
+
+<file path=customXml/itemProps2.xml><?xml version="1.0" encoding="utf-8"?>
 <ds:datastoreItem xmlns:ds="http://schemas.openxmlformats.org/officeDocument/2006/customXml" ds:itemID="{53B502EA-CC61-4C3A-9239-E889C59E2245}">
   <ds:schemaRefs>
     <ds:schemaRef ds:uri="http://schemas.microsoft.com/office/2006/metadata/contentType"/>
@@ -34461,14 +34452,6 @@
     <ds:schemaRef ds:uri="http://purl.org/dc/terms/"/>
     <ds:schemaRef ds:uri="http://schemas.microsoft.com/internal/obd"/>
     <ds:schemaRef ds:uri="http://schemas.microsoft.com/office/infopath/2007/PartnerControls"/>
-  </ds:schemaRefs>
-</ds:datastoreItem>
-</file>
-
-<file path=customXml/itemProps2.xml><?xml version="1.0" encoding="utf-8"?>
-<ds:datastoreItem xmlns:ds="http://schemas.openxmlformats.org/officeDocument/2006/customXml" ds:itemID="{1C1284F2-D5A2-482D-9283-38905BD416F7}">
-  <ds:schemaRefs>
-    <ds:schemaRef ds:uri="http://schemas.microsoft.com/sharepoint/v3/contenttype/forms"/>
   </ds:schemaRefs>
 </ds:datastoreItem>
 </file>

</xml_diff>

<commit_message>
Add english slides/labs for Modules 1-4
</commit_message>
<xml_diff>
--- a/01. Introduction to UWP/1a. XAML Controls.pptx
+++ b/01. Introduction to UWP/1a. XAML Controls.pptx
@@ -14,7 +14,7 @@
     <p:handoutMasterId r:id="rId23"/>
   </p:handoutMasterIdLst>
   <p:sldIdLst>
-    <p:sldId id="272" r:id="rId8"/>
+    <p:sldId id="330" r:id="rId8"/>
     <p:sldId id="324" r:id="rId9"/>
     <p:sldId id="319" r:id="rId10"/>
     <p:sldId id="322" r:id="rId11"/>
@@ -26,7 +26,7 @@
     <p:sldId id="328" r:id="rId17"/>
     <p:sldId id="329" r:id="rId18"/>
     <p:sldId id="315" r:id="rId19"/>
-    <p:sldId id="300" r:id="rId20"/>
+    <p:sldId id="331" r:id="rId20"/>
     <p:sldId id="301" r:id="rId21"/>
   </p:sldIdLst>
   <p:sldSz cx="12192000" cy="6858000"/>
@@ -1073,7 +1073,7 @@
                   <a:spcPct val="0"/>
                 </a:spcAft>
               </a:pPr>
-              <a:t>12/6/2015 11:57 AM</a:t>
+              <a:t>12/6/2015 11:10 PM</a:t>
             </a:fld>
             <a:endParaRPr lang="en-US"/>
           </a:p>
@@ -27278,12 +27278,12 @@
               </a:lnSpc>
             </a:pPr>
             <a:r>
-              <a:rPr lang="ru-RU" sz="4000" dirty="0" smtClean="0"/>
-              <a:t>Введение в разработку универсальных приложений на платформе </a:t>
-            </a:r>
-            <a:r>
               <a:rPr lang="en-US" sz="4000" dirty="0" smtClean="0"/>
-              <a:t>Windows</a:t>
+              <a:t>Universal Application Development on Windows Platform for Beginners</a:t>
+            </a:r>
+            <a:r>
+              <a:rPr lang="en-US" sz="4000" dirty="0" smtClean="0"/>
+              <a:t/>
             </a:r>
             <a:br>
               <a:rPr lang="en-US" sz="4000" dirty="0" smtClean="0"/>
@@ -27296,24 +27296,8 @@
               <a:rPr lang="ru-RU" sz="4000" dirty="0" smtClean="0"/>
             </a:br>
             <a:r>
-              <a:rPr lang="ru-RU" sz="4000" smtClean="0"/>
-              <a:t>Модуль 1</a:t>
-            </a:r>
-            <a:r>
-              <a:rPr lang="ru-RU" sz="4000" smtClean="0"/>
-              <a:t>.2:</a:t>
-            </a:r>
-            <a:r>
-              <a:rPr lang="ru-RU" sz="4000" smtClean="0"/>
-              <a:t> </a:t>
-            </a:r>
-            <a:r>
-              <a:rPr lang="ru-RU" sz="4000" dirty="0" smtClean="0"/>
-              <a:t>Элементы управления </a:t>
-            </a:r>
-            <a:r>
               <a:rPr lang="en-US" sz="4000" dirty="0" smtClean="0"/>
-              <a:t>XAML</a:t>
+              <a:t>Module 1.2: XAML Controls</a:t>
             </a:r>
             <a:endParaRPr lang="ru-RU" sz="4000" dirty="0"/>
           </a:p>
@@ -27342,8 +27326,8 @@
           <a:lstStyle/>
           <a:p>
             <a:r>
-              <a:rPr lang="ru-RU" dirty="0" smtClean="0"/>
-              <a:t>Дмитрий Сошников</a:t>
+              <a:rPr lang="en-US" dirty="0" smtClean="0"/>
+              <a:t>Dmitry Soshnikov</a:t>
             </a:r>
             <a:endParaRPr lang="en-US" dirty="0" smtClean="0"/>
           </a:p>
@@ -27409,7 +27393,7 @@
     </p:spTree>
     <p:extLst>
       <p:ext uri="{BB962C8B-B14F-4D97-AF65-F5344CB8AC3E}">
-        <p14:creationId xmlns:p14="http://schemas.microsoft.com/office/powerpoint/2010/main" val="2520592165"/>
+        <p14:creationId xmlns:p14="http://schemas.microsoft.com/office/powerpoint/2010/main" val="3016936317"/>
       </p:ext>
     </p:extLst>
   </p:cSld>
@@ -27615,16 +27599,8 @@
               <a:t> </a:t>
             </a:r>
             <a:r>
-              <a:rPr lang="ru-RU" sz="2353" dirty="0" smtClean="0"/>
-              <a:t>разрабатывается на </a:t>
-            </a:r>
-            <a:r>
               <a:rPr lang="en-US" sz="2353" dirty="0" smtClean="0"/>
-              <a:t>XAML </a:t>
-            </a:r>
-            <a:r>
-              <a:rPr lang="ru-RU" sz="2353" dirty="0" smtClean="0"/>
-              <a:t>как отдельная страничка</a:t>
+              <a:t>is laid out in XAML as a separate page</a:t>
             </a:r>
             <a:endParaRPr lang="en-GB" sz="2353" dirty="0"/>
           </a:p>
@@ -27633,8 +27609,8 @@
           </a:p>
           <a:p>
             <a:r>
-              <a:rPr lang="ru-RU" sz="2353" dirty="0" smtClean="0"/>
-              <a:t>В коде для показа используется</a:t>
+              <a:rPr lang="en-US" sz="2353" dirty="0" smtClean="0"/>
+              <a:t>To show, use the following code</a:t>
             </a:r>
             <a:r>
               <a:rPr lang="en-GB" sz="2353" dirty="0" smtClean="0"/>
@@ -28302,8 +28278,8 @@
           <a:lstStyle/>
           <a:p>
             <a:r>
-              <a:rPr lang="ru-RU" dirty="0" smtClean="0"/>
-              <a:t>Мораль</a:t>
+              <a:rPr lang="en-US" dirty="0" smtClean="0"/>
+              <a:t>Conclusion</a:t>
             </a:r>
             <a:endParaRPr lang="ru-RU" dirty="0"/>
           </a:p>
@@ -28322,7 +28298,7 @@
         <p:spPr>
           <a:xfrm>
             <a:off x="269239" y="1189177"/>
-            <a:ext cx="7086761" cy="5013680"/>
+            <a:ext cx="7086761" cy="4004173"/>
           </a:xfrm>
         </p:spPr>
         <p:txBody>
@@ -28334,52 +28310,31 @@
               <a:t>XAML </a:t>
             </a:r>
             <a:r>
+              <a:rPr lang="en-US" sz="2800" dirty="0" smtClean="0"/>
+              <a:t>gives you wide variety of controls</a:t>
+            </a:r>
+            <a:endParaRPr lang="ru-RU" sz="2800" dirty="0" smtClean="0"/>
+          </a:p>
+          <a:p>
+            <a:r>
+              <a:rPr lang="en-US" sz="2800" dirty="0" smtClean="0"/>
+              <a:t>Containers automatically lay out elements on a page</a:t>
+            </a:r>
+            <a:endParaRPr lang="ru-RU" sz="2800" dirty="0" smtClean="0"/>
+          </a:p>
+          <a:p>
+            <a:r>
+              <a:rPr lang="en-US" sz="2800" dirty="0" smtClean="0"/>
+              <a:t>We can position elements arbitrarily, and thus we are ready to make games</a:t>
+            </a:r>
+            <a:r>
               <a:rPr lang="ru-RU" sz="2800" dirty="0" smtClean="0"/>
-              <a:t>предоставляет богатый выбор элементов управления</a:t>
-            </a:r>
-          </a:p>
-          <a:p>
-            <a:r>
-              <a:rPr lang="ru-RU" sz="2800" dirty="0" smtClean="0"/>
-              <a:t>Контейнеры обеспечивают автоматическое расположение элементов друг относительно друга</a:t>
-            </a:r>
-          </a:p>
-          <a:p>
-            <a:r>
-              <a:rPr lang="ru-RU" sz="2800" dirty="0" smtClean="0"/>
-              <a:t>Мы научились произвольно позиционировать элементы и перемещать их, а значит можно делать игры!</a:t>
-            </a:r>
-          </a:p>
-          <a:p>
-            <a:r>
-              <a:rPr lang="ru-RU" sz="2400" dirty="0" smtClean="0">
-                <a:solidFill>
-                  <a:schemeClr val="tx1">
-                    <a:lumMod val="75000"/>
-                  </a:schemeClr>
-                </a:solidFill>
-              </a:rPr>
-              <a:t>   В реальной жизни так игры обычно не делают,   </a:t>
-            </a:r>
-            <a:br>
-              <a:rPr lang="ru-RU" sz="2400" dirty="0" smtClean="0">
-                <a:solidFill>
-                  <a:schemeClr val="tx1">
-                    <a:lumMod val="75000"/>
-                  </a:schemeClr>
-                </a:solidFill>
-              </a:rPr>
-            </a:br>
-            <a:r>
-              <a:rPr lang="ru-RU" sz="2400" dirty="0" smtClean="0">
-                <a:solidFill>
-                  <a:schemeClr val="tx1">
-                    <a:lumMod val="75000"/>
-                  </a:schemeClr>
-                </a:solidFill>
-              </a:rPr>
-              <a:t>   поскольку рендеринг </a:t>
-            </a:r>
+              <a:t>!</a:t>
+            </a:r>
+            <a:endParaRPr lang="ru-RU" sz="2800" dirty="0" smtClean="0"/>
+          </a:p>
+          <a:p>
+            <a:pPr marL="265113"/>
             <a:r>
               <a:rPr lang="en-US" sz="2400" dirty="0" smtClean="0">
                 <a:solidFill>
@@ -28388,36 +28343,7 @@
                   </a:schemeClr>
                 </a:solidFill>
               </a:rPr>
-              <a:t>XAML </a:t>
-            </a:r>
-            <a:r>
-              <a:rPr lang="ru-RU" sz="2400" dirty="0" smtClean="0">
-                <a:solidFill>
-                  <a:schemeClr val="tx1">
-                    <a:lumMod val="75000"/>
-                  </a:schemeClr>
-                </a:solidFill>
-              </a:rPr>
-              <a:t>не </a:t>
-            </a:r>
-            <a:br>
-              <a:rPr lang="ru-RU" sz="2400" dirty="0" smtClean="0">
-                <a:solidFill>
-                  <a:schemeClr val="tx1">
-                    <a:lumMod val="75000"/>
-                  </a:schemeClr>
-                </a:solidFill>
-              </a:rPr>
-            </a:br>
-            <a:r>
-              <a:rPr lang="ru-RU" sz="2400" dirty="0" smtClean="0">
-                <a:solidFill>
-                  <a:schemeClr val="tx1">
-                    <a:lumMod val="75000"/>
-                  </a:schemeClr>
-                </a:solidFill>
-              </a:rPr>
-              <a:t>   использует аппаратное ускорение</a:t>
+              <a:t>In the real life, XAML is rarely used for games,    because XAML Layout engine is not using hardware acceleration, and thus is not very performant</a:t>
             </a:r>
             <a:endParaRPr lang="ru-RU" sz="2800" dirty="0" smtClean="0">
               <a:solidFill>
@@ -28485,8 +28411,8 @@
           <a:lstStyle/>
           <a:p>
             <a:r>
-              <a:rPr lang="ru-RU" dirty="0" smtClean="0"/>
-              <a:t>Контакты</a:t>
+              <a:rPr lang="en-US" dirty="0" smtClean="0"/>
+              <a:t>Contact</a:t>
             </a:r>
             <a:endParaRPr lang="ru-RU" dirty="0"/>
           </a:p>
@@ -28508,9 +28434,10 @@
           <a:lstStyle/>
           <a:p>
             <a:r>
-              <a:rPr lang="ru-RU" dirty="0" smtClean="0"/>
-              <a:t>Дмитрий Сошников</a:t>
-            </a:r>
+              <a:rPr lang="en-US" dirty="0" smtClean="0"/>
+              <a:t>Dmitry Soshnikov</a:t>
+            </a:r>
+            <a:endParaRPr lang="ru-RU" dirty="0" smtClean="0"/>
           </a:p>
           <a:p>
             <a:pPr lvl="1"/>
@@ -28523,16 +28450,13 @@
             <a:pPr lvl="1"/>
             <a:r>
               <a:rPr lang="en-US" dirty="0" smtClean="0"/>
-              <a:t>dmitryso@microsoft.com &amp; @</a:t>
+              <a:t>dmitryso@microsoft.com &amp; vk.com/</a:t>
             </a:r>
             <a:r>
               <a:rPr lang="en-US" dirty="0" err="1" smtClean="0"/>
               <a:t>shwars</a:t>
             </a:r>
-            <a:r>
-              <a:rPr lang="en-US" dirty="0" smtClean="0"/>
-              <a:t> </a:t>
-            </a:r>
+            <a:endParaRPr lang="en-US" dirty="0" smtClean="0"/>
           </a:p>
           <a:p>
             <a:pPr lvl="1"/>
@@ -28547,6 +28471,17 @@
             <a:r>
               <a:rPr lang="en-US" dirty="0" smtClean="0"/>
               <a:t> &amp; blog.soshnikov.com</a:t>
+            </a:r>
+          </a:p>
+          <a:p>
+            <a:pPr lvl="1"/>
+            <a:r>
+              <a:rPr lang="en-US" dirty="0" smtClean="0"/>
+              <a:t>twitter: @</a:t>
+            </a:r>
+            <a:r>
+              <a:rPr lang="en-US" dirty="0" err="1" smtClean="0"/>
+              <a:t>shwars</a:t>
             </a:r>
             <a:endParaRPr lang="ru-RU" dirty="0"/>
           </a:p>
@@ -28584,7 +28519,7 @@
     </p:spTree>
     <p:extLst>
       <p:ext uri="{BB962C8B-B14F-4D97-AF65-F5344CB8AC3E}">
-        <p14:creationId xmlns:p14="http://schemas.microsoft.com/office/powerpoint/2010/main" val="422195394"/>
+        <p14:creationId xmlns:p14="http://schemas.microsoft.com/office/powerpoint/2010/main" val="1206516212"/>
       </p:ext>
     </p:extLst>
   </p:cSld>
@@ -28670,12 +28605,8 @@
           <a:lstStyle/>
           <a:p>
             <a:r>
-              <a:rPr lang="ru-RU" dirty="0" smtClean="0"/>
-              <a:t>Синтаксис </a:t>
-            </a:r>
-            <a:r>
               <a:rPr lang="en-US" dirty="0" smtClean="0"/>
-              <a:t>XAML</a:t>
+              <a:t>XAML Syntax</a:t>
             </a:r>
             <a:endParaRPr lang="ru-RU" dirty="0"/>
           </a:p>
@@ -29248,7 +29179,7 @@
         <p:spPr>
           <a:xfrm>
             <a:off x="347682" y="1427414"/>
-            <a:ext cx="2742867" cy="461665"/>
+            <a:ext cx="2862643" cy="461665"/>
           </a:xfrm>
           <a:prstGeom prst="rect">
             <a:avLst/>
@@ -29262,8 +29193,8 @@
           <a:lstStyle/>
           <a:p>
             <a:r>
-              <a:rPr lang="ru-RU" sz="2400" dirty="0" smtClean="0"/>
-              <a:t>Теги с атрибутами</a:t>
+              <a:rPr lang="en-US" sz="2400" dirty="0" smtClean="0"/>
+              <a:t>Tags with Attributes</a:t>
             </a:r>
             <a:endParaRPr lang="ru-RU" sz="2400" dirty="0"/>
           </a:p>
@@ -29278,7 +29209,7 @@
         <p:spPr>
           <a:xfrm>
             <a:off x="347681" y="2743267"/>
-            <a:ext cx="3505832" cy="461665"/>
+            <a:ext cx="2587503" cy="461665"/>
           </a:xfrm>
           <a:prstGeom prst="rect">
             <a:avLst/>
@@ -29292,8 +29223,8 @@
           <a:lstStyle/>
           <a:p>
             <a:r>
-              <a:rPr lang="ru-RU" sz="2400" dirty="0" smtClean="0"/>
-              <a:t>Атрибут по умолчанию</a:t>
+              <a:rPr lang="en-US" sz="2400" dirty="0" smtClean="0"/>
+              <a:t>Default Attributes</a:t>
             </a:r>
             <a:endParaRPr lang="ru-RU" sz="2400" dirty="0"/>
           </a:p>
@@ -29308,7 +29239,7 @@
         <p:spPr>
           <a:xfrm>
             <a:off x="347681" y="4087952"/>
-            <a:ext cx="7208384" cy="461665"/>
+            <a:ext cx="6247159" cy="461665"/>
           </a:xfrm>
           <a:prstGeom prst="rect">
             <a:avLst/>
@@ -29322,12 +29253,20 @@
           <a:lstStyle/>
           <a:p>
             <a:r>
-              <a:rPr lang="ru-RU" sz="2400" dirty="0" smtClean="0"/>
-              <a:t>Подробное задание атрибута </a:t>
+              <a:rPr lang="en-US" sz="2400" dirty="0" smtClean="0"/>
+              <a:t>Detailed Attribute Definition </a:t>
             </a:r>
             <a:r>
               <a:rPr lang="ru-RU" sz="1600" dirty="0" smtClean="0"/>
-              <a:t>(могут быть вложенные теги)</a:t>
+              <a:t>(</a:t>
+            </a:r>
+            <a:r>
+              <a:rPr lang="en-US" sz="1600" dirty="0" smtClean="0"/>
+              <a:t>can contain other tags</a:t>
+            </a:r>
+            <a:r>
+              <a:rPr lang="ru-RU" sz="1600" dirty="0" smtClean="0"/>
+              <a:t>)</a:t>
             </a:r>
             <a:endParaRPr lang="ru-RU" sz="2400" dirty="0"/>
           </a:p>
@@ -29591,12 +29530,8 @@
           <a:lstStyle/>
           <a:p>
             <a:r>
-              <a:rPr lang="ru-RU" dirty="0" smtClean="0"/>
-              <a:t>Некоторые элементы управления </a:t>
-            </a:r>
-            <a:r>
               <a:rPr lang="en-US" dirty="0" smtClean="0"/>
-              <a:t>XAML</a:t>
+              <a:t>Some Useful XAML Controls</a:t>
             </a:r>
             <a:endParaRPr lang="ru-RU" dirty="0"/>
           </a:p>
@@ -29954,10 +29889,10 @@
               <a:buNone/>
             </a:pPr>
             <a:r>
-              <a:rPr lang="ru-RU" b="1" dirty="0" smtClean="0">
+              <a:rPr lang="en-US" b="1" dirty="0" smtClean="0">
                 <a:latin typeface="+mn-lt"/>
               </a:rPr>
-              <a:t>Контейнеры</a:t>
+              <a:t>Containers</a:t>
             </a:r>
             <a:endParaRPr lang="ru-RU" b="1" dirty="0">
               <a:latin typeface="+mn-lt"/>
@@ -30215,10 +30150,10 @@
               <a:buNone/>
             </a:pPr>
             <a:r>
-              <a:rPr lang="ru-RU" b="1" dirty="0" smtClean="0">
+              <a:rPr lang="en-US" b="1" dirty="0" smtClean="0">
                 <a:latin typeface="+mn-lt"/>
               </a:rPr>
-              <a:t>Простые элементы</a:t>
+              <a:t>Simple Elements</a:t>
             </a:r>
             <a:endParaRPr lang="ru-RU" b="1" dirty="0">
               <a:latin typeface="+mn-lt"/>
@@ -30752,10 +30687,10 @@
               <a:buNone/>
             </a:pPr>
             <a:r>
-              <a:rPr lang="ru-RU" b="1" dirty="0" smtClean="0">
+              <a:rPr lang="en-US" b="1" dirty="0" smtClean="0">
                 <a:latin typeface="+mn-lt"/>
               </a:rPr>
-              <a:t>Коллекции</a:t>
+              <a:t>Collections</a:t>
             </a:r>
             <a:endParaRPr lang="ru-RU" b="1" dirty="0">
               <a:latin typeface="+mn-lt"/>
@@ -31308,10 +31243,10 @@
               <a:buNone/>
             </a:pPr>
             <a:r>
-              <a:rPr lang="ru-RU" b="1" dirty="0" smtClean="0">
+              <a:rPr lang="en-US" b="1" dirty="0" smtClean="0">
                 <a:latin typeface="+mn-lt"/>
               </a:rPr>
-              <a:t>Хитрые элементы</a:t>
+              <a:t>Tricky Elements</a:t>
             </a:r>
             <a:endParaRPr lang="ru-RU" b="1" dirty="0">
               <a:latin typeface="+mn-lt"/>
@@ -31432,7 +31367,7 @@
         <p:spPr>
           <a:xfrm>
             <a:off x="3216000" y="4706088"/>
-            <a:ext cx="4860000" cy="1680460"/>
+            <a:ext cx="4860000" cy="1126462"/>
           </a:xfrm>
           <a:prstGeom prst="rect">
             <a:avLst/>
@@ -31488,6 +31423,40 @@
               <a:t> </a:t>
             </a:r>
             <a:r>
+              <a:rPr lang="en-US" sz="2000" dirty="0" smtClean="0">
+                <a:gradFill>
+                  <a:gsLst>
+                    <a:gs pos="2917">
+                      <a:schemeClr val="tx1"/>
+                    </a:gs>
+                    <a:gs pos="30000">
+                      <a:schemeClr val="tx1"/>
+                    </a:gs>
+                  </a:gsLst>
+                  <a:lin ang="5400000" scaled="0"/>
+                </a:gradFill>
+                <a:latin typeface="+mj-lt"/>
+              </a:rPr>
+              <a:t>can be used for vertica</a:t>
+            </a:r>
+            <a:r>
+              <a:rPr lang="en-US" sz="2000" dirty="0" smtClean="0">
+                <a:gradFill>
+                  <a:gsLst>
+                    <a:gs pos="2917">
+                      <a:schemeClr val="tx1"/>
+                    </a:gs>
+                    <a:gs pos="30000">
+                      <a:schemeClr val="tx1"/>
+                    </a:gs>
+                  </a:gsLst>
+                  <a:lin ang="5400000" scaled="0"/>
+                </a:gradFill>
+                <a:latin typeface="+mj-lt"/>
+              </a:rPr>
+              <a:t>l, as well as for horizontal</a:t>
+            </a:r>
+            <a:r>
               <a:rPr lang="ru-RU" sz="2000" dirty="0" smtClean="0">
                 <a:gradFill>
                   <a:gsLst>
@@ -31502,7 +31471,24 @@
                 </a:gradFill>
                 <a:latin typeface="+mj-lt"/>
               </a:rPr>
-              <a:t>может использоваться как для вертикального, так и для горизонтального (</a:t>
+              <a:t> </a:t>
+            </a:r>
+            <a:r>
+              <a:rPr lang="ru-RU" sz="2000" dirty="0" smtClean="0">
+                <a:gradFill>
+                  <a:gsLst>
+                    <a:gs pos="2917">
+                      <a:schemeClr val="tx1"/>
+                    </a:gs>
+                    <a:gs pos="30000">
+                      <a:schemeClr val="tx1"/>
+                    </a:gs>
+                  </a:gsLst>
+                  <a:lin ang="5400000" scaled="0"/>
+                </a:gradFill>
+                <a:latin typeface="+mj-lt"/>
+              </a:rPr>
+              <a:t>(</a:t>
             </a:r>
             <a:r>
               <a:rPr lang="en-US" sz="2000" dirty="0" smtClean="0">
@@ -31522,6 +31508,23 @@
               <a:t>Orientation=“Horizontal”) </a:t>
             </a:r>
             <a:r>
+              <a:rPr lang="en-US" sz="2000" dirty="0" smtClean="0">
+                <a:gradFill>
+                  <a:gsLst>
+                    <a:gs pos="2917">
+                      <a:schemeClr val="tx1"/>
+                    </a:gs>
+                    <a:gs pos="30000">
+                      <a:schemeClr val="tx1"/>
+                    </a:gs>
+                  </a:gsLst>
+                  <a:lin ang="5400000" scaled="0"/>
+                </a:gradFill>
+                <a:latin typeface="+mj-lt"/>
+              </a:rPr>
+              <a:t>layout</a:t>
+            </a:r>
+            <a:r>
               <a:rPr lang="ru-RU" sz="2000" dirty="0" smtClean="0">
                 <a:gradFill>
                   <a:gsLst>
@@ -31536,8 +31539,22 @@
                 </a:gradFill>
                 <a:latin typeface="+mj-lt"/>
               </a:rPr>
-              <a:t>размещения элементов.</a:t>
-            </a:r>
+              <a:t>.</a:t>
+            </a:r>
+            <a:endParaRPr lang="ru-RU" sz="2000" dirty="0" smtClean="0">
+              <a:gradFill>
+                <a:gsLst>
+                  <a:gs pos="2917">
+                    <a:schemeClr val="tx1"/>
+                  </a:gs>
+                  <a:gs pos="30000">
+                    <a:schemeClr val="tx1"/>
+                  </a:gs>
+                </a:gsLst>
+                <a:lin ang="5400000" scaled="0"/>
+              </a:gradFill>
+              <a:latin typeface="+mj-lt"/>
+            </a:endParaRPr>
           </a:p>
         </p:txBody>
       </p:sp>
@@ -31660,7 +31677,7 @@
         <p:spPr>
           <a:xfrm>
             <a:off x="246281" y="5412275"/>
-            <a:ext cx="6391107" cy="1403461"/>
+            <a:ext cx="6391107" cy="1126462"/>
           </a:xfrm>
           <a:prstGeom prst="rect">
             <a:avLst/>
@@ -31681,6 +31698,23 @@
                 <a:spcPts val="600"/>
               </a:spcAft>
             </a:pPr>
+            <a:r>
+              <a:rPr lang="en-US" sz="2000" dirty="0" smtClean="0">
+                <a:gradFill>
+                  <a:gsLst>
+                    <a:gs pos="2917">
+                      <a:schemeClr val="tx1"/>
+                    </a:gs>
+                    <a:gs pos="30000">
+                      <a:schemeClr val="tx1"/>
+                    </a:gs>
+                  </a:gsLst>
+                  <a:lin ang="5400000" scaled="0"/>
+                </a:gradFill>
+                <a:latin typeface="+mj-lt"/>
+              </a:rPr>
+              <a:t>Sized in Grid can be specified using Auto, stretchable</a:t>
+            </a:r>
             <a:r>
               <a:rPr lang="ru-RU" sz="2000" dirty="0" smtClean="0">
                 <a:gradFill>
@@ -31696,24 +31730,7 @@
                 </a:gradFill>
                 <a:latin typeface="+mj-lt"/>
               </a:rPr>
-              <a:t>В </a:t>
-            </a:r>
-            <a:r>
-              <a:rPr lang="en-US" sz="2000" dirty="0" smtClean="0">
-                <a:gradFill>
-                  <a:gsLst>
-                    <a:gs pos="2917">
-                      <a:schemeClr val="tx1"/>
-                    </a:gs>
-                    <a:gs pos="30000">
-                      <a:schemeClr val="tx1"/>
-                    </a:gs>
-                  </a:gsLst>
-                  <a:lin ang="5400000" scaled="0"/>
-                </a:gradFill>
-                <a:latin typeface="+mj-lt"/>
-              </a:rPr>
-              <a:t>Grid </a:t>
+              <a:t> </a:t>
             </a:r>
             <a:r>
               <a:rPr lang="ru-RU" sz="2000" dirty="0" smtClean="0">
@@ -31730,41 +31747,7 @@
                 </a:gradFill>
                 <a:latin typeface="+mj-lt"/>
               </a:rPr>
-              <a:t>можно задавать авто-размер (</a:t>
-            </a:r>
-            <a:r>
-              <a:rPr lang="en-US" sz="2000" dirty="0" smtClean="0">
-                <a:gradFill>
-                  <a:gsLst>
-                    <a:gs pos="2917">
-                      <a:schemeClr val="tx1"/>
-                    </a:gs>
-                    <a:gs pos="30000">
-                      <a:schemeClr val="tx1"/>
-                    </a:gs>
-                  </a:gsLst>
-                  <a:lin ang="5400000" scaled="0"/>
-                </a:gradFill>
-                <a:latin typeface="+mj-lt"/>
-              </a:rPr>
-              <a:t>Auto), </a:t>
-            </a:r>
-            <a:r>
-              <a:rPr lang="ru-RU" sz="2000" dirty="0" smtClean="0">
-                <a:gradFill>
-                  <a:gsLst>
-                    <a:gs pos="2917">
-                      <a:schemeClr val="tx1"/>
-                    </a:gs>
-                    <a:gs pos="30000">
-                      <a:schemeClr val="tx1"/>
-                    </a:gs>
-                  </a:gsLst>
-                  <a:lin ang="5400000" scaled="0"/>
-                </a:gradFill>
-                <a:latin typeface="+mj-lt"/>
-              </a:rPr>
-              <a:t>растягиваемый размер (*)</a:t>
+              <a:t>(*)</a:t>
             </a:r>
             <a:r>
               <a:rPr lang="en-US" sz="2000" dirty="0" smtClean="0">
@@ -31784,6 +31767,23 @@
               <a:t>, </a:t>
             </a:r>
             <a:r>
+              <a:rPr lang="en-US" sz="2000" dirty="0" smtClean="0">
+                <a:gradFill>
+                  <a:gsLst>
+                    <a:gs pos="2917">
+                      <a:schemeClr val="tx1"/>
+                    </a:gs>
+                    <a:gs pos="30000">
+                      <a:schemeClr val="tx1"/>
+                    </a:gs>
+                  </a:gsLst>
+                  <a:lin ang="5400000" scaled="0"/>
+                </a:gradFill>
+                <a:latin typeface="+mj-lt"/>
+              </a:rPr>
+              <a:t>or absolute size in pixels</a:t>
+            </a:r>
+            <a:r>
               <a:rPr lang="ru-RU" sz="2000" dirty="0" smtClean="0">
                 <a:gradFill>
                   <a:gsLst>
@@ -31798,10 +31798,10 @@
                 </a:gradFill>
                 <a:latin typeface="+mj-lt"/>
               </a:rPr>
-              <a:t>или абсолютный размер в </a:t>
-            </a:r>
-            <a:r>
-              <a:rPr lang="ru-RU" sz="2000" dirty="0" err="1" smtClean="0">
+              <a:t>. </a:t>
+            </a:r>
+            <a:r>
+              <a:rPr lang="en-US" sz="2000" dirty="0" smtClean="0">
                 <a:gradFill>
                   <a:gsLst>
                     <a:gs pos="2917">
@@ -31815,7 +31815,7 @@
                 </a:gradFill>
                 <a:latin typeface="+mj-lt"/>
               </a:rPr>
-              <a:t>пикелях</a:t>
+              <a:t>Placement of the child element is determined by its</a:t>
             </a:r>
             <a:r>
               <a:rPr lang="ru-RU" sz="2000" dirty="0" smtClean="0">
@@ -31832,7 +31832,7 @@
                 </a:gradFill>
                 <a:latin typeface="+mj-lt"/>
               </a:rPr>
-              <a:t>. Положение элемента в таблице определяется его атрибутами </a:t>
+              <a:t> </a:t>
             </a:r>
             <a:r>
               <a:rPr lang="en-US" sz="2000" dirty="0" err="1" smtClean="0">
@@ -31866,7 +31866,7 @@
                 </a:gradFill>
                 <a:latin typeface="+mj-lt"/>
               </a:rPr>
-              <a:t>/Column</a:t>
+              <a:t>/Column attributes.</a:t>
             </a:r>
             <a:endParaRPr lang="ru-RU" sz="2000" dirty="0" smtClean="0">
               <a:gradFill>
@@ -31946,8 +31946,8 @@
               <a:rPr lang="en-US" dirty="0" smtClean="0"/>
             </a:br>
             <a:r>
-              <a:rPr lang="ru-RU" dirty="0" smtClean="0"/>
-              <a:t>Форма ввода данных</a:t>
+              <a:rPr lang="en-US" dirty="0" smtClean="0"/>
+              <a:t>Data Entry Form</a:t>
             </a:r>
             <a:endParaRPr lang="ru-RU" dirty="0"/>
           </a:p>
@@ -32097,6 +32097,23 @@
               </a:spcAft>
             </a:pPr>
             <a:r>
+              <a:rPr lang="en-US" sz="2400" dirty="0" smtClean="0">
+                <a:gradFill>
+                  <a:gsLst>
+                    <a:gs pos="2917">
+                      <a:schemeClr val="tx1"/>
+                    </a:gs>
+                    <a:gs pos="30000">
+                      <a:schemeClr val="tx1"/>
+                    </a:gs>
+                  </a:gsLst>
+                  <a:lin ang="5400000" scaled="0"/>
+                </a:gradFill>
+                <a:latin typeface="+mj-lt"/>
+              </a:rPr>
+              <a:t>Canvas allows you to individually position each element using Left/Top</a:t>
+            </a:r>
+            <a:r>
               <a:rPr lang="ru-RU" sz="2400" dirty="0" smtClean="0">
                 <a:gradFill>
                   <a:gsLst>
@@ -32111,7 +32128,7 @@
                 </a:gradFill>
                 <a:latin typeface="+mj-lt"/>
               </a:rPr>
-              <a:t>В </a:t>
+              <a:t> </a:t>
             </a:r>
             <a:r>
               <a:rPr lang="en-US" sz="2400" dirty="0" smtClean="0">
@@ -32128,24 +32145,7 @@
                 </a:gradFill>
                 <a:latin typeface="+mj-lt"/>
               </a:rPr>
-              <a:t>Canvas </a:t>
-            </a:r>
-            <a:r>
-              <a:rPr lang="ru-RU" sz="2400" dirty="0" smtClean="0">
-                <a:gradFill>
-                  <a:gsLst>
-                    <a:gs pos="2917">
-                      <a:schemeClr val="tx1"/>
-                    </a:gs>
-                    <a:gs pos="30000">
-                      <a:schemeClr val="tx1"/>
-                    </a:gs>
-                  </a:gsLst>
-                  <a:lin ang="5400000" scaled="0"/>
-                </a:gradFill>
-                <a:latin typeface="+mj-lt"/>
-              </a:rPr>
-              <a:t>можно индивидуально позиционировать каждый элемент управления с помощью атрибутов </a:t>
+              <a:t>attribute in </a:t>
             </a:r>
             <a:r>
               <a:rPr lang="en-US" sz="2400" dirty="0" smtClean="0">
@@ -32162,58 +32162,7 @@
                 </a:gradFill>
                 <a:latin typeface="+mj-lt"/>
               </a:rPr>
-              <a:t>Left/Top</a:t>
-            </a:r>
-            <a:r>
-              <a:rPr lang="ru-RU" sz="2400" dirty="0" smtClean="0">
-                <a:gradFill>
-                  <a:gsLst>
-                    <a:gs pos="2917">
-                      <a:schemeClr val="tx1"/>
-                    </a:gs>
-                    <a:gs pos="30000">
-                      <a:schemeClr val="tx1"/>
-                    </a:gs>
-                  </a:gsLst>
-                  <a:lin ang="5400000" scaled="0"/>
-                </a:gradFill>
-                <a:latin typeface="+mj-lt"/>
-              </a:rPr>
-              <a:t> в </a:t>
-            </a:r>
-            <a:r>
-              <a:rPr lang="en-US" sz="2400" dirty="0" smtClean="0">
-                <a:gradFill>
-                  <a:gsLst>
-                    <a:gs pos="2917">
-                      <a:schemeClr val="tx1"/>
-                    </a:gs>
-                    <a:gs pos="30000">
-                      <a:schemeClr val="tx1"/>
-                    </a:gs>
-                  </a:gsLst>
-                  <a:lin ang="5400000" scaled="0"/>
-                </a:gradFill>
-                <a:latin typeface="+mj-lt"/>
-              </a:rPr>
-              <a:t>XAML </a:t>
-            </a:r>
-            <a:r>
-              <a:rPr lang="ru-RU" sz="2400" dirty="0" smtClean="0">
-                <a:gradFill>
-                  <a:gsLst>
-                    <a:gs pos="2917">
-                      <a:schemeClr val="tx1"/>
-                    </a:gs>
-                    <a:gs pos="30000">
-                      <a:schemeClr val="tx1"/>
-                    </a:gs>
-                  </a:gsLst>
-                  <a:lin ang="5400000" scaled="0"/>
-                </a:gradFill>
-                <a:latin typeface="+mj-lt"/>
-              </a:rPr>
-              <a:t>или функций </a:t>
+              <a:t>XAML or </a:t>
             </a:r>
             <a:r>
               <a:rPr lang="en-US" sz="2400" dirty="0" err="1" smtClean="0">
@@ -32281,41 +32230,7 @@
                 </a:gradFill>
                 <a:latin typeface="+mj-lt"/>
               </a:rPr>
-              <a:t> </a:t>
-            </a:r>
-            <a:r>
-              <a:rPr lang="ru-RU" sz="2400" dirty="0" smtClean="0">
-                <a:gradFill>
-                  <a:gsLst>
-                    <a:gs pos="2917">
-                      <a:schemeClr val="tx1"/>
-                    </a:gs>
-                    <a:gs pos="30000">
-                      <a:schemeClr val="tx1"/>
-                    </a:gs>
-                  </a:gsLst>
-                  <a:lin ang="5400000" scaled="0"/>
-                </a:gradFill>
-                <a:latin typeface="+mj-lt"/>
-              </a:rPr>
-              <a:t>в </a:t>
-            </a:r>
-            <a:r>
-              <a:rPr lang="en-US" sz="2400" dirty="0" smtClean="0">
-                <a:gradFill>
-                  <a:gsLst>
-                    <a:gs pos="2917">
-                      <a:schemeClr val="tx1"/>
-                    </a:gs>
-                    <a:gs pos="30000">
-                      <a:schemeClr val="tx1"/>
-                    </a:gs>
-                  </a:gsLst>
-                  <a:lin ang="5400000" scaled="0"/>
-                </a:gradFill>
-                <a:latin typeface="+mj-lt"/>
-              </a:rPr>
-              <a:t>C#</a:t>
+              <a:t> functions in the code-behind (C#)</a:t>
             </a:r>
             <a:endParaRPr lang="ru-RU" sz="2400" dirty="0" smtClean="0">
               <a:gradFill>
@@ -32395,8 +32310,8 @@
               <a:rPr lang="en-US" dirty="0" smtClean="0"/>
             </a:br>
             <a:r>
-              <a:rPr lang="ru-RU" dirty="0" smtClean="0"/>
-              <a:t>Подвижный круг</a:t>
+              <a:rPr lang="en-US" dirty="0" smtClean="0"/>
+              <a:t>Moving Circle</a:t>
             </a:r>
             <a:endParaRPr lang="ru-RU" dirty="0"/>
           </a:p>
@@ -32460,8 +32375,12 @@
           <a:lstStyle/>
           <a:p>
             <a:r>
-              <a:rPr lang="ru-RU" dirty="0" smtClean="0"/>
-              <a:t>Вылетающие элементы</a:t>
+              <a:rPr lang="en-US" dirty="0" err="1" smtClean="0"/>
+              <a:t>Flyout</a:t>
+            </a:r>
+            <a:r>
+              <a:rPr lang="en-US" dirty="0" smtClean="0"/>
+              <a:t> Elements</a:t>
             </a:r>
             <a:endParaRPr lang="en-US" dirty="0"/>
           </a:p>
@@ -34304,12 +34223,9 @@
 </file>
 
 <file path=customXml/item1.xml><?xml version="1.0" encoding="utf-8"?>
-<?mso-contentType ?>
-<FormTemplates xmlns="http://schemas.microsoft.com/sharepoint/v3/contenttype/forms">
-  <Display>DocumentLibraryForm</Display>
-  <Edit>DocumentLibraryForm</Edit>
-  <New>DocumentLibraryForm</New>
-</FormTemplates>
+<p:properties xmlns:p="http://schemas.microsoft.com/office/2006/metadata/properties" xmlns:xsi="http://www.w3.org/2001/XMLSchema-instance" xmlns:pc="http://schemas.microsoft.com/office/infopath/2007/PartnerControls">
+  <documentManagement/>
+</p:properties>
 </file>
 
 <file path=customXml/item2.xml><?xml version="1.0" encoding="utf-8"?>
@@ -34427,15 +34343,25 @@
 </file>
 
 <file path=customXml/item3.xml><?xml version="1.0" encoding="utf-8"?>
-<p:properties xmlns:p="http://schemas.microsoft.com/office/2006/metadata/properties" xmlns:xsi="http://www.w3.org/2001/XMLSchema-instance" xmlns:pc="http://schemas.microsoft.com/office/infopath/2007/PartnerControls">
-  <documentManagement/>
-</p:properties>
+<?mso-contentType ?>
+<FormTemplates xmlns="http://schemas.microsoft.com/sharepoint/v3/contenttype/forms">
+  <Display>DocumentLibraryForm</Display>
+  <Edit>DocumentLibraryForm</Edit>
+  <New>DocumentLibraryForm</New>
+</FormTemplates>
 </file>
 
 <file path=customXml/itemProps1.xml><?xml version="1.0" encoding="utf-8"?>
-<ds:datastoreItem xmlns:ds="http://schemas.openxmlformats.org/officeDocument/2006/customXml" ds:itemID="{1C1284F2-D5A2-482D-9283-38905BD416F7}">
+<ds:datastoreItem xmlns:ds="http://schemas.openxmlformats.org/officeDocument/2006/customXml" ds:itemID="{136497CF-FFDF-4FDB-8278-A4E189869E9B}">
   <ds:schemaRefs>
-    <ds:schemaRef ds:uri="http://schemas.microsoft.com/sharepoint/v3/contenttype/forms"/>
+    <ds:schemaRef ds:uri="http://schemas.microsoft.com/office/2006/metadata/properties"/>
+    <ds:schemaRef ds:uri="http://purl.org/dc/terms/"/>
+    <ds:schemaRef ds:uri="http://schemas.openxmlformats.org/package/2006/metadata/core-properties"/>
+    <ds:schemaRef ds:uri="http://schemas.microsoft.com/office/2006/documentManagement/types"/>
+    <ds:schemaRef ds:uri="http://purl.org/dc/dcmitype/"/>
+    <ds:schemaRef ds:uri="http://schemas.microsoft.com/office/infopath/2007/PartnerControls"/>
+    <ds:schemaRef ds:uri="http://purl.org/dc/elements/1.1/"/>
+    <ds:schemaRef ds:uri="http://www.w3.org/XML/1998/namespace"/>
   </ds:schemaRefs>
 </ds:datastoreItem>
 </file>
@@ -34457,16 +34383,9 @@
 </file>
 
 <file path=customXml/itemProps3.xml><?xml version="1.0" encoding="utf-8"?>
-<ds:datastoreItem xmlns:ds="http://schemas.openxmlformats.org/officeDocument/2006/customXml" ds:itemID="{136497CF-FFDF-4FDB-8278-A4E189869E9B}">
+<ds:datastoreItem xmlns:ds="http://schemas.openxmlformats.org/officeDocument/2006/customXml" ds:itemID="{1C1284F2-D5A2-482D-9283-38905BD416F7}">
   <ds:schemaRefs>
-    <ds:schemaRef ds:uri="http://schemas.microsoft.com/office/2006/metadata/properties"/>
-    <ds:schemaRef ds:uri="http://purl.org/dc/terms/"/>
-    <ds:schemaRef ds:uri="http://schemas.openxmlformats.org/package/2006/metadata/core-properties"/>
-    <ds:schemaRef ds:uri="http://schemas.microsoft.com/office/2006/documentManagement/types"/>
-    <ds:schemaRef ds:uri="http://purl.org/dc/dcmitype/"/>
-    <ds:schemaRef ds:uri="http://schemas.microsoft.com/office/infopath/2007/PartnerControls"/>
-    <ds:schemaRef ds:uri="http://purl.org/dc/elements/1.1/"/>
-    <ds:schemaRef ds:uri="http://www.w3.org/XML/1998/namespace"/>
+    <ds:schemaRef ds:uri="http://schemas.microsoft.com/sharepoint/v3/contenttype/forms"/>
   </ds:schemaRefs>
 </ds:datastoreItem>
 </file>
</xml_diff>